<commit_message>
updated healthcare and pp
</commit_message>
<xml_diff>
--- a/Anaconda_Results_Presentation.pptx
+++ b/Anaconda_Results_Presentation.pptx
@@ -214,7 +214,7 @@
           <a:p>
             <a:fld id="{43EC3969-ABB6-44FD-90B4-7F0745909C05}" type="datetimeFigureOut">
               <a:rPr lang="en-US" smtClean="0"/>
-              <a:t>2/13/2021</a:t>
+              <a:t>2/15/2021</a:t>
             </a:fld>
             <a:endParaRPr lang="en-US"/>
           </a:p>
@@ -919,7 +919,7 @@
           <a:p>
             <a:fld id="{9184DA70-C731-4C70-880D-CCD4705E623C}" type="datetime1">
               <a:rPr lang="en-US" smtClean="0"/>
-              <a:t>2/13/2021</a:t>
+              <a:t>2/15/2021</a:t>
             </a:fld>
             <a:endParaRPr lang="en-US" dirty="0"/>
           </a:p>
@@ -1107,7 +1107,7 @@
           <a:p>
             <a:fld id="{4BE1D723-8F53-4F53-90B0-1982A396982E}" type="datetime1">
               <a:rPr lang="en-US" smtClean="0"/>
-              <a:t>2/13/2021</a:t>
+              <a:t>2/15/2021</a:t>
             </a:fld>
             <a:endParaRPr lang="en-US" dirty="0"/>
           </a:p>
@@ -1480,7 +1480,7 @@
           <a:p>
             <a:fld id="{97669AF7-7BEB-44E4-9852-375E34362B5B}" type="datetime1">
               <a:rPr lang="en-US" smtClean="0"/>
-              <a:t>2/13/2021</a:t>
+              <a:t>2/15/2021</a:t>
             </a:fld>
             <a:endParaRPr lang="en-US" dirty="0"/>
           </a:p>
@@ -1735,7 +1735,7 @@
           <a:p>
             <a:fld id="{BAAAC38D-0552-4C82-B593-E6124DFADBE2}" type="datetime1">
               <a:rPr lang="en-US" smtClean="0"/>
-              <a:t>2/13/2021</a:t>
+              <a:t>2/15/2021</a:t>
             </a:fld>
             <a:endParaRPr lang="en-US" dirty="0"/>
           </a:p>
@@ -2132,7 +2132,7 @@
           <a:p>
             <a:fld id="{D9DF0F1C-5577-4ACB-BB62-DF8F3C494C7E}" type="datetime1">
               <a:rPr lang="en-US" smtClean="0"/>
-              <a:t>2/13/2021</a:t>
+              <a:t>2/15/2021</a:t>
             </a:fld>
             <a:endParaRPr lang="en-US" dirty="0"/>
           </a:p>
@@ -2268,7 +2268,7 @@
           <a:p>
             <a:fld id="{1775B394-D9F9-4F0C-B15D-605F45CB9E9F}" type="datetime1">
               <a:rPr lang="en-US" smtClean="0"/>
-              <a:t>2/13/2021</a:t>
+              <a:t>2/15/2021</a:t>
             </a:fld>
             <a:endParaRPr lang="en-US" dirty="0"/>
           </a:p>
@@ -2425,7 +2425,7 @@
           <a:p>
             <a:fld id="{39667345-2558-425A-8533-9BFDBCE15005}" type="datetime1">
               <a:rPr lang="en-US" smtClean="0"/>
-              <a:t>2/13/2021</a:t>
+              <a:t>2/15/2021</a:t>
             </a:fld>
             <a:endParaRPr lang="en-US" dirty="0"/>
           </a:p>
@@ -2754,7 +2754,7 @@
           <a:p>
             <a:fld id="{92BEA474-078D-4E9B-9B14-09A87B19DC46}" type="datetime1">
               <a:rPr lang="en-US" smtClean="0"/>
-              <a:t>2/13/2021</a:t>
+              <a:t>2/15/2021</a:t>
             </a:fld>
             <a:endParaRPr lang="en-US" dirty="0"/>
           </a:p>
@@ -3104,7 +3104,7 @@
           <a:p>
             <a:fld id="{4907D986-8816-4272-A432-0437A28A9828}" type="datetime1">
               <a:rPr lang="en-US" smtClean="0"/>
-              <a:t>2/13/2021</a:t>
+              <a:t>2/15/2021</a:t>
             </a:fld>
             <a:endParaRPr lang="en-US" dirty="0"/>
           </a:p>
@@ -3365,7 +3365,7 @@
           <a:p>
             <a:fld id="{62D6E202-B606-4609-B914-27C9371A1F6D}" type="datetime1">
               <a:rPr lang="en-US" smtClean="0"/>
-              <a:t>2/13/2021</a:t>
+              <a:t>2/15/2021</a:t>
             </a:fld>
             <a:endParaRPr lang="en-US" dirty="0"/>
           </a:p>
@@ -4176,95 +4176,12 @@
           <a:chExt cx="0" cy="0"/>
         </a:xfrm>
       </p:grpSpPr>
-      <p:sp>
-        <p:nvSpPr>
-          <p:cNvPr id="2" name="Title 1">
-            <a:extLst>
-              <a:ext uri="{FF2B5EF4-FFF2-40B4-BE49-F238E27FC236}">
-                <a16:creationId xmlns:a16="http://schemas.microsoft.com/office/drawing/2014/main" id="{40BD6826-2307-4B69-AC43-B1FF64626836}"/>
-              </a:ext>
-            </a:extLst>
-          </p:cNvPr>
-          <p:cNvSpPr>
-            <a:spLocks noGrp="1"/>
-          </p:cNvSpPr>
-          <p:nvPr>
-            <p:ph type="title"/>
-          </p:nvPr>
-        </p:nvSpPr>
-        <p:spPr/>
-        <p:txBody>
-          <a:bodyPr/>
-          <a:lstStyle/>
-          <a:p>
-            <a:r>
-              <a:rPr lang="en-US" dirty="0"/>
-              <a:t>Healthcare/Happiness Correlation</a:t>
-            </a:r>
-          </a:p>
-        </p:txBody>
-      </p:sp>
-      <p:sp>
-        <p:nvSpPr>
-          <p:cNvPr id="3" name="Content Placeholder 2">
-            <a:extLst>
-              <a:ext uri="{FF2B5EF4-FFF2-40B4-BE49-F238E27FC236}">
-                <a16:creationId xmlns:a16="http://schemas.microsoft.com/office/drawing/2014/main" id="{C577C011-DA16-496A-BAA9-6A7D1C179C2B}"/>
-              </a:ext>
-            </a:extLst>
-          </p:cNvPr>
-          <p:cNvSpPr>
-            <a:spLocks noGrp="1"/>
-          </p:cNvSpPr>
-          <p:nvPr>
-            <p:ph idx="1"/>
-          </p:nvPr>
-        </p:nvSpPr>
-        <p:spPr>
-          <a:xfrm>
-            <a:off x="933450" y="1822452"/>
-            <a:ext cx="10058400" cy="749298"/>
-          </a:xfrm>
-        </p:spPr>
-        <p:txBody>
-          <a:bodyPr>
-            <a:normAutofit lnSpcReduction="10000"/>
-          </a:bodyPr>
-          <a:lstStyle/>
-          <a:p>
-            <a:r>
-              <a:rPr lang="en-US" i="0" dirty="0">
-                <a:solidFill>
-                  <a:srgbClr val="202124"/>
-                </a:solidFill>
-                <a:effectLst/>
-                <a:latin typeface="Roboto"/>
-              </a:rPr>
-              <a:t>Capital health spend include health infrastructure (buildings, machinery, IT) and stocks of vaccines for emergency or outbreaks</a:t>
-            </a:r>
-          </a:p>
-          <a:p>
-            <a:endParaRPr lang="en-US" dirty="0">
-              <a:solidFill>
-                <a:srgbClr val="202124"/>
-              </a:solidFill>
-              <a:latin typeface="Roboto"/>
-            </a:endParaRPr>
-          </a:p>
-          <a:p>
-            <a:endParaRPr lang="en-US" dirty="0"/>
-          </a:p>
-          <a:p>
-            <a:endParaRPr lang="en-US" dirty="0"/>
-          </a:p>
-        </p:txBody>
-      </p:sp>
       <p:pic>
         <p:nvPicPr>
-          <p:cNvPr id="5" name="Picture 4">
-            <a:extLst>
-              <a:ext uri="{FF2B5EF4-FFF2-40B4-BE49-F238E27FC236}">
-                <a16:creationId xmlns:a16="http://schemas.microsoft.com/office/drawing/2014/main" id="{8AB49778-FCA7-43AA-B7C6-8433778BCE36}"/>
+          <p:cNvPr id="10" name="Picture 9">
+            <a:extLst>
+              <a:ext uri="{FF2B5EF4-FFF2-40B4-BE49-F238E27FC236}">
+                <a16:creationId xmlns:a16="http://schemas.microsoft.com/office/drawing/2014/main" id="{0C1F9184-B68C-4EBD-BCB2-EBA80DB7A457}"/>
               </a:ext>
             </a:extLst>
           </p:cNvPr>
@@ -4281,20 +4198,103 @@
         </p:blipFill>
         <p:spPr>
           <a:xfrm>
-            <a:off x="9170401" y="537042"/>
-            <a:ext cx="1924319" cy="1200318"/>
+            <a:off x="332758" y="2639909"/>
+            <a:ext cx="4429743" cy="3010320"/>
           </a:xfrm>
           <a:prstGeom prst="rect">
             <a:avLst/>
           </a:prstGeom>
         </p:spPr>
       </p:pic>
+      <p:sp>
+        <p:nvSpPr>
+          <p:cNvPr id="2" name="Title 1">
+            <a:extLst>
+              <a:ext uri="{FF2B5EF4-FFF2-40B4-BE49-F238E27FC236}">
+                <a16:creationId xmlns:a16="http://schemas.microsoft.com/office/drawing/2014/main" id="{40BD6826-2307-4B69-AC43-B1FF64626836}"/>
+              </a:ext>
+            </a:extLst>
+          </p:cNvPr>
+          <p:cNvSpPr>
+            <a:spLocks noGrp="1"/>
+          </p:cNvSpPr>
+          <p:nvPr>
+            <p:ph type="title"/>
+          </p:nvPr>
+        </p:nvSpPr>
+        <p:spPr/>
+        <p:txBody>
+          <a:bodyPr/>
+          <a:lstStyle/>
+          <a:p>
+            <a:r>
+              <a:rPr lang="en-US" dirty="0"/>
+              <a:t>Healthcare/Happiness Correlation</a:t>
+            </a:r>
+          </a:p>
+        </p:txBody>
+      </p:sp>
+      <p:sp>
+        <p:nvSpPr>
+          <p:cNvPr id="3" name="Content Placeholder 2">
+            <a:extLst>
+              <a:ext uri="{FF2B5EF4-FFF2-40B4-BE49-F238E27FC236}">
+                <a16:creationId xmlns:a16="http://schemas.microsoft.com/office/drawing/2014/main" id="{C577C011-DA16-496A-BAA9-6A7D1C179C2B}"/>
+              </a:ext>
+            </a:extLst>
+          </p:cNvPr>
+          <p:cNvSpPr>
+            <a:spLocks noGrp="1"/>
+          </p:cNvSpPr>
+          <p:nvPr>
+            <p:ph idx="1"/>
+          </p:nvPr>
+        </p:nvSpPr>
+        <p:spPr>
+          <a:xfrm>
+            <a:off x="933450" y="1822452"/>
+            <a:ext cx="10058400" cy="749298"/>
+          </a:xfrm>
+        </p:spPr>
+        <p:txBody>
+          <a:bodyPr>
+            <a:normAutofit lnSpcReduction="10000"/>
+          </a:bodyPr>
+          <a:lstStyle/>
+          <a:p>
+            <a:r>
+              <a:rPr lang="en-US" i="0" dirty="0">
+                <a:solidFill>
+                  <a:srgbClr val="202124"/>
+                </a:solidFill>
+                <a:effectLst/>
+                <a:latin typeface="Roboto"/>
+              </a:rPr>
+              <a:t>Capital health spend include health infrastructure (buildings, machinery, IT) and stocks of vaccines for emergency or outbreaks</a:t>
+            </a:r>
+          </a:p>
+          <a:p>
+            <a:endParaRPr lang="en-US" dirty="0">
+              <a:solidFill>
+                <a:srgbClr val="202124"/>
+              </a:solidFill>
+              <a:latin typeface="Roboto"/>
+            </a:endParaRPr>
+          </a:p>
+          <a:p>
+            <a:endParaRPr lang="en-US" dirty="0"/>
+          </a:p>
+          <a:p>
+            <a:endParaRPr lang="en-US" dirty="0"/>
+          </a:p>
+        </p:txBody>
+      </p:sp>
       <p:pic>
         <p:nvPicPr>
-          <p:cNvPr id="8" name="Picture 7">
-            <a:extLst>
-              <a:ext uri="{FF2B5EF4-FFF2-40B4-BE49-F238E27FC236}">
-                <a16:creationId xmlns:a16="http://schemas.microsoft.com/office/drawing/2014/main" id="{A4A0C31A-4325-4C13-9841-4F43B72208E3}"/>
+          <p:cNvPr id="5" name="Picture 4">
+            <a:extLst>
+              <a:ext uri="{FF2B5EF4-FFF2-40B4-BE49-F238E27FC236}">
+                <a16:creationId xmlns:a16="http://schemas.microsoft.com/office/drawing/2014/main" id="{8AB49778-FCA7-43AA-B7C6-8433778BCE36}"/>
               </a:ext>
             </a:extLst>
           </p:cNvPr>
@@ -4311,8 +4311,8 @@
         </p:blipFill>
         <p:spPr>
           <a:xfrm>
-            <a:off x="619635" y="2656842"/>
-            <a:ext cx="4785742" cy="3481599"/>
+            <a:off x="9170401" y="537042"/>
+            <a:ext cx="1924319" cy="1200318"/>
           </a:xfrm>
           <a:prstGeom prst="rect">
             <a:avLst/>
@@ -4333,7 +4333,7 @@
         </p:nvSpPr>
         <p:spPr>
           <a:xfrm>
-            <a:off x="5181600" y="3406405"/>
+            <a:off x="4070432" y="3547587"/>
             <a:ext cx="2247900" cy="1477328"/>
           </a:xfrm>
           <a:prstGeom prst="rect">
@@ -4360,6 +4360,81 @@
             <a:r>
               <a:rPr lang="en-US" dirty="0"/>
               <a:t>The more govt spend on health infrastructure, the more likely for happier country </a:t>
+            </a:r>
+          </a:p>
+        </p:txBody>
+      </p:sp>
+      <p:pic>
+        <p:nvPicPr>
+          <p:cNvPr id="6" name="Picture 5">
+            <a:extLst>
+              <a:ext uri="{FF2B5EF4-FFF2-40B4-BE49-F238E27FC236}">
+                <a16:creationId xmlns:a16="http://schemas.microsoft.com/office/drawing/2014/main" id="{C7CCC12D-B068-4B93-A1F8-76B7128DDBB8}"/>
+              </a:ext>
+            </a:extLst>
+          </p:cNvPr>
+          <p:cNvPicPr>
+            <a:picLocks noChangeAspect="1"/>
+          </p:cNvPicPr>
+          <p:nvPr/>
+        </p:nvPicPr>
+        <p:blipFill>
+          <a:blip r:embed="rId5"/>
+          <a:stretch>
+            <a:fillRect/>
+          </a:stretch>
+        </p:blipFill>
+        <p:spPr>
+          <a:xfrm>
+            <a:off x="6380566" y="2676301"/>
+            <a:ext cx="4239217" cy="3219899"/>
+          </a:xfrm>
+          <a:prstGeom prst="rect">
+            <a:avLst/>
+          </a:prstGeom>
+        </p:spPr>
+      </p:pic>
+      <p:sp>
+        <p:nvSpPr>
+          <p:cNvPr id="11" name="TextBox 10">
+            <a:extLst>
+              <a:ext uri="{FF2B5EF4-FFF2-40B4-BE49-F238E27FC236}">
+                <a16:creationId xmlns:a16="http://schemas.microsoft.com/office/drawing/2014/main" id="{DB043402-89C4-4047-AA56-89FD7A16259D}"/>
+              </a:ext>
+            </a:extLst>
+          </p:cNvPr>
+          <p:cNvSpPr txBox="1"/>
+          <p:nvPr/>
+        </p:nvSpPr>
+        <p:spPr>
+          <a:xfrm>
+            <a:off x="9867900" y="4012503"/>
+            <a:ext cx="2247900" cy="923330"/>
+          </a:xfrm>
+          <a:prstGeom prst="rect">
+            <a:avLst/>
+          </a:prstGeom>
+          <a:solidFill>
+            <a:schemeClr val="accent5">
+              <a:lumMod val="40000"/>
+              <a:lumOff val="60000"/>
+            </a:schemeClr>
+          </a:solidFill>
+          <a:ln>
+            <a:solidFill>
+              <a:srgbClr val="FFFF00"/>
+            </a:solidFill>
+          </a:ln>
+        </p:spPr>
+        <p:txBody>
+          <a:bodyPr wrap="square" rtlCol="0">
+            <a:spAutoFit/>
+          </a:bodyPr>
+          <a:lstStyle/>
+          <a:p>
+            <a:r>
+              <a:rPr lang="en-US" dirty="0"/>
+              <a:t>No correlation between population and happiness</a:t>
             </a:r>
           </a:p>
         </p:txBody>
@@ -6158,7 +6233,52 @@
           <a:bodyPr/>
           <a:lstStyle/>
           <a:p>
-            <a:endParaRPr lang="en-US"/>
+            <a:r>
+              <a:rPr lang="en-US" dirty="0"/>
+              <a:t>World Happiness Report (WHR) was base of the project</a:t>
+            </a:r>
+          </a:p>
+          <a:p>
+            <a:pPr lvl="1"/>
+            <a:r>
+              <a:rPr lang="en-US" dirty="0"/>
+              <a:t>Added additional external datasets to see what other factors would influence happiness</a:t>
+            </a:r>
+          </a:p>
+          <a:p>
+            <a:pPr lvl="1"/>
+            <a:r>
+              <a:rPr lang="en-US" dirty="0"/>
+              <a:t>Based on question to answer, merged appropriate dataset with WHR on ‘country name’ (left join)</a:t>
+            </a:r>
+          </a:p>
+          <a:p>
+            <a:r>
+              <a:rPr lang="en-US" dirty="0"/>
+              <a:t>Clean Up</a:t>
+            </a:r>
+          </a:p>
+          <a:p>
+            <a:pPr lvl="1"/>
+            <a:r>
+              <a:rPr lang="en-US" dirty="0"/>
+              <a:t>Remove </a:t>
+            </a:r>
+            <a:r>
+              <a:rPr lang="en-US" dirty="0" err="1"/>
+              <a:t>NaN’s</a:t>
+            </a:r>
+            <a:r>
+              <a:rPr lang="en-US" dirty="0"/>
+              <a:t> from datasets</a:t>
+            </a:r>
+          </a:p>
+          <a:p>
+            <a:pPr lvl="1"/>
+            <a:r>
+              <a:rPr lang="en-US" dirty="0"/>
+              <a:t>Rename duplicate column names for clarity </a:t>
+            </a:r>
           </a:p>
         </p:txBody>
       </p:sp>
@@ -6241,6 +6361,110 @@
           <a:bodyPr/>
           <a:lstStyle/>
           <a:p>
+            <a:r>
+              <a:rPr lang="en-US" dirty="0"/>
+              <a:t>Calculating numerical correlations     Scatter plots and linear regression  </a:t>
+            </a:r>
+          </a:p>
+          <a:p>
+            <a:r>
+              <a:rPr lang="en-US" dirty="0"/>
+              <a:t>Understanding categorical correlations     Bar charts</a:t>
+            </a:r>
+          </a:p>
+          <a:p>
+            <a:endParaRPr lang="en-US" dirty="0"/>
+          </a:p>
+        </p:txBody>
+      </p:sp>
+      <p:sp>
+        <p:nvSpPr>
+          <p:cNvPr id="4" name="Arrow: Right 3">
+            <a:extLst>
+              <a:ext uri="{FF2B5EF4-FFF2-40B4-BE49-F238E27FC236}">
+                <a16:creationId xmlns:a16="http://schemas.microsoft.com/office/drawing/2014/main" id="{E0451C67-3373-448D-856D-E7AE30BA0330}"/>
+              </a:ext>
+            </a:extLst>
+          </p:cNvPr>
+          <p:cNvSpPr/>
+          <p:nvPr/>
+        </p:nvSpPr>
+        <p:spPr>
+          <a:xfrm>
+            <a:off x="4705350" y="2238375"/>
+            <a:ext cx="304800" cy="180975"/>
+          </a:xfrm>
+          <a:prstGeom prst="rightArrow">
+            <a:avLst/>
+          </a:prstGeom>
+        </p:spPr>
+        <p:style>
+          <a:lnRef idx="2">
+            <a:schemeClr val="accent1">
+              <a:shade val="50000"/>
+            </a:schemeClr>
+          </a:lnRef>
+          <a:fillRef idx="1">
+            <a:schemeClr val="accent1"/>
+          </a:fillRef>
+          <a:effectRef idx="0">
+            <a:schemeClr val="accent1"/>
+          </a:effectRef>
+          <a:fontRef idx="minor">
+            <a:schemeClr val="lt1"/>
+          </a:fontRef>
+        </p:style>
+        <p:txBody>
+          <a:bodyPr rtlCol="0" anchor="ctr"/>
+          <a:lstStyle/>
+          <a:p>
+            <a:pPr algn="ctr"/>
+            <a:endParaRPr lang="en-US"/>
+          </a:p>
+        </p:txBody>
+      </p:sp>
+      <p:sp>
+        <p:nvSpPr>
+          <p:cNvPr id="5" name="Arrow: Right 4">
+            <a:extLst>
+              <a:ext uri="{FF2B5EF4-FFF2-40B4-BE49-F238E27FC236}">
+                <a16:creationId xmlns:a16="http://schemas.microsoft.com/office/drawing/2014/main" id="{D670AFF0-1017-4234-B906-2BAC8D494F18}"/>
+              </a:ext>
+            </a:extLst>
+          </p:cNvPr>
+          <p:cNvSpPr/>
+          <p:nvPr/>
+        </p:nvSpPr>
+        <p:spPr>
+          <a:xfrm>
+            <a:off x="5191125" y="2773361"/>
+            <a:ext cx="304800" cy="180975"/>
+          </a:xfrm>
+          <a:prstGeom prst="rightArrow">
+            <a:avLst/>
+          </a:prstGeom>
+        </p:spPr>
+        <p:style>
+          <a:lnRef idx="2">
+            <a:schemeClr val="accent1">
+              <a:shade val="50000"/>
+            </a:schemeClr>
+          </a:lnRef>
+          <a:fillRef idx="1">
+            <a:schemeClr val="accent1"/>
+          </a:fillRef>
+          <a:effectRef idx="0">
+            <a:schemeClr val="accent1"/>
+          </a:effectRef>
+          <a:fontRef idx="minor">
+            <a:schemeClr val="lt1"/>
+          </a:fontRef>
+        </p:style>
+        <p:txBody>
+          <a:bodyPr rtlCol="0" anchor="ctr"/>
+          <a:lstStyle/>
+          <a:p>
+            <a:pPr algn="ctr"/>
             <a:endParaRPr lang="en-US"/>
           </a:p>
         </p:txBody>
@@ -7002,15 +7226,6 @@
 </file>
 
 <file path=customXml/item2.xml><?xml version="1.0" encoding="utf-8"?>
-<p:properties xmlns:p="http://schemas.microsoft.com/office/2006/metadata/properties" xmlns:xsi="http://www.w3.org/2001/XMLSchema-instance" xmlns:pc="http://schemas.microsoft.com/office/infopath/2007/PartnerControls">
-  <documentManagement>
-    <Status xmlns="71af3243-3dd4-4a8d-8c0d-dd76da1f02a5">Not started</Status>
-    <MediaServiceKeyPoints xmlns="71af3243-3dd4-4a8d-8c0d-dd76da1f02a5" xsi:nil="true"/>
-  </documentManagement>
-</p:properties>
-</file>
-
-<file path=customXml/item3.xml><?xml version="1.0" encoding="utf-8"?>
 <ct:contentTypeSchema xmlns:ct="http://schemas.microsoft.com/office/2006/metadata/contentType" xmlns:ma="http://schemas.microsoft.com/office/2006/metadata/properties/metaAttributes" ct:_="" ma:_="" ma:contentTypeName="Document" ma:contentTypeID="0x01010079F111ED35F8CC479449609E8A0923A6" ma:contentTypeVersion="12" ma:contentTypeDescription="Create a new document." ma:contentTypeScope="" ma:versionID="a410dd7f93c95333ffa1b60ed6adedd1">
   <xsd:schema xmlns:xsd="http://www.w3.org/2001/XMLSchema" xmlns:xs="http://www.w3.org/2001/XMLSchema" xmlns:p="http://schemas.microsoft.com/office/2006/metadata/properties" xmlns:ns2="71af3243-3dd4-4a8d-8c0d-dd76da1f02a5" xmlns:ns3="16c05727-aa75-4e4a-9b5f-8a80a1165891" targetNamespace="http://schemas.microsoft.com/office/2006/metadata/properties" ma:root="true" ma:fieldsID="a936d9baba76aa3866493feff160faab" ns2:_="" ns3:_="">
     <xsd:import namespace="71af3243-3dd4-4a8d-8c0d-dd76da1f02a5"/>
@@ -7231,6 +7446,15 @@
 </ct:contentTypeSchema>
 </file>
 
+<file path=customXml/item3.xml><?xml version="1.0" encoding="utf-8"?>
+<p:properties xmlns:p="http://schemas.microsoft.com/office/2006/metadata/properties" xmlns:xsi="http://www.w3.org/2001/XMLSchema-instance" xmlns:pc="http://schemas.microsoft.com/office/infopath/2007/PartnerControls">
+  <documentManagement>
+    <Status xmlns="71af3243-3dd4-4a8d-8c0d-dd76da1f02a5">Not started</Status>
+    <MediaServiceKeyPoints xmlns="71af3243-3dd4-4a8d-8c0d-dd76da1f02a5" xsi:nil="true"/>
+  </documentManagement>
+</p:properties>
+</file>
+
 <file path=customXml/itemProps1.xml><?xml version="1.0" encoding="utf-8"?>
 <ds:datastoreItem xmlns:ds="http://schemas.openxmlformats.org/officeDocument/2006/customXml" ds:itemID="{31F006B4-A9E1-4F39-85C8-FB836F919348}">
   <ds:schemaRefs>
@@ -7240,16 +7464,6 @@
 </file>
 
 <file path=customXml/itemProps2.xml><?xml version="1.0" encoding="utf-8"?>
-<ds:datastoreItem xmlns:ds="http://schemas.openxmlformats.org/officeDocument/2006/customXml" ds:itemID="{8F3CD65D-61A5-43C9-A837-6EC73C7DA8AB}">
-  <ds:schemaRefs>
-    <ds:schemaRef ds:uri="http://schemas.microsoft.com/office/2006/metadata/properties"/>
-    <ds:schemaRef ds:uri="http://schemas.microsoft.com/office/infopath/2007/PartnerControls"/>
-    <ds:schemaRef ds:uri="71af3243-3dd4-4a8d-8c0d-dd76da1f02a5"/>
-  </ds:schemaRefs>
-</ds:datastoreItem>
-</file>
-
-<file path=customXml/itemProps3.xml><?xml version="1.0" encoding="utf-8"?>
 <ds:datastoreItem xmlns:ds="http://schemas.openxmlformats.org/officeDocument/2006/customXml" ds:itemID="{16377351-63A1-4C2E-8C9A-66CDD70F16AC}">
   <ds:schemaRefs>
     <ds:schemaRef ds:uri="http://schemas.microsoft.com/office/2006/metadata/contentType"/>
@@ -7266,4 +7480,14 @@
     <ds:schemaRef ds:uri="http://schemas.microsoft.com/internal/obd"/>
   </ds:schemaRefs>
 </ds:datastoreItem>
+</file>
+
+<file path=customXml/itemProps3.xml><?xml version="1.0" encoding="utf-8"?>
+<ds:datastoreItem xmlns:ds="http://schemas.openxmlformats.org/officeDocument/2006/customXml" ds:itemID="{8F3CD65D-61A5-43C9-A837-6EC73C7DA8AB}">
+  <ds:schemaRefs>
+    <ds:schemaRef ds:uri="http://schemas.microsoft.com/office/2006/metadata/properties"/>
+    <ds:schemaRef ds:uri="http://schemas.microsoft.com/office/infopath/2007/PartnerControls"/>
+    <ds:schemaRef ds:uri="71af3243-3dd4-4a8d-8c0d-dd76da1f02a5"/>
+  </ds:schemaRefs>
+</ds:datastoreItem>
 </file>
</xml_diff>

<commit_message>
adding info in health
</commit_message>
<xml_diff>
--- a/Anaconda_Results_Presentation.pptx
+++ b/Anaconda_Results_Presentation.pptx
@@ -5,7 +5,7 @@
     <p:sldMasterId id="2147483660" r:id="rId4"/>
   </p:sldMasterIdLst>
   <p:notesMasterIdLst>
-    <p:notesMasterId r:id="rId20"/>
+    <p:notesMasterId r:id="rId21"/>
   </p:notesMasterIdLst>
   <p:sldIdLst>
     <p:sldId id="266" r:id="rId5"/>
@@ -16,13 +16,14 @@
     <p:sldId id="313" r:id="rId10"/>
     <p:sldId id="326" r:id="rId11"/>
     <p:sldId id="322" r:id="rId12"/>
-    <p:sldId id="315" r:id="rId13"/>
-    <p:sldId id="318" r:id="rId14"/>
-    <p:sldId id="319" r:id="rId15"/>
-    <p:sldId id="316" r:id="rId16"/>
-    <p:sldId id="314" r:id="rId17"/>
-    <p:sldId id="321" r:id="rId18"/>
-    <p:sldId id="325" r:id="rId19"/>
+    <p:sldId id="327" r:id="rId13"/>
+    <p:sldId id="315" r:id="rId14"/>
+    <p:sldId id="318" r:id="rId15"/>
+    <p:sldId id="319" r:id="rId16"/>
+    <p:sldId id="316" r:id="rId17"/>
+    <p:sldId id="314" r:id="rId18"/>
+    <p:sldId id="321" r:id="rId19"/>
+    <p:sldId id="325" r:id="rId20"/>
   </p:sldIdLst>
   <p:sldSz cx="12192000" cy="6858000"/>
   <p:notesSz cx="6858000" cy="9144000"/>
@@ -656,7 +657,7 @@
           <a:p>
             <a:fld id="{324829E9-F6A8-4625-9F43-B0C3F979AFB3}" type="slidenum">
               <a:rPr lang="en-US" smtClean="0"/>
-              <a:t>10</a:t>
+              <a:t>11</a:t>
             </a:fld>
             <a:endParaRPr lang="en-US"/>
           </a:p>
@@ -4176,12 +4177,125 @@
           <a:chExt cx="0" cy="0"/>
         </a:xfrm>
       </p:grpSpPr>
+      <p:sp>
+        <p:nvSpPr>
+          <p:cNvPr id="2" name="Title 1">
+            <a:extLst>
+              <a:ext uri="{FF2B5EF4-FFF2-40B4-BE49-F238E27FC236}">
+                <a16:creationId xmlns:a16="http://schemas.microsoft.com/office/drawing/2014/main" id="{7839A618-B7F5-4CA5-91F9-F442DCEE15B8}"/>
+              </a:ext>
+            </a:extLst>
+          </p:cNvPr>
+          <p:cNvSpPr>
+            <a:spLocks noGrp="1"/>
+          </p:cNvSpPr>
+          <p:nvPr>
+            <p:ph type="title"/>
+          </p:nvPr>
+        </p:nvSpPr>
+        <p:spPr/>
+        <p:txBody>
+          <a:bodyPr/>
+          <a:lstStyle/>
+          <a:p>
+            <a:r>
+              <a:rPr lang="en-US" dirty="0"/>
+              <a:t>Unemployment/Happiness Correlation </a:t>
+            </a:r>
+          </a:p>
+        </p:txBody>
+      </p:sp>
+      <p:sp>
+        <p:nvSpPr>
+          <p:cNvPr id="3" name="Content Placeholder 2">
+            <a:extLst>
+              <a:ext uri="{FF2B5EF4-FFF2-40B4-BE49-F238E27FC236}">
+                <a16:creationId xmlns:a16="http://schemas.microsoft.com/office/drawing/2014/main" id="{19FD0137-3FFE-45DC-B8A5-9C9E27C56B63}"/>
+              </a:ext>
+            </a:extLst>
+          </p:cNvPr>
+          <p:cNvSpPr>
+            <a:spLocks noGrp="1"/>
+          </p:cNvSpPr>
+          <p:nvPr>
+            <p:ph idx="1"/>
+          </p:nvPr>
+        </p:nvSpPr>
+        <p:spPr/>
+        <p:txBody>
+          <a:bodyPr/>
+          <a:lstStyle/>
+          <a:p>
+            <a:endParaRPr lang="en-US" dirty="0"/>
+          </a:p>
+        </p:txBody>
+      </p:sp>
       <p:pic>
         <p:nvPicPr>
-          <p:cNvPr id="10" name="Picture 9">
-            <a:extLst>
-              <a:ext uri="{FF2B5EF4-FFF2-40B4-BE49-F238E27FC236}">
-                <a16:creationId xmlns:a16="http://schemas.microsoft.com/office/drawing/2014/main" id="{0C1F9184-B68C-4EBD-BCB2-EBA80DB7A457}"/>
+          <p:cNvPr id="5" name="Picture 4">
+            <a:extLst>
+              <a:ext uri="{FF2B5EF4-FFF2-40B4-BE49-F238E27FC236}">
+                <a16:creationId xmlns:a16="http://schemas.microsoft.com/office/drawing/2014/main" id="{33927651-D2E9-4E88-A692-F05CDFBA4F11}"/>
+              </a:ext>
+            </a:extLst>
+          </p:cNvPr>
+          <p:cNvPicPr>
+            <a:picLocks noChangeAspect="1"/>
+          </p:cNvPicPr>
+          <p:nvPr/>
+        </p:nvPicPr>
+        <p:blipFill>
+          <a:blip r:embed="rId2"/>
+          <a:stretch>
+            <a:fillRect/>
+          </a:stretch>
+        </p:blipFill>
+        <p:spPr>
+          <a:xfrm>
+            <a:off x="9983196" y="198164"/>
+            <a:ext cx="1416490" cy="1581488"/>
+          </a:xfrm>
+          <a:prstGeom prst="rect">
+            <a:avLst/>
+          </a:prstGeom>
+        </p:spPr>
+      </p:pic>
+    </p:spTree>
+    <p:extLst>
+      <p:ext uri="{BB962C8B-B14F-4D97-AF65-F5344CB8AC3E}">
+        <p14:creationId xmlns:p14="http://schemas.microsoft.com/office/powerpoint/2010/main" val="3862462912"/>
+      </p:ext>
+    </p:extLst>
+  </p:cSld>
+  <p:clrMapOvr>
+    <a:masterClrMapping/>
+  </p:clrMapOvr>
+</p:sld>
+</file>
+
+<file path=ppt/slides/slide11.xml><?xml version="1.0" encoding="utf-8"?>
+<p:sld xmlns:a="http://schemas.openxmlformats.org/drawingml/2006/main" xmlns:r="http://schemas.openxmlformats.org/officeDocument/2006/relationships" xmlns:p="http://schemas.openxmlformats.org/presentationml/2006/main">
+  <p:cSld>
+    <p:spTree>
+      <p:nvGrpSpPr>
+        <p:cNvPr id="1" name=""/>
+        <p:cNvGrpSpPr/>
+        <p:nvPr/>
+      </p:nvGrpSpPr>
+      <p:grpSpPr>
+        <a:xfrm>
+          <a:off x="0" y="0"/>
+          <a:ext cx="0" cy="0"/>
+          <a:chOff x="0" y="0"/>
+          <a:chExt cx="0" cy="0"/>
+        </a:xfrm>
+      </p:grpSpPr>
+      <p:pic>
+        <p:nvPicPr>
+          <p:cNvPr id="12" name="Picture 11">
+            <a:extLst>
+              <a:ext uri="{FF2B5EF4-FFF2-40B4-BE49-F238E27FC236}">
+                <a16:creationId xmlns:a16="http://schemas.microsoft.com/office/drawing/2014/main" id="{714C5F2F-C98E-41F7-8E76-79EA219B6A99}"/>
               </a:ext>
             </a:extLst>
           </p:cNvPr>
@@ -4198,8 +4312,38 @@
         </p:blipFill>
         <p:spPr>
           <a:xfrm>
-            <a:off x="332758" y="2639909"/>
-            <a:ext cx="4429743" cy="3010320"/>
+            <a:off x="6490695" y="2395687"/>
+            <a:ext cx="3753374" cy="3038899"/>
+          </a:xfrm>
+          <a:prstGeom prst="rect">
+            <a:avLst/>
+          </a:prstGeom>
+        </p:spPr>
+      </p:pic>
+      <p:pic>
+        <p:nvPicPr>
+          <p:cNvPr id="7" name="Picture 6">
+            <a:extLst>
+              <a:ext uri="{FF2B5EF4-FFF2-40B4-BE49-F238E27FC236}">
+                <a16:creationId xmlns:a16="http://schemas.microsoft.com/office/drawing/2014/main" id="{D0A5F3A2-5C7C-4943-903B-F8F8ABB8CF06}"/>
+              </a:ext>
+            </a:extLst>
+          </p:cNvPr>
+          <p:cNvPicPr>
+            <a:picLocks noChangeAspect="1"/>
+          </p:cNvPicPr>
+          <p:nvPr/>
+        </p:nvPicPr>
+        <p:blipFill>
+          <a:blip r:embed="rId4"/>
+          <a:stretch>
+            <a:fillRect/>
+          </a:stretch>
+        </p:blipFill>
+        <p:spPr>
+          <a:xfrm>
+            <a:off x="507463" y="2602586"/>
+            <a:ext cx="4372585" cy="2934109"/>
           </a:xfrm>
           <a:prstGeom prst="rect">
             <a:avLst/>
@@ -4304,7 +4448,7 @@
           <p:nvPr/>
         </p:nvPicPr>
         <p:blipFill>
-          <a:blip r:embed="rId4"/>
+          <a:blip r:embed="rId5"/>
           <a:stretch>
             <a:fillRect/>
           </a:stretch>
@@ -4333,7 +4477,7 @@
         </p:nvSpPr>
         <p:spPr>
           <a:xfrm>
-            <a:off x="4070432" y="3547587"/>
+            <a:off x="4132666" y="3735504"/>
             <a:ext cx="2247900" cy="1477328"/>
           </a:xfrm>
           <a:prstGeom prst="rect">
@@ -4364,36 +4508,6 @@
           </a:p>
         </p:txBody>
       </p:sp>
-      <p:pic>
-        <p:nvPicPr>
-          <p:cNvPr id="6" name="Picture 5">
-            <a:extLst>
-              <a:ext uri="{FF2B5EF4-FFF2-40B4-BE49-F238E27FC236}">
-                <a16:creationId xmlns:a16="http://schemas.microsoft.com/office/drawing/2014/main" id="{C7CCC12D-B068-4B93-A1F8-76B7128DDBB8}"/>
-              </a:ext>
-            </a:extLst>
-          </p:cNvPr>
-          <p:cNvPicPr>
-            <a:picLocks noChangeAspect="1"/>
-          </p:cNvPicPr>
-          <p:nvPr/>
-        </p:nvPicPr>
-        <p:blipFill>
-          <a:blip r:embed="rId5"/>
-          <a:stretch>
-            <a:fillRect/>
-          </a:stretch>
-        </p:blipFill>
-        <p:spPr>
-          <a:xfrm>
-            <a:off x="6380566" y="2676301"/>
-            <a:ext cx="4239217" cy="3219899"/>
-          </a:xfrm>
-          <a:prstGeom prst="rect">
-            <a:avLst/>
-          </a:prstGeom>
-        </p:spPr>
-      </p:pic>
       <p:sp>
         <p:nvSpPr>
           <p:cNvPr id="11" name="TextBox 10">
@@ -4452,7 +4566,7 @@
 </p:sld>
 </file>
 
-<file path=ppt/slides/slide11.xml><?xml version="1.0" encoding="utf-8"?>
+<file path=ppt/slides/slide12.xml><?xml version="1.0" encoding="utf-8"?>
 <p:sld xmlns:a="http://schemas.openxmlformats.org/drawingml/2006/main" xmlns:r="http://schemas.openxmlformats.org/officeDocument/2006/relationships" xmlns:p="http://schemas.openxmlformats.org/presentationml/2006/main">
   <p:cSld>
     <p:spTree>
@@ -4565,7 +4679,7 @@
 </p:sld>
 </file>
 
-<file path=ppt/slides/slide12.xml><?xml version="1.0" encoding="utf-8"?>
+<file path=ppt/slides/slide13.xml><?xml version="1.0" encoding="utf-8"?>
 <p:sld xmlns:a="http://schemas.openxmlformats.org/drawingml/2006/main" xmlns:r="http://schemas.openxmlformats.org/officeDocument/2006/relationships" xmlns:p="http://schemas.openxmlformats.org/presentationml/2006/main">
   <p:cSld>
     <p:spTree>
@@ -4678,7 +4792,7 @@
 </p:sld>
 </file>
 
-<file path=ppt/slides/slide13.xml><?xml version="1.0" encoding="utf-8"?>
+<file path=ppt/slides/slide14.xml><?xml version="1.0" encoding="utf-8"?>
 <p:sld xmlns:a="http://schemas.openxmlformats.org/drawingml/2006/main" xmlns:r="http://schemas.openxmlformats.org/officeDocument/2006/relationships" xmlns:p="http://schemas.openxmlformats.org/presentationml/2006/main">
   <p:cSld>
     <p:spTree>
@@ -4718,7 +4832,7 @@
           <a:p>
             <a:r>
               <a:rPr lang="en-US" dirty="0"/>
-              <a:t>Weather/Happiness Correlation </a:t>
+              <a:t>Pick a perfect spot based on weather preference </a:t>
             </a:r>
           </a:p>
         </p:txBody>
@@ -4770,7 +4884,7 @@
         </p:blipFill>
         <p:spPr>
           <a:xfrm>
-            <a:off x="8830678" y="209344"/>
+            <a:off x="9439052" y="371269"/>
             <a:ext cx="1655668" cy="1450758"/>
           </a:xfrm>
           <a:prstGeom prst="rect">
@@ -4791,7 +4905,7 @@
 </p:sld>
 </file>
 
-<file path=ppt/slides/slide14.xml><?xml version="1.0" encoding="utf-8"?>
+<file path=ppt/slides/slide15.xml><?xml version="1.0" encoding="utf-8"?>
 <p:sld xmlns:a="http://schemas.openxmlformats.org/drawingml/2006/main" xmlns:r="http://schemas.openxmlformats.org/officeDocument/2006/relationships" xmlns:p="http://schemas.openxmlformats.org/presentationml/2006/main">
   <p:cSld>
     <p:spTree>
@@ -4873,7 +4987,21 @@
             <a:pPr lvl="1"/>
             <a:r>
               <a:rPr lang="en-US" dirty="0"/>
-              <a:t>Access to best medicine/technology  </a:t>
+              <a:t>Access to best medicine/technology </a:t>
+            </a:r>
+          </a:p>
+          <a:p>
+            <a:pPr lvl="1"/>
+            <a:r>
+              <a:rPr lang="en-US" dirty="0"/>
+              <a:t>Surround yourself with a strong social support </a:t>
+            </a:r>
+          </a:p>
+          <a:p>
+            <a:pPr lvl="1"/>
+            <a:r>
+              <a:rPr lang="en-US" dirty="0"/>
+              <a:t>Government that aligns with commitment to happiness  </a:t>
             </a:r>
           </a:p>
         </p:txBody>
@@ -4891,7 +5019,7 @@
 </p:sld>
 </file>
 
-<file path=ppt/slides/slide15.xml><?xml version="1.0" encoding="utf-8"?>
+<file path=ppt/slides/slide16.xml><?xml version="1.0" encoding="utf-8"?>
 <p:sld xmlns:a="http://schemas.openxmlformats.org/drawingml/2006/main" xmlns:r="http://schemas.openxmlformats.org/officeDocument/2006/relationships" xmlns:p="http://schemas.openxmlformats.org/presentationml/2006/main">
   <p:cSld>
     <p:spTree>
@@ -5189,9 +5317,10 @@
           <a:lstStyle/>
           <a:p>
             <a:r>
-              <a:rPr lang="en-US" dirty="0"/>
+              <a:rPr lang="en-US"/>
               <a:t>Objective </a:t>
             </a:r>
+            <a:endParaRPr lang="en-US" dirty="0"/>
           </a:p>
         </p:txBody>
       </p:sp>
@@ -5218,7 +5347,7 @@
           <a:p>
             <a:pPr algn="l"/>
             <a:r>
-              <a:rPr lang="en-US" b="0" i="0" dirty="0">
+              <a:rPr lang="en-US" b="0" i="0">
                 <a:effectLst/>
                 <a:latin typeface="Arial" panose="020B0604020202020204" pitchFamily="34" charset="0"/>
               </a:rPr>
@@ -5228,17 +5357,17 @@
           <a:p>
             <a:pPr algn="l"/>
             <a:r>
-              <a:rPr lang="en-US" b="0" i="0" dirty="0">
+              <a:rPr lang="en-US" b="0" i="0">
                 <a:effectLst/>
                 <a:latin typeface="Arial" panose="020B0604020202020204" pitchFamily="34" charset="0"/>
               </a:rPr>
-              <a:t>correlating with World Happiness. We have examined the relationships between </a:t>
+              <a:t>correlated with happiness. We have examined the relationships between </a:t>
             </a:r>
           </a:p>
           <a:p>
             <a:pPr algn="l"/>
             <a:r>
-              <a:rPr lang="en-US" b="0" i="0" dirty="0">
+              <a:rPr lang="en-US" b="0" i="0">
                 <a:effectLst/>
                 <a:latin typeface="Arial" panose="020B0604020202020204" pitchFamily="34" charset="0"/>
               </a:rPr>
@@ -5248,7 +5377,7 @@
           <a:p>
             <a:pPr algn="l"/>
             <a:r>
-              <a:rPr lang="en-US" b="0" i="0" dirty="0">
+              <a:rPr lang="en-US" b="0" i="0">
                 <a:effectLst/>
                 <a:latin typeface="Arial" panose="020B0604020202020204" pitchFamily="34" charset="0"/>
               </a:rPr>
@@ -5362,7 +5491,7 @@
             <a:pPr lvl="1"/>
             <a:r>
               <a:rPr lang="en-US" dirty="0"/>
-              <a:t>Government Spend on Healthcare</a:t>
+              <a:t>Higher Government Spend on Healthcare</a:t>
             </a:r>
           </a:p>
           <a:p>
@@ -5375,8 +5504,12 @@
           <a:p>
             <a:pPr lvl="1"/>
             <a:r>
+              <a:rPr lang="en-US" dirty="0"/>
+              <a:t>Democratic</a:t>
+            </a:r>
+            <a:r>
               <a:rPr lang="en-US" i="1" dirty="0"/>
-              <a:t>(insert) </a:t>
+              <a:t> </a:t>
             </a:r>
             <a:r>
               <a:rPr lang="en-US" dirty="0"/>
@@ -6056,13 +6189,13 @@
             <a:spLocks noGrp="1"/>
           </p:cNvSpPr>
           <p:nvPr>
-            <p:ph type="title"/>
+            <p:ph type="title" idx="4294967295"/>
           </p:nvPr>
         </p:nvSpPr>
         <p:spPr>
           <a:xfrm>
-            <a:off x="1097280" y="285751"/>
-            <a:ext cx="10058400" cy="1451610"/>
+            <a:off x="0" y="188913"/>
+            <a:ext cx="10058400" cy="727075"/>
           </a:xfrm>
         </p:spPr>
         <p:txBody>
@@ -6089,13 +6222,35 @@
             <a:spLocks noGrp="1"/>
           </p:cNvSpPr>
           <p:nvPr>
-            <p:ph idx="1"/>
-          </p:nvPr>
-        </p:nvSpPr>
-        <p:spPr/>
-        <p:txBody>
-          <a:bodyPr/>
-          <a:lstStyle/>
+            <p:ph idx="4294967295"/>
+          </p:nvPr>
+        </p:nvSpPr>
+        <p:spPr>
+          <a:xfrm>
+            <a:off x="0" y="1136649"/>
+            <a:ext cx="10058400" cy="4835887"/>
+          </a:xfrm>
+        </p:spPr>
+        <p:txBody>
+          <a:bodyPr>
+            <a:normAutofit lnSpcReduction="10000"/>
+          </a:bodyPr>
+          <a:lstStyle/>
+          <a:p>
+            <a:pPr marL="0" indent="0">
+              <a:spcBef>
+                <a:spcPts val="0"/>
+              </a:spcBef>
+              <a:spcAft>
+                <a:spcPts val="0"/>
+              </a:spcAft>
+              <a:buNone/>
+            </a:pPr>
+            <a:r>
+              <a:rPr lang="en-US" dirty="0"/>
+              <a:t>World Happiness Report </a:t>
+            </a:r>
+          </a:p>
           <a:p>
             <a:pPr>
               <a:spcBef>
@@ -6106,41 +6261,217 @@
               </a:spcAft>
             </a:pPr>
             <a:r>
+              <a:rPr lang="en-US" dirty="0">
+                <a:hlinkClick r:id="rId3"/>
+              </a:rPr>
+              <a:t>https://www.kaggle.com/unsdsn/world-happiness</a:t>
+            </a:r>
+            <a:endParaRPr lang="en-US" dirty="0"/>
+          </a:p>
+          <a:p>
+            <a:pPr marL="0">
+              <a:buNone/>
+            </a:pPr>
+            <a:r>
               <a:rPr lang="en-US" dirty="0"/>
-              <a:t>World Happiness Report </a:t>
-            </a:r>
-          </a:p>
-          <a:p>
-            <a:pPr>
+              <a:t>World Health Organization Global Expenditure Database </a:t>
+            </a:r>
+            <a:r>
+              <a:rPr lang="en-US" dirty="0">
+                <a:hlinkClick r:id="rId4"/>
+              </a:rPr>
+              <a:t>https://apps.who.int/nha/database/Select/Indicators/en</a:t>
+            </a:r>
+            <a:endParaRPr lang="en-US" dirty="0"/>
+          </a:p>
+          <a:p>
+            <a:pPr marL="0">
+              <a:spcBef>
+                <a:spcPts val="0"/>
+              </a:spcBef>
+              <a:buNone/>
+            </a:pPr>
+            <a:r>
+              <a:rPr lang="en-US" b="0" i="0" dirty="0">
+                <a:solidFill>
+                  <a:srgbClr val="1D1C1D"/>
+                </a:solidFill>
+                <a:effectLst/>
+                <a:latin typeface="Slack-Lato"/>
+              </a:rPr>
+              <a:t> </a:t>
+            </a:r>
+          </a:p>
+          <a:p>
+            <a:pPr marL="0">
+              <a:spcBef>
+                <a:spcPts val="0"/>
+              </a:spcBef>
+              <a:buNone/>
+            </a:pPr>
+            <a:r>
+              <a:rPr lang="en-US" b="0" i="0" dirty="0">
+                <a:solidFill>
+                  <a:srgbClr val="1D1C1D"/>
+                </a:solidFill>
+                <a:effectLst/>
+              </a:rPr>
+              <a:t>International Monetary Fund</a:t>
+            </a:r>
+          </a:p>
+          <a:p>
+            <a:pPr marL="0">
               <a:spcBef>
                 <a:spcPts val="0"/>
               </a:spcBef>
               <a:spcAft>
                 <a:spcPts val="0"/>
               </a:spcAft>
+              <a:buNone/>
             </a:pPr>
             <a:r>
               <a:rPr lang="en-US" dirty="0">
-                <a:hlinkClick r:id="rId3"/>
+                <a:hlinkClick r:id="rId5"/>
               </a:rPr>
-              <a:t>https://www.kaggle.com/unsdsn/world-happiness</a:t>
+              <a:t>https://www.imf.org/en/Publications/SPROLLS/world-economic-outlook-databases#sort=%40imfdate%20descending</a:t>
             </a:r>
             <a:endParaRPr lang="en-US" dirty="0"/>
           </a:p>
           <a:p>
             <a:pPr marL="0">
+              <a:spcBef>
+                <a:spcPts val="0"/>
+              </a:spcBef>
+              <a:spcAft>
+                <a:spcPts val="0"/>
+              </a:spcAft>
               <a:buNone/>
             </a:pPr>
+            <a:endParaRPr lang="en-US" b="0" i="0" dirty="0">
+              <a:solidFill>
+                <a:srgbClr val="1D1C1D"/>
+              </a:solidFill>
+              <a:effectLst/>
+              <a:latin typeface="Slack-Lato"/>
+            </a:endParaRPr>
+          </a:p>
+          <a:p>
+            <a:pPr marL="0">
+              <a:spcBef>
+                <a:spcPts val="0"/>
+              </a:spcBef>
+              <a:spcAft>
+                <a:spcPts val="0"/>
+              </a:spcAft>
+              <a:buNone/>
+            </a:pPr>
+            <a:r>
+              <a:rPr lang="en-US" b="0" i="0" dirty="0">
+                <a:solidFill>
+                  <a:srgbClr val="1D1C1D"/>
+                </a:solidFill>
+                <a:effectLst/>
+              </a:rPr>
+              <a:t>World Bank Data Catalogue</a:t>
+            </a:r>
+          </a:p>
+          <a:p>
+            <a:pPr marL="0">
+              <a:spcBef>
+                <a:spcPts val="0"/>
+              </a:spcBef>
+              <a:spcAft>
+                <a:spcPts val="0"/>
+              </a:spcAft>
+              <a:buNone/>
+            </a:pPr>
+            <a:r>
+              <a:rPr lang="en-US" dirty="0">
+                <a:hlinkClick r:id="rId6"/>
+              </a:rPr>
+              <a:t>https://documents.worldbank.org/</a:t>
+            </a:r>
+            <a:endParaRPr lang="en-US" dirty="0"/>
+          </a:p>
+          <a:p>
+            <a:pPr marL="0">
+              <a:spcBef>
+                <a:spcPts val="0"/>
+              </a:spcBef>
+              <a:spcAft>
+                <a:spcPts val="0"/>
+              </a:spcAft>
+              <a:buNone/>
+            </a:pPr>
+            <a:endParaRPr lang="en-US" dirty="0"/>
+          </a:p>
+          <a:p>
+            <a:pPr marL="0">
+              <a:spcBef>
+                <a:spcPts val="0"/>
+              </a:spcBef>
+              <a:spcAft>
+                <a:spcPts val="0"/>
+              </a:spcAft>
+              <a:buNone/>
+            </a:pPr>
             <a:r>
               <a:rPr lang="en-US" dirty="0"/>
-              <a:t>World Health Organization Global Expenditure Database </a:t>
-            </a:r>
+              <a:t>Weather API </a:t>
+            </a:r>
+          </a:p>
+          <a:p>
+            <a:pPr marL="0">
+              <a:spcBef>
+                <a:spcPts val="0"/>
+              </a:spcBef>
+              <a:spcAft>
+                <a:spcPts val="0"/>
+              </a:spcAft>
+              <a:buNone/>
+            </a:pPr>
             <a:r>
               <a:rPr lang="en-US" dirty="0">
-                <a:hlinkClick r:id="rId4"/>
+                <a:hlinkClick r:id="rId7"/>
               </a:rPr>
-              <a:t>https://apps.who.int/nha/database/Select/Indicators/en</a:t>
-            </a:r>
+              <a:t>https://openweathermap.org/api</a:t>
+            </a:r>
+            <a:endParaRPr lang="en-US" dirty="0"/>
+          </a:p>
+          <a:p>
+            <a:pPr marL="0">
+              <a:spcBef>
+                <a:spcPts val="0"/>
+              </a:spcBef>
+              <a:spcAft>
+                <a:spcPts val="0"/>
+              </a:spcAft>
+              <a:buNone/>
+            </a:pPr>
+            <a:endParaRPr lang="en-US" dirty="0"/>
+          </a:p>
+          <a:p>
+            <a:pPr marL="0">
+              <a:spcBef>
+                <a:spcPts val="0"/>
+              </a:spcBef>
+              <a:spcAft>
+                <a:spcPts val="0"/>
+              </a:spcAft>
+              <a:buNone/>
+            </a:pPr>
+            <a:endParaRPr lang="en-US" dirty="0"/>
+          </a:p>
+          <a:p>
+            <a:pPr marL="0">
+              <a:spcBef>
+                <a:spcPts val="0"/>
+              </a:spcBef>
+              <a:spcAft>
+                <a:spcPts val="0"/>
+              </a:spcAft>
+              <a:buNone/>
+            </a:pPr>
             <a:endParaRPr lang="en-US" dirty="0"/>
           </a:p>
           <a:p>
@@ -6242,7 +6573,7 @@
             <a:pPr lvl="1"/>
             <a:r>
               <a:rPr lang="en-US" dirty="0"/>
-              <a:t>Added additional external datasets to see what other factors would influence happiness</a:t>
+              <a:t>Obtained additional external datasets to see what other factors would influence happiness</a:t>
             </a:r>
           </a:p>
           <a:p>
@@ -6278,6 +6609,13 @@
             <a:r>
               <a:rPr lang="en-US" dirty="0"/>
               <a:t>Rename duplicate column names for clarity </a:t>
+            </a:r>
+          </a:p>
+          <a:p>
+            <a:pPr lvl="1"/>
+            <a:r>
+              <a:rPr lang="en-US" dirty="0"/>
+              <a:t>Identify top (and bottom) countries based on happiness </a:t>
             </a:r>
           </a:p>
         </p:txBody>
@@ -6373,6 +6711,12 @@
             </a:r>
           </a:p>
           <a:p>
+            <a:r>
+              <a:rPr lang="en-US" dirty="0"/>
+              <a:t>Calculating relationship with more than 2 variables </a:t>
+            </a:r>
+          </a:p>
+          <a:p>
             <a:endParaRPr lang="en-US" dirty="0"/>
           </a:p>
         </p:txBody>
@@ -6438,6 +6782,52 @@
         <p:spPr>
           <a:xfrm>
             <a:off x="5191125" y="2773361"/>
+            <a:ext cx="304800" cy="180975"/>
+          </a:xfrm>
+          <a:prstGeom prst="rightArrow">
+            <a:avLst/>
+          </a:prstGeom>
+        </p:spPr>
+        <p:style>
+          <a:lnRef idx="2">
+            <a:schemeClr val="accent1">
+              <a:shade val="50000"/>
+            </a:schemeClr>
+          </a:lnRef>
+          <a:fillRef idx="1">
+            <a:schemeClr val="accent1"/>
+          </a:fillRef>
+          <a:effectRef idx="0">
+            <a:schemeClr val="accent1"/>
+          </a:effectRef>
+          <a:fontRef idx="minor">
+            <a:schemeClr val="lt1"/>
+          </a:fontRef>
+        </p:style>
+        <p:txBody>
+          <a:bodyPr rtlCol="0" anchor="ctr"/>
+          <a:lstStyle/>
+          <a:p>
+            <a:pPr algn="ctr"/>
+            <a:endParaRPr lang="en-US"/>
+          </a:p>
+        </p:txBody>
+      </p:sp>
+      <p:sp>
+        <p:nvSpPr>
+          <p:cNvPr id="6" name="Arrow: Right 5">
+            <a:extLst>
+              <a:ext uri="{FF2B5EF4-FFF2-40B4-BE49-F238E27FC236}">
+                <a16:creationId xmlns:a16="http://schemas.microsoft.com/office/drawing/2014/main" id="{1FF8A7DA-46D3-405C-93C1-EDB25F8610F7}"/>
+              </a:ext>
+            </a:extLst>
+          </p:cNvPr>
+          <p:cNvSpPr/>
+          <p:nvPr/>
+        </p:nvSpPr>
+        <p:spPr>
+          <a:xfrm>
+            <a:off x="6524143" y="3248025"/>
             <a:ext cx="304800" cy="180975"/>
           </a:xfrm>
           <a:prstGeom prst="rightArrow">
@@ -6504,7 +6894,7 @@
           <p:cNvPr id="2" name="Title 1">
             <a:extLst>
               <a:ext uri="{FF2B5EF4-FFF2-40B4-BE49-F238E27FC236}">
-                <a16:creationId xmlns:a16="http://schemas.microsoft.com/office/drawing/2014/main" id="{7839A618-B7F5-4CA5-91F9-F442DCEE15B8}"/>
+                <a16:creationId xmlns:a16="http://schemas.microsoft.com/office/drawing/2014/main" id="{66A7F96A-CE2F-405E-B325-959894CF443E}"/>
               </a:ext>
             </a:extLst>
           </p:cNvPr>
@@ -6522,7 +6912,7 @@
           <a:p>
             <a:r>
               <a:rPr lang="en-US" dirty="0"/>
-              <a:t>Unemployment/Happiness Correlation </a:t>
+              <a:t>Happiness </a:t>
             </a:r>
           </a:p>
         </p:txBody>
@@ -6532,7 +6922,7 @@
           <p:cNvPr id="3" name="Content Placeholder 2">
             <a:extLst>
               <a:ext uri="{FF2B5EF4-FFF2-40B4-BE49-F238E27FC236}">
-                <a16:creationId xmlns:a16="http://schemas.microsoft.com/office/drawing/2014/main" id="{19FD0137-3FFE-45DC-B8A5-9C9E27C56B63}"/>
+                <a16:creationId xmlns:a16="http://schemas.microsoft.com/office/drawing/2014/main" id="{587B3CF9-E33F-48EE-B692-9D3E624F5A16}"/>
               </a:ext>
             </a:extLst>
           </p:cNvPr>
@@ -6548,44 +6938,14 @@
           <a:bodyPr/>
           <a:lstStyle/>
           <a:p>
-            <a:endParaRPr lang="en-US" dirty="0"/>
-          </a:p>
-        </p:txBody>
-      </p:sp>
-      <p:pic>
-        <p:nvPicPr>
-          <p:cNvPr id="5" name="Picture 4">
-            <a:extLst>
-              <a:ext uri="{FF2B5EF4-FFF2-40B4-BE49-F238E27FC236}">
-                <a16:creationId xmlns:a16="http://schemas.microsoft.com/office/drawing/2014/main" id="{33927651-D2E9-4E88-A692-F05CDFBA4F11}"/>
-              </a:ext>
-            </a:extLst>
-          </p:cNvPr>
-          <p:cNvPicPr>
-            <a:picLocks noChangeAspect="1"/>
-          </p:cNvPicPr>
-          <p:nvPr/>
-        </p:nvPicPr>
-        <p:blipFill>
-          <a:blip r:embed="rId2"/>
-          <a:stretch>
-            <a:fillRect/>
-          </a:stretch>
-        </p:blipFill>
-        <p:spPr>
-          <a:xfrm>
-            <a:off x="9983196" y="198164"/>
-            <a:ext cx="1416490" cy="1581488"/>
-          </a:xfrm>
-          <a:prstGeom prst="rect">
-            <a:avLst/>
-          </a:prstGeom>
-        </p:spPr>
-      </p:pic>
+            <a:endParaRPr lang="en-US"/>
+          </a:p>
+        </p:txBody>
+      </p:sp>
     </p:spTree>
     <p:extLst>
       <p:ext uri="{BB962C8B-B14F-4D97-AF65-F5344CB8AC3E}">
-        <p14:creationId xmlns:p14="http://schemas.microsoft.com/office/powerpoint/2010/main" val="3862462912"/>
+        <p14:creationId xmlns:p14="http://schemas.microsoft.com/office/powerpoint/2010/main" val="38700731"/>
       </p:ext>
     </p:extLst>
   </p:cSld>
@@ -7217,15 +7577,6 @@
 </file>
 
 <file path=customXml/item1.xml><?xml version="1.0" encoding="utf-8"?>
-<?mso-contentType ?>
-<FormTemplates xmlns="http://schemas.microsoft.com/sharepoint/v3/contenttype/forms">
-  <Display>DocumentLibraryForm</Display>
-  <Edit>DocumentLibraryForm</Edit>
-  <New>DocumentLibraryForm</New>
-</FormTemplates>
-</file>
-
-<file path=customXml/item2.xml><?xml version="1.0" encoding="utf-8"?>
 <ct:contentTypeSchema xmlns:ct="http://schemas.microsoft.com/office/2006/metadata/contentType" xmlns:ma="http://schemas.microsoft.com/office/2006/metadata/properties/metaAttributes" ct:_="" ma:_="" ma:contentTypeName="Document" ma:contentTypeID="0x01010079F111ED35F8CC479449609E8A0923A6" ma:contentTypeVersion="12" ma:contentTypeDescription="Create a new document." ma:contentTypeScope="" ma:versionID="a410dd7f93c95333ffa1b60ed6adedd1">
   <xsd:schema xmlns:xsd="http://www.w3.org/2001/XMLSchema" xmlns:xs="http://www.w3.org/2001/XMLSchema" xmlns:p="http://schemas.microsoft.com/office/2006/metadata/properties" xmlns:ns2="71af3243-3dd4-4a8d-8c0d-dd76da1f02a5" xmlns:ns3="16c05727-aa75-4e4a-9b5f-8a80a1165891" targetNamespace="http://schemas.microsoft.com/office/2006/metadata/properties" ma:root="true" ma:fieldsID="a936d9baba76aa3866493feff160faab" ns2:_="" ns3:_="">
     <xsd:import namespace="71af3243-3dd4-4a8d-8c0d-dd76da1f02a5"/>
@@ -7446,6 +7797,15 @@
 </ct:contentTypeSchema>
 </file>
 
+<file path=customXml/item2.xml><?xml version="1.0" encoding="utf-8"?>
+<?mso-contentType ?>
+<FormTemplates xmlns="http://schemas.microsoft.com/sharepoint/v3/contenttype/forms">
+  <Display>DocumentLibraryForm</Display>
+  <Edit>DocumentLibraryForm</Edit>
+  <New>DocumentLibraryForm</New>
+</FormTemplates>
+</file>
+
 <file path=customXml/item3.xml><?xml version="1.0" encoding="utf-8"?>
 <p:properties xmlns:p="http://schemas.microsoft.com/office/2006/metadata/properties" xmlns:xsi="http://www.w3.org/2001/XMLSchema-instance" xmlns:pc="http://schemas.microsoft.com/office/infopath/2007/PartnerControls">
   <documentManagement>
@@ -7456,14 +7816,6 @@
 </file>
 
 <file path=customXml/itemProps1.xml><?xml version="1.0" encoding="utf-8"?>
-<ds:datastoreItem xmlns:ds="http://schemas.openxmlformats.org/officeDocument/2006/customXml" ds:itemID="{31F006B4-A9E1-4F39-85C8-FB836F919348}">
-  <ds:schemaRefs>
-    <ds:schemaRef ds:uri="http://schemas.microsoft.com/sharepoint/v3/contenttype/forms"/>
-  </ds:schemaRefs>
-</ds:datastoreItem>
-</file>
-
-<file path=customXml/itemProps2.xml><?xml version="1.0" encoding="utf-8"?>
 <ds:datastoreItem xmlns:ds="http://schemas.openxmlformats.org/officeDocument/2006/customXml" ds:itemID="{16377351-63A1-4C2E-8C9A-66CDD70F16AC}">
   <ds:schemaRefs>
     <ds:schemaRef ds:uri="http://schemas.microsoft.com/office/2006/metadata/contentType"/>
@@ -7482,6 +7834,14 @@
 </ds:datastoreItem>
 </file>
 
+<file path=customXml/itemProps2.xml><?xml version="1.0" encoding="utf-8"?>
+<ds:datastoreItem xmlns:ds="http://schemas.openxmlformats.org/officeDocument/2006/customXml" ds:itemID="{31F006B4-A9E1-4F39-85C8-FB836F919348}">
+  <ds:schemaRefs>
+    <ds:schemaRef ds:uri="http://schemas.microsoft.com/sharepoint/v3/contenttype/forms"/>
+  </ds:schemaRefs>
+</ds:datastoreItem>
+</file>
+
 <file path=customXml/itemProps3.xml><?xml version="1.0" encoding="utf-8"?>
 <ds:datastoreItem xmlns:ds="http://schemas.openxmlformats.org/officeDocument/2006/customXml" ds:itemID="{8F3CD65D-61A5-43C9-A837-6EC73C7DA8AB}">
   <ds:schemaRefs>

</xml_diff>

<commit_message>
images added to presentation
</commit_message>
<xml_diff>
--- a/Anaconda_Results_Presentation.pptx
+++ b/Anaconda_Results_Presentation.pptx
@@ -215,7 +215,7 @@
           <a:p>
             <a:fld id="{43EC3969-ABB6-44FD-90B4-7F0745909C05}" type="datetimeFigureOut">
               <a:rPr lang="en-US" smtClean="0"/>
-              <a:t>2/15/2021</a:t>
+              <a:t>2/16/2021</a:t>
             </a:fld>
             <a:endParaRPr lang="en-US"/>
           </a:p>
@@ -920,7 +920,7 @@
           <a:p>
             <a:fld id="{9184DA70-C731-4C70-880D-CCD4705E623C}" type="datetime1">
               <a:rPr lang="en-US" smtClean="0"/>
-              <a:t>2/15/2021</a:t>
+              <a:t>2/16/2021</a:t>
             </a:fld>
             <a:endParaRPr lang="en-US" dirty="0"/>
           </a:p>
@@ -1108,7 +1108,7 @@
           <a:p>
             <a:fld id="{4BE1D723-8F53-4F53-90B0-1982A396982E}" type="datetime1">
               <a:rPr lang="en-US" smtClean="0"/>
-              <a:t>2/15/2021</a:t>
+              <a:t>2/16/2021</a:t>
             </a:fld>
             <a:endParaRPr lang="en-US" dirty="0"/>
           </a:p>
@@ -1481,7 +1481,7 @@
           <a:p>
             <a:fld id="{97669AF7-7BEB-44E4-9852-375E34362B5B}" type="datetime1">
               <a:rPr lang="en-US" smtClean="0"/>
-              <a:t>2/15/2021</a:t>
+              <a:t>2/16/2021</a:t>
             </a:fld>
             <a:endParaRPr lang="en-US" dirty="0"/>
           </a:p>
@@ -1736,7 +1736,7 @@
           <a:p>
             <a:fld id="{BAAAC38D-0552-4C82-B593-E6124DFADBE2}" type="datetime1">
               <a:rPr lang="en-US" smtClean="0"/>
-              <a:t>2/15/2021</a:t>
+              <a:t>2/16/2021</a:t>
             </a:fld>
             <a:endParaRPr lang="en-US" dirty="0"/>
           </a:p>
@@ -2133,7 +2133,7 @@
           <a:p>
             <a:fld id="{D9DF0F1C-5577-4ACB-BB62-DF8F3C494C7E}" type="datetime1">
               <a:rPr lang="en-US" smtClean="0"/>
-              <a:t>2/15/2021</a:t>
+              <a:t>2/16/2021</a:t>
             </a:fld>
             <a:endParaRPr lang="en-US" dirty="0"/>
           </a:p>
@@ -2269,7 +2269,7 @@
           <a:p>
             <a:fld id="{1775B394-D9F9-4F0C-B15D-605F45CB9E9F}" type="datetime1">
               <a:rPr lang="en-US" smtClean="0"/>
-              <a:t>2/15/2021</a:t>
+              <a:t>2/16/2021</a:t>
             </a:fld>
             <a:endParaRPr lang="en-US" dirty="0"/>
           </a:p>
@@ -2426,7 +2426,7 @@
           <a:p>
             <a:fld id="{39667345-2558-425A-8533-9BFDBCE15005}" type="datetime1">
               <a:rPr lang="en-US" smtClean="0"/>
-              <a:t>2/15/2021</a:t>
+              <a:t>2/16/2021</a:t>
             </a:fld>
             <a:endParaRPr lang="en-US" dirty="0"/>
           </a:p>
@@ -2755,7 +2755,7 @@
           <a:p>
             <a:fld id="{92BEA474-078D-4E9B-9B14-09A87B19DC46}" type="datetime1">
               <a:rPr lang="en-US" smtClean="0"/>
-              <a:t>2/15/2021</a:t>
+              <a:t>2/16/2021</a:t>
             </a:fld>
             <a:endParaRPr lang="en-US" dirty="0"/>
           </a:p>
@@ -3105,7 +3105,7 @@
           <a:p>
             <a:fld id="{4907D986-8816-4272-A432-0437A28A9828}" type="datetime1">
               <a:rPr lang="en-US" smtClean="0"/>
-              <a:t>2/15/2021</a:t>
+              <a:t>2/16/2021</a:t>
             </a:fld>
             <a:endParaRPr lang="en-US" dirty="0"/>
           </a:p>
@@ -3366,7 +3366,7 @@
           <a:p>
             <a:fld id="{62D6E202-B606-4609-B914-27C9371A1F6D}" type="datetime1">
               <a:rPr lang="en-US" smtClean="0"/>
-              <a:t>2/15/2021</a:t>
+              <a:t>2/16/2021</a:t>
             </a:fld>
             <a:endParaRPr lang="en-US" dirty="0"/>
           </a:p>
@@ -4163,6 +4163,14 @@
 <file path=ppt/slides/slide10.xml><?xml version="1.0" encoding="utf-8"?>
 <p:sld xmlns:a="http://schemas.openxmlformats.org/drawingml/2006/main" xmlns:r="http://schemas.openxmlformats.org/officeDocument/2006/relationships" xmlns:p="http://schemas.openxmlformats.org/presentationml/2006/main">
   <p:cSld>
+    <p:bg>
+      <p:bgPr>
+        <a:solidFill>
+          <a:schemeClr val="bg1"/>
+        </a:solidFill>
+        <a:effectLst/>
+      </p:bgPr>
+    </p:bg>
     <p:spTree>
       <p:nvGrpSpPr>
         <p:cNvPr id="1" name=""/>
@@ -4177,65 +4185,12 @@
           <a:chExt cx="0" cy="0"/>
         </a:xfrm>
       </p:grpSpPr>
-      <p:sp>
-        <p:nvSpPr>
-          <p:cNvPr id="2" name="Title 1">
-            <a:extLst>
-              <a:ext uri="{FF2B5EF4-FFF2-40B4-BE49-F238E27FC236}">
-                <a16:creationId xmlns:a16="http://schemas.microsoft.com/office/drawing/2014/main" id="{7839A618-B7F5-4CA5-91F9-F442DCEE15B8}"/>
-              </a:ext>
-            </a:extLst>
-          </p:cNvPr>
-          <p:cNvSpPr>
-            <a:spLocks noGrp="1"/>
-          </p:cNvSpPr>
-          <p:nvPr>
-            <p:ph type="title"/>
-          </p:nvPr>
-        </p:nvSpPr>
-        <p:spPr/>
-        <p:txBody>
-          <a:bodyPr/>
-          <a:lstStyle/>
-          <a:p>
-            <a:r>
-              <a:rPr lang="en-US" dirty="0"/>
-              <a:t>Unemployment/Happiness Correlation </a:t>
-            </a:r>
-          </a:p>
-        </p:txBody>
-      </p:sp>
-      <p:sp>
-        <p:nvSpPr>
-          <p:cNvPr id="3" name="Content Placeholder 2">
-            <a:extLst>
-              <a:ext uri="{FF2B5EF4-FFF2-40B4-BE49-F238E27FC236}">
-                <a16:creationId xmlns:a16="http://schemas.microsoft.com/office/drawing/2014/main" id="{19FD0137-3FFE-45DC-B8A5-9C9E27C56B63}"/>
-              </a:ext>
-            </a:extLst>
-          </p:cNvPr>
-          <p:cNvSpPr>
-            <a:spLocks noGrp="1"/>
-          </p:cNvSpPr>
-          <p:nvPr>
-            <p:ph idx="1"/>
-          </p:nvPr>
-        </p:nvSpPr>
-        <p:spPr/>
-        <p:txBody>
-          <a:bodyPr/>
-          <a:lstStyle/>
-          <a:p>
-            <a:endParaRPr lang="en-US" dirty="0"/>
-          </a:p>
-        </p:txBody>
-      </p:sp>
       <p:pic>
         <p:nvPicPr>
-          <p:cNvPr id="5" name="Picture 4">
-            <a:extLst>
-              <a:ext uri="{FF2B5EF4-FFF2-40B4-BE49-F238E27FC236}">
-                <a16:creationId xmlns:a16="http://schemas.microsoft.com/office/drawing/2014/main" id="{33927651-D2E9-4E88-A692-F05CDFBA4F11}"/>
+          <p:cNvPr id="6" name="Content Placeholder 5">
+            <a:extLst>
+              <a:ext uri="{FF2B5EF4-FFF2-40B4-BE49-F238E27FC236}">
+                <a16:creationId xmlns:a16="http://schemas.microsoft.com/office/drawing/2014/main" id="{14159F5F-73EF-4CAC-B010-A3ADB537CBB2}"/>
               </a:ext>
             </a:extLst>
           </p:cNvPr>
@@ -4252,14 +4207,313 @@
         </p:blipFill>
         <p:spPr>
           <a:xfrm>
-            <a:off x="9983196" y="198164"/>
-            <a:ext cx="1416490" cy="1581488"/>
+            <a:off x="0" y="1208233"/>
+            <a:ext cx="5476240" cy="4326229"/>
           </a:xfrm>
           <a:prstGeom prst="rect">
             <a:avLst/>
           </a:prstGeom>
         </p:spPr>
       </p:pic>
+      <p:sp>
+        <p:nvSpPr>
+          <p:cNvPr id="2" name="Title 1">
+            <a:extLst>
+              <a:ext uri="{FF2B5EF4-FFF2-40B4-BE49-F238E27FC236}">
+                <a16:creationId xmlns:a16="http://schemas.microsoft.com/office/drawing/2014/main" id="{7839A618-B7F5-4CA5-91F9-F442DCEE15B8}"/>
+              </a:ext>
+            </a:extLst>
+          </p:cNvPr>
+          <p:cNvSpPr>
+            <a:spLocks noGrp="1"/>
+          </p:cNvSpPr>
+          <p:nvPr>
+            <p:ph type="title" idx="4294967295"/>
+          </p:nvPr>
+        </p:nvSpPr>
+        <p:spPr>
+          <a:xfrm>
+            <a:off x="0" y="0"/>
+            <a:ext cx="7772400" cy="747265"/>
+          </a:xfrm>
+        </p:spPr>
+        <p:txBody>
+          <a:bodyPr>
+            <a:normAutofit/>
+          </a:bodyPr>
+          <a:lstStyle/>
+          <a:p>
+            <a:r>
+              <a:rPr lang="en-US" sz="3900" dirty="0"/>
+              <a:t>Unemployment/Happiness Correlation </a:t>
+            </a:r>
+          </a:p>
+        </p:txBody>
+      </p:sp>
+      <p:pic>
+        <p:nvPicPr>
+          <p:cNvPr id="9" name="Picture 8">
+            <a:extLst>
+              <a:ext uri="{FF2B5EF4-FFF2-40B4-BE49-F238E27FC236}">
+                <a16:creationId xmlns:a16="http://schemas.microsoft.com/office/drawing/2014/main" id="{09B0BE91-4A49-437F-BA22-7284E69AEF65}"/>
+              </a:ext>
+            </a:extLst>
+          </p:cNvPr>
+          <p:cNvPicPr>
+            <a:picLocks noChangeAspect="1"/>
+          </p:cNvPicPr>
+          <p:nvPr/>
+        </p:nvPicPr>
+        <p:blipFill>
+          <a:blip r:embed="rId3"/>
+          <a:stretch>
+            <a:fillRect/>
+          </a:stretch>
+        </p:blipFill>
+        <p:spPr>
+          <a:xfrm>
+            <a:off x="7982220" y="3264391"/>
+            <a:ext cx="3890688" cy="3102823"/>
+          </a:xfrm>
+          <a:prstGeom prst="rect">
+            <a:avLst/>
+          </a:prstGeom>
+        </p:spPr>
+      </p:pic>
+      <p:pic>
+        <p:nvPicPr>
+          <p:cNvPr id="5" name="Picture 4">
+            <a:extLst>
+              <a:ext uri="{FF2B5EF4-FFF2-40B4-BE49-F238E27FC236}">
+                <a16:creationId xmlns:a16="http://schemas.microsoft.com/office/drawing/2014/main" id="{33927651-D2E9-4E88-A692-F05CDFBA4F11}"/>
+              </a:ext>
+            </a:extLst>
+          </p:cNvPr>
+          <p:cNvPicPr>
+            <a:picLocks noChangeAspect="1"/>
+          </p:cNvPicPr>
+          <p:nvPr/>
+        </p:nvPicPr>
+        <p:blipFill>
+          <a:blip r:embed="rId4"/>
+          <a:stretch>
+            <a:fillRect/>
+          </a:stretch>
+        </p:blipFill>
+        <p:spPr>
+          <a:xfrm>
+            <a:off x="5238678" y="747265"/>
+            <a:ext cx="1066699" cy="1191842"/>
+          </a:xfrm>
+          <a:prstGeom prst="rect">
+            <a:avLst/>
+          </a:prstGeom>
+        </p:spPr>
+      </p:pic>
+      <p:pic>
+        <p:nvPicPr>
+          <p:cNvPr id="8" name="Picture 7">
+            <a:extLst>
+              <a:ext uri="{FF2B5EF4-FFF2-40B4-BE49-F238E27FC236}">
+                <a16:creationId xmlns:a16="http://schemas.microsoft.com/office/drawing/2014/main" id="{68768EF1-A96C-4BF0-AD60-B09F6170AB57}"/>
+              </a:ext>
+            </a:extLst>
+          </p:cNvPr>
+          <p:cNvPicPr>
+            <a:picLocks noChangeAspect="1"/>
+          </p:cNvPicPr>
+          <p:nvPr/>
+        </p:nvPicPr>
+        <p:blipFill>
+          <a:blip r:embed="rId5"/>
+          <a:stretch>
+            <a:fillRect/>
+          </a:stretch>
+        </p:blipFill>
+        <p:spPr>
+          <a:xfrm>
+            <a:off x="7982220" y="161568"/>
+            <a:ext cx="4016602" cy="3102823"/>
+          </a:xfrm>
+          <a:prstGeom prst="rect">
+            <a:avLst/>
+          </a:prstGeom>
+        </p:spPr>
+      </p:pic>
+      <p:sp>
+        <p:nvSpPr>
+          <p:cNvPr id="10" name="TextBox 9">
+            <a:extLst>
+              <a:ext uri="{FF2B5EF4-FFF2-40B4-BE49-F238E27FC236}">
+                <a16:creationId xmlns:a16="http://schemas.microsoft.com/office/drawing/2014/main" id="{3F884FE8-5F3D-478E-AC24-DE00FEBA328C}"/>
+              </a:ext>
+            </a:extLst>
+          </p:cNvPr>
+          <p:cNvSpPr txBox="1"/>
+          <p:nvPr/>
+        </p:nvSpPr>
+        <p:spPr>
+          <a:xfrm>
+            <a:off x="5162377" y="1889693"/>
+            <a:ext cx="2286000" cy="1200329"/>
+          </a:xfrm>
+          <a:prstGeom prst="rect">
+            <a:avLst/>
+          </a:prstGeom>
+          <a:solidFill>
+            <a:schemeClr val="accent5">
+              <a:lumMod val="40000"/>
+              <a:lumOff val="60000"/>
+            </a:schemeClr>
+          </a:solidFill>
+          <a:ln>
+            <a:solidFill>
+              <a:srgbClr val="FFFF00"/>
+            </a:solidFill>
+          </a:ln>
+        </p:spPr>
+        <p:txBody>
+          <a:bodyPr wrap="square" rtlCol="0">
+            <a:spAutoFit/>
+          </a:bodyPr>
+          <a:lstStyle/>
+          <a:p>
+            <a:r>
+              <a:rPr lang="en-US" dirty="0"/>
+              <a:t>Strong correlation between low unemployment and happiness </a:t>
+            </a:r>
+          </a:p>
+        </p:txBody>
+      </p:sp>
+      <p:sp>
+        <p:nvSpPr>
+          <p:cNvPr id="11" name="TextBox 10">
+            <a:extLst>
+              <a:ext uri="{FF2B5EF4-FFF2-40B4-BE49-F238E27FC236}">
+                <a16:creationId xmlns:a16="http://schemas.microsoft.com/office/drawing/2014/main" id="{EAE9AF7C-A221-446D-8B8C-C67AE961C06A}"/>
+              </a:ext>
+            </a:extLst>
+          </p:cNvPr>
+          <p:cNvSpPr txBox="1"/>
+          <p:nvPr/>
+        </p:nvSpPr>
+        <p:spPr>
+          <a:xfrm>
+            <a:off x="5807451" y="3167814"/>
+            <a:ext cx="2363876" cy="1200329"/>
+          </a:xfrm>
+          <a:prstGeom prst="rect">
+            <a:avLst/>
+          </a:prstGeom>
+          <a:solidFill>
+            <a:schemeClr val="accent5">
+              <a:lumMod val="40000"/>
+              <a:lumOff val="60000"/>
+            </a:schemeClr>
+          </a:solidFill>
+          <a:ln>
+            <a:solidFill>
+              <a:srgbClr val="FFFF00"/>
+            </a:solidFill>
+          </a:ln>
+        </p:spPr>
+        <p:txBody>
+          <a:bodyPr wrap="square" rtlCol="0">
+            <a:spAutoFit/>
+          </a:bodyPr>
+          <a:lstStyle/>
+          <a:p>
+            <a:r>
+              <a:rPr lang="en-US" dirty="0"/>
+              <a:t>Finland 2017, </a:t>
+            </a:r>
+          </a:p>
+          <a:p>
+            <a:r>
+              <a:rPr lang="en-US" dirty="0"/>
+              <a:t>sharp unemployment drop, inverse spike in happiness!</a:t>
+            </a:r>
+          </a:p>
+        </p:txBody>
+      </p:sp>
+      <p:cxnSp>
+        <p:nvCxnSpPr>
+          <p:cNvPr id="14" name="Straight Arrow Connector 13">
+            <a:extLst>
+              <a:ext uri="{FF2B5EF4-FFF2-40B4-BE49-F238E27FC236}">
+                <a16:creationId xmlns:a16="http://schemas.microsoft.com/office/drawing/2014/main" id="{C1715B34-5971-442B-8DB8-5ACAA89C01BC}"/>
+              </a:ext>
+            </a:extLst>
+          </p:cNvPr>
+          <p:cNvCxnSpPr/>
+          <p:nvPr/>
+        </p:nvCxnSpPr>
+        <p:spPr>
+          <a:xfrm flipV="1">
+            <a:off x="7843101" y="886120"/>
+            <a:ext cx="1989056" cy="2203902"/>
+          </a:xfrm>
+          <a:prstGeom prst="straightConnector1">
+            <a:avLst/>
+          </a:prstGeom>
+          <a:ln>
+            <a:tailEnd type="triangle"/>
+          </a:ln>
+        </p:spPr>
+        <p:style>
+          <a:lnRef idx="3">
+            <a:schemeClr val="accent1"/>
+          </a:lnRef>
+          <a:fillRef idx="0">
+            <a:schemeClr val="accent1"/>
+          </a:fillRef>
+          <a:effectRef idx="2">
+            <a:schemeClr val="accent1"/>
+          </a:effectRef>
+          <a:fontRef idx="minor">
+            <a:schemeClr val="tx1"/>
+          </a:fontRef>
+        </p:style>
+      </p:cxnSp>
+      <p:cxnSp>
+        <p:nvCxnSpPr>
+          <p:cNvPr id="17" name="Straight Arrow Connector 16">
+            <a:extLst>
+              <a:ext uri="{FF2B5EF4-FFF2-40B4-BE49-F238E27FC236}">
+                <a16:creationId xmlns:a16="http://schemas.microsoft.com/office/drawing/2014/main" id="{3D0464FC-42F2-4B58-BFC6-2396FF4411AE}"/>
+              </a:ext>
+            </a:extLst>
+          </p:cNvPr>
+          <p:cNvCxnSpPr/>
+          <p:nvPr/>
+        </p:nvCxnSpPr>
+        <p:spPr>
+          <a:xfrm>
+            <a:off x="8248454" y="4368143"/>
+            <a:ext cx="1742067" cy="543222"/>
+          </a:xfrm>
+          <a:prstGeom prst="straightConnector1">
+            <a:avLst/>
+          </a:prstGeom>
+          <a:ln>
+            <a:tailEnd type="triangle"/>
+          </a:ln>
+        </p:spPr>
+        <p:style>
+          <a:lnRef idx="3">
+            <a:schemeClr val="accent1"/>
+          </a:lnRef>
+          <a:fillRef idx="0">
+            <a:schemeClr val="accent1"/>
+          </a:fillRef>
+          <a:effectRef idx="2">
+            <a:schemeClr val="accent1"/>
+          </a:effectRef>
+          <a:fontRef idx="minor">
+            <a:schemeClr val="tx1"/>
+          </a:fontRef>
+        </p:style>
+      </p:cxnSp>
     </p:spTree>
     <p:extLst>
       <p:ext uri="{BB962C8B-B14F-4D97-AF65-F5344CB8AC3E}">
@@ -4522,7 +4776,7 @@
         </p:nvSpPr>
         <p:spPr>
           <a:xfrm>
-            <a:off x="9640513" y="4658976"/>
+            <a:off x="9574405" y="4658976"/>
             <a:ext cx="2247900" cy="923330"/>
           </a:xfrm>
           <a:prstGeom prst="rect">
@@ -4596,12 +4850,19 @@
             <a:spLocks noGrp="1"/>
           </p:cNvSpPr>
           <p:nvPr>
-            <p:ph type="title"/>
-          </p:nvPr>
-        </p:nvSpPr>
-        <p:spPr/>
-        <p:txBody>
-          <a:bodyPr/>
+            <p:ph type="title" idx="4294967295"/>
+          </p:nvPr>
+        </p:nvSpPr>
+        <p:spPr>
+          <a:xfrm>
+            <a:off x="243840" y="148273"/>
+            <a:ext cx="8757920" cy="566102"/>
+          </a:xfrm>
+        </p:spPr>
+        <p:txBody>
+          <a:bodyPr>
+            <a:normAutofit fontScale="90000"/>
+          </a:bodyPr>
           <a:lstStyle/>
           <a:p>
             <a:r>
@@ -4611,44 +4872,21 @@
           </a:p>
         </p:txBody>
       </p:sp>
-      <p:sp>
-        <p:nvSpPr>
-          <p:cNvPr id="3" name="Content Placeholder 2">
-            <a:extLst>
-              <a:ext uri="{FF2B5EF4-FFF2-40B4-BE49-F238E27FC236}">
-                <a16:creationId xmlns:a16="http://schemas.microsoft.com/office/drawing/2014/main" id="{C9826C91-6802-411F-8A02-3223375F5038}"/>
-              </a:ext>
-            </a:extLst>
-          </p:cNvPr>
-          <p:cNvSpPr>
-            <a:spLocks noGrp="1"/>
-          </p:cNvSpPr>
-          <p:nvPr>
-            <p:ph idx="1"/>
-          </p:nvPr>
-        </p:nvSpPr>
-        <p:spPr/>
-        <p:txBody>
-          <a:bodyPr/>
-          <a:lstStyle/>
-          <a:p>
-            <a:endParaRPr lang="en-US" dirty="0"/>
-          </a:p>
-        </p:txBody>
-      </p:sp>
       <p:pic>
         <p:nvPicPr>
-          <p:cNvPr id="5" name="Picture 4">
-            <a:extLst>
-              <a:ext uri="{FF2B5EF4-FFF2-40B4-BE49-F238E27FC236}">
-                <a16:creationId xmlns:a16="http://schemas.microsoft.com/office/drawing/2014/main" id="{33D1508A-9E80-4A8B-9717-C1C7E4BBD2EA}"/>
+          <p:cNvPr id="6" name="Content Placeholder 5">
+            <a:extLst>
+              <a:ext uri="{FF2B5EF4-FFF2-40B4-BE49-F238E27FC236}">
+                <a16:creationId xmlns:a16="http://schemas.microsoft.com/office/drawing/2014/main" id="{7603C826-2B61-4A00-B0CA-440200138749}"/>
               </a:ext>
             </a:extLst>
           </p:cNvPr>
           <p:cNvPicPr>
-            <a:picLocks noChangeAspect="1"/>
+            <a:picLocks noGrp="1" noChangeAspect="1"/>
           </p:cNvPicPr>
-          <p:nvPr/>
+          <p:nvPr>
+            <p:ph idx="4294967295"/>
+          </p:nvPr>
         </p:nvPicPr>
         <p:blipFill>
           <a:blip r:embed="rId2"/>
@@ -4658,14 +4896,231 @@
         </p:blipFill>
         <p:spPr>
           <a:xfrm>
-            <a:off x="9629774" y="546707"/>
-            <a:ext cx="1525905" cy="1190653"/>
+            <a:off x="5349005" y="2327443"/>
+            <a:ext cx="6642100" cy="4049712"/>
+          </a:xfrm>
+        </p:spPr>
+      </p:pic>
+      <p:pic>
+        <p:nvPicPr>
+          <p:cNvPr id="5" name="Picture 4">
+            <a:extLst>
+              <a:ext uri="{FF2B5EF4-FFF2-40B4-BE49-F238E27FC236}">
+                <a16:creationId xmlns:a16="http://schemas.microsoft.com/office/drawing/2014/main" id="{33D1508A-9E80-4A8B-9717-C1C7E4BBD2EA}"/>
+              </a:ext>
+            </a:extLst>
+          </p:cNvPr>
+          <p:cNvPicPr>
+            <a:picLocks noChangeAspect="1"/>
+          </p:cNvPicPr>
+          <p:nvPr/>
+        </p:nvPicPr>
+        <p:blipFill>
+          <a:blip r:embed="rId3"/>
+          <a:stretch>
+            <a:fillRect/>
+          </a:stretch>
+        </p:blipFill>
+        <p:spPr>
+          <a:xfrm>
+            <a:off x="8290891" y="1"/>
+            <a:ext cx="1106764" cy="863600"/>
           </a:xfrm>
           <a:prstGeom prst="rect">
             <a:avLst/>
           </a:prstGeom>
         </p:spPr>
       </p:pic>
+      <p:pic>
+        <p:nvPicPr>
+          <p:cNvPr id="8" name="Picture 7">
+            <a:extLst>
+              <a:ext uri="{FF2B5EF4-FFF2-40B4-BE49-F238E27FC236}">
+                <a16:creationId xmlns:a16="http://schemas.microsoft.com/office/drawing/2014/main" id="{9C1AEF21-E279-44D6-AD1D-CB8BDB281604}"/>
+              </a:ext>
+            </a:extLst>
+          </p:cNvPr>
+          <p:cNvPicPr>
+            <a:picLocks noChangeAspect="1"/>
+          </p:cNvPicPr>
+          <p:nvPr/>
+        </p:nvPicPr>
+        <p:blipFill>
+          <a:blip r:embed="rId4"/>
+          <a:stretch>
+            <a:fillRect/>
+          </a:stretch>
+        </p:blipFill>
+        <p:spPr>
+          <a:xfrm>
+            <a:off x="67217" y="1007174"/>
+            <a:ext cx="5077108" cy="4242841"/>
+          </a:xfrm>
+          <a:prstGeom prst="rect">
+            <a:avLst/>
+          </a:prstGeom>
+        </p:spPr>
+      </p:pic>
+      <p:sp>
+        <p:nvSpPr>
+          <p:cNvPr id="9" name="TextBox 8">
+            <a:extLst>
+              <a:ext uri="{FF2B5EF4-FFF2-40B4-BE49-F238E27FC236}">
+                <a16:creationId xmlns:a16="http://schemas.microsoft.com/office/drawing/2014/main" id="{1449789E-977D-4D9C-A843-530179048D57}"/>
+              </a:ext>
+            </a:extLst>
+          </p:cNvPr>
+          <p:cNvSpPr txBox="1"/>
+          <p:nvPr/>
+        </p:nvSpPr>
+        <p:spPr>
+          <a:xfrm>
+            <a:off x="564351" y="5185495"/>
+            <a:ext cx="4287520" cy="646331"/>
+          </a:xfrm>
+          <a:prstGeom prst="rect">
+            <a:avLst/>
+          </a:prstGeom>
+          <a:solidFill>
+            <a:schemeClr val="accent5">
+              <a:lumMod val="40000"/>
+              <a:lumOff val="60000"/>
+            </a:schemeClr>
+          </a:solidFill>
+          <a:ln>
+            <a:solidFill>
+              <a:srgbClr val="FFFF00"/>
+            </a:solidFill>
+          </a:ln>
+        </p:spPr>
+        <p:txBody>
+          <a:bodyPr wrap="square" rtlCol="0">
+            <a:spAutoFit/>
+          </a:bodyPr>
+          <a:lstStyle/>
+          <a:p>
+            <a:r>
+              <a:rPr lang="en-US" dirty="0"/>
+              <a:t>Strong correlation between amount of social support and happiness! </a:t>
+            </a:r>
+          </a:p>
+        </p:txBody>
+      </p:sp>
+      <p:sp>
+        <p:nvSpPr>
+          <p:cNvPr id="10" name="TextBox 9">
+            <a:extLst>
+              <a:ext uri="{FF2B5EF4-FFF2-40B4-BE49-F238E27FC236}">
+                <a16:creationId xmlns:a16="http://schemas.microsoft.com/office/drawing/2014/main" id="{13285194-958B-44E5-B6EB-AF33DC2352EC}"/>
+              </a:ext>
+            </a:extLst>
+          </p:cNvPr>
+          <p:cNvSpPr txBox="1"/>
+          <p:nvPr/>
+        </p:nvSpPr>
+        <p:spPr>
+          <a:xfrm>
+            <a:off x="6608720" y="1201952"/>
+            <a:ext cx="4955762" cy="1477328"/>
+          </a:xfrm>
+          <a:prstGeom prst="rect">
+            <a:avLst/>
+          </a:prstGeom>
+          <a:solidFill>
+            <a:schemeClr val="accent5">
+              <a:lumMod val="40000"/>
+              <a:lumOff val="60000"/>
+            </a:schemeClr>
+          </a:solidFill>
+          <a:ln>
+            <a:solidFill>
+              <a:srgbClr val="FFFF00"/>
+            </a:solidFill>
+          </a:ln>
+        </p:spPr>
+        <p:txBody>
+          <a:bodyPr wrap="square" rtlCol="0">
+            <a:spAutoFit/>
+          </a:bodyPr>
+          <a:lstStyle/>
+          <a:p>
+            <a:r>
+              <a:rPr lang="en-US" dirty="0"/>
+              <a:t>Generous counties, were not automatically happy until social support was added in too! We like to think this says people, in general are good, and want to make others happy, even if they aren’t happy themselves. </a:t>
+            </a:r>
+          </a:p>
+        </p:txBody>
+      </p:sp>
+      <p:sp>
+        <p:nvSpPr>
+          <p:cNvPr id="11" name="TextBox 10">
+            <a:extLst>
+              <a:ext uri="{FF2B5EF4-FFF2-40B4-BE49-F238E27FC236}">
+                <a16:creationId xmlns:a16="http://schemas.microsoft.com/office/drawing/2014/main" id="{CC899739-D07D-49A0-AF23-E1BDB9C19E49}"/>
+              </a:ext>
+            </a:extLst>
+          </p:cNvPr>
+          <p:cNvSpPr txBox="1"/>
+          <p:nvPr/>
+        </p:nvSpPr>
+        <p:spPr>
+          <a:xfrm>
+            <a:off x="449777" y="684009"/>
+            <a:ext cx="4694548" cy="646331"/>
+          </a:xfrm>
+          <a:prstGeom prst="rect">
+            <a:avLst/>
+          </a:prstGeom>
+          <a:noFill/>
+        </p:spPr>
+        <p:txBody>
+          <a:bodyPr wrap="square" rtlCol="0">
+            <a:spAutoFit/>
+          </a:bodyPr>
+          <a:lstStyle/>
+          <a:p>
+            <a:r>
+              <a:rPr lang="en-US" i="1" dirty="0"/>
+              <a:t>“if you were in trouble, do you have someone to count on”</a:t>
+            </a:r>
+          </a:p>
+        </p:txBody>
+      </p:sp>
+      <p:sp>
+        <p:nvSpPr>
+          <p:cNvPr id="12" name="TextBox 11">
+            <a:extLst>
+              <a:ext uri="{FF2B5EF4-FFF2-40B4-BE49-F238E27FC236}">
+                <a16:creationId xmlns:a16="http://schemas.microsoft.com/office/drawing/2014/main" id="{DD45255D-2E10-4090-B1A7-BBC101CACCAC}"/>
+              </a:ext>
+            </a:extLst>
+          </p:cNvPr>
+          <p:cNvSpPr txBox="1"/>
+          <p:nvPr/>
+        </p:nvSpPr>
+        <p:spPr>
+          <a:xfrm>
+            <a:off x="5575950" y="878787"/>
+            <a:ext cx="4251489" cy="646331"/>
+          </a:xfrm>
+          <a:prstGeom prst="rect">
+            <a:avLst/>
+          </a:prstGeom>
+          <a:noFill/>
+        </p:spPr>
+        <p:txBody>
+          <a:bodyPr wrap="square" rtlCol="0">
+            <a:spAutoFit/>
+          </a:bodyPr>
+          <a:lstStyle/>
+          <a:p>
+            <a:r>
+              <a:rPr lang="en-US" i="1" dirty="0"/>
+              <a:t>“have you donated to a charity in the past month?”</a:t>
+            </a:r>
+          </a:p>
+        </p:txBody>
+      </p:sp>
     </p:spTree>
     <p:extLst>
       <p:ext uri="{BB962C8B-B14F-4D97-AF65-F5344CB8AC3E}">
@@ -4724,44 +5179,21 @@
           </a:p>
         </p:txBody>
       </p:sp>
-      <p:sp>
-        <p:nvSpPr>
-          <p:cNvPr id="3" name="Content Placeholder 2">
-            <a:extLst>
-              <a:ext uri="{FF2B5EF4-FFF2-40B4-BE49-F238E27FC236}">
-                <a16:creationId xmlns:a16="http://schemas.microsoft.com/office/drawing/2014/main" id="{3F45286B-44EE-4094-B888-8DE8DD77CEA1}"/>
-              </a:ext>
-            </a:extLst>
-          </p:cNvPr>
-          <p:cNvSpPr>
-            <a:spLocks noGrp="1"/>
-          </p:cNvSpPr>
-          <p:nvPr>
-            <p:ph idx="1"/>
-          </p:nvPr>
-        </p:nvSpPr>
-        <p:spPr/>
-        <p:txBody>
-          <a:bodyPr/>
-          <a:lstStyle/>
-          <a:p>
-            <a:endParaRPr lang="en-US"/>
-          </a:p>
-        </p:txBody>
-      </p:sp>
       <p:pic>
         <p:nvPicPr>
-          <p:cNvPr id="7" name="Picture 6">
-            <a:extLst>
-              <a:ext uri="{FF2B5EF4-FFF2-40B4-BE49-F238E27FC236}">
-                <a16:creationId xmlns:a16="http://schemas.microsoft.com/office/drawing/2014/main" id="{7C3D8F98-4FB4-4406-9194-B803D216FC50}"/>
+          <p:cNvPr id="5" name="Content Placeholder 4">
+            <a:extLst>
+              <a:ext uri="{FF2B5EF4-FFF2-40B4-BE49-F238E27FC236}">
+                <a16:creationId xmlns:a16="http://schemas.microsoft.com/office/drawing/2014/main" id="{C1DB05DB-995C-4974-9A76-100C1A36C908}"/>
               </a:ext>
             </a:extLst>
           </p:cNvPr>
           <p:cNvPicPr>
-            <a:picLocks noChangeAspect="1"/>
+            <a:picLocks noGrp="1" noChangeAspect="1"/>
           </p:cNvPicPr>
-          <p:nvPr/>
+          <p:nvPr>
+            <p:ph idx="1"/>
+          </p:nvPr>
         </p:nvPicPr>
         <p:blipFill>
           <a:blip r:embed="rId2"/>
@@ -4771,6 +5203,33 @@
         </p:blipFill>
         <p:spPr>
           <a:xfrm>
+            <a:off x="720937" y="2006600"/>
+            <a:ext cx="3739091" cy="3760788"/>
+          </a:xfrm>
+        </p:spPr>
+      </p:pic>
+      <p:pic>
+        <p:nvPicPr>
+          <p:cNvPr id="7" name="Picture 6">
+            <a:extLst>
+              <a:ext uri="{FF2B5EF4-FFF2-40B4-BE49-F238E27FC236}">
+                <a16:creationId xmlns:a16="http://schemas.microsoft.com/office/drawing/2014/main" id="{7C3D8F98-4FB4-4406-9194-B803D216FC50}"/>
+              </a:ext>
+            </a:extLst>
+          </p:cNvPr>
+          <p:cNvPicPr>
+            <a:picLocks noChangeAspect="1"/>
+          </p:cNvPicPr>
+          <p:nvPr/>
+        </p:nvPicPr>
+        <p:blipFill>
+          <a:blip r:embed="rId3"/>
+          <a:stretch>
+            <a:fillRect/>
+          </a:stretch>
+        </p:blipFill>
+        <p:spPr>
+          <a:xfrm>
             <a:off x="8735110" y="169643"/>
             <a:ext cx="2591162" cy="1638529"/>
           </a:xfrm>
@@ -4779,6 +5238,141 @@
           </a:prstGeom>
         </p:spPr>
       </p:pic>
+      <p:sp>
+        <p:nvSpPr>
+          <p:cNvPr id="8" name="TextBox 7">
+            <a:extLst>
+              <a:ext uri="{FF2B5EF4-FFF2-40B4-BE49-F238E27FC236}">
+                <a16:creationId xmlns:a16="http://schemas.microsoft.com/office/drawing/2014/main" id="{FC4DCC5A-DE60-4551-9F06-B80593C45BC0}"/>
+              </a:ext>
+            </a:extLst>
+          </p:cNvPr>
+          <p:cNvSpPr txBox="1"/>
+          <p:nvPr/>
+        </p:nvSpPr>
+        <p:spPr>
+          <a:xfrm>
+            <a:off x="4622276" y="2345194"/>
+            <a:ext cx="6533404" cy="3293209"/>
+          </a:xfrm>
+          <a:prstGeom prst="rect">
+            <a:avLst/>
+          </a:prstGeom>
+          <a:noFill/>
+        </p:spPr>
+        <p:txBody>
+          <a:bodyPr wrap="square">
+            <a:spAutoFit/>
+          </a:bodyPr>
+          <a:lstStyle/>
+          <a:p>
+            <a:pPr>
+              <a:buFont typeface="Arial" panose="020B0604020202020204" pitchFamily="34" charset="0"/>
+              <a:buChar char="•"/>
+            </a:pPr>
+            <a:r>
+              <a:rPr lang="en-US" sz="1600" b="1" i="0" dirty="0">
+                <a:solidFill>
+                  <a:srgbClr val="000000"/>
+                </a:solidFill>
+                <a:effectLst/>
+                <a:highlight>
+                  <a:srgbClr val="FFFF00"/>
+                </a:highlight>
+                <a:latin typeface="Helvetica Neue"/>
+              </a:rPr>
+              <a:t>Parliamentary</a:t>
+            </a:r>
+            <a:r>
+              <a:rPr lang="en-US" sz="1600" b="0" i="0" dirty="0">
+                <a:solidFill>
+                  <a:srgbClr val="000000"/>
+                </a:solidFill>
+                <a:effectLst/>
+                <a:latin typeface="Helvetica Neue"/>
+              </a:rPr>
+              <a:t>- Countries in which the legislature elects the chief executive. </a:t>
+            </a:r>
+            <a:r>
+              <a:rPr lang="en-US" sz="1600" dirty="0">
+                <a:solidFill>
+                  <a:srgbClr val="000000"/>
+                </a:solidFill>
+                <a:latin typeface="Helvetica Neue"/>
+              </a:rPr>
+              <a:t>I</a:t>
+            </a:r>
+            <a:r>
+              <a:rPr lang="en-US" sz="1600" b="0" i="0" dirty="0">
+                <a:solidFill>
+                  <a:srgbClr val="000000"/>
+                </a:solidFill>
+                <a:effectLst/>
+                <a:latin typeface="Helvetica Neue"/>
+              </a:rPr>
+              <a:t>n this system, the executive and legislative branches of government are combined and the political head of state is chosen from within the legislature</a:t>
+            </a:r>
+          </a:p>
+          <a:p>
+            <a:pPr algn="l">
+              <a:buFont typeface="Arial" panose="020B0604020202020204" pitchFamily="34" charset="0"/>
+              <a:buChar char="•"/>
+            </a:pPr>
+            <a:r>
+              <a:rPr lang="en-US" sz="1600" b="1" i="0" dirty="0">
+                <a:solidFill>
+                  <a:srgbClr val="000000"/>
+                </a:solidFill>
+                <a:effectLst/>
+                <a:highlight>
+                  <a:srgbClr val="FFFF00"/>
+                </a:highlight>
+                <a:latin typeface="Helvetica Neue"/>
+              </a:rPr>
+              <a:t>Direct Presidential </a:t>
+            </a:r>
+            <a:r>
+              <a:rPr lang="en-US" sz="1600" b="0" i="0" dirty="0">
+                <a:solidFill>
+                  <a:srgbClr val="000000"/>
+                </a:solidFill>
+                <a:effectLst/>
+                <a:latin typeface="Helvetica Neue"/>
+              </a:rPr>
+              <a:t>- chief executive is chosen by the people to serve a limited term in office with a distinct separation of powers (the executive branch) as well as specific limitations on exactly what he/she can do while in office. Systems with presidents who are elected directly or by an electoral college #(whose only function is to elect the president) and in cases where there is no prime minister</a:t>
+            </a:r>
+          </a:p>
+          <a:p>
+            <a:pPr algn="l">
+              <a:buFont typeface="Arial" panose="020B0604020202020204" pitchFamily="34" charset="0"/>
+              <a:buChar char="•"/>
+            </a:pPr>
+            <a:r>
+              <a:rPr lang="en-US" sz="1600" b="1" i="0" dirty="0">
+                <a:solidFill>
+                  <a:srgbClr val="000000"/>
+                </a:solidFill>
+                <a:effectLst/>
+                <a:highlight>
+                  <a:srgbClr val="FFFF00"/>
+                </a:highlight>
+                <a:latin typeface="Helvetica Neue"/>
+              </a:rPr>
+              <a:t>Assembly-elected President </a:t>
+            </a:r>
+            <a:r>
+              <a:rPr lang="en-US" sz="1600" b="0" i="0" dirty="0">
+                <a:solidFill>
+                  <a:srgbClr val="000000"/>
+                </a:solidFill>
+                <a:effectLst/>
+                <a:latin typeface="Helvetica Neue"/>
+              </a:rPr>
+              <a:t>- any means of executive selection not involving A Direct Or Indirect mandate from An electorate when that assembly or group cannot easily recall them.</a:t>
+            </a:r>
+          </a:p>
+        </p:txBody>
+      </p:sp>
     </p:spTree>
     <p:extLst>
       <p:ext uri="{BB962C8B-B14F-4D97-AF65-F5344CB8AC3E}">
@@ -5350,7 +5944,6 @@
             <a:r>
               <a:rPr lang="en-US" b="0" i="0" dirty="0">
                 <a:effectLst/>
-                <a:latin typeface="Arial" panose="020B0604020202020204" pitchFamily="34" charset="0"/>
               </a:rPr>
               <a:t>Our goal is to understand, on a data-driven level, the factors contributing to and correlated with happiness. We are motivated to know what makes for a happy country. We have examined the relationships between several metrics of individual countries or regions and their happiness scores or ranks to determine their influences and effects.</a:t>
             </a:r>
@@ -6928,7 +7521,7 @@
               <a:rPr lang="en-US" b="0" i="0" dirty="0">
                 <a:effectLst/>
               </a:rPr>
-              <a:t>six factors – economic production, social support, life expectancy, freedom, absence of corruption, and generosity </a:t>
+              <a:t>six factors – economic production, social support, life expectancy, freedom, absence of corruption, and generosity. </a:t>
             </a:r>
           </a:p>
           <a:p>
@@ -6958,7 +7551,7 @@
         </p:blipFill>
         <p:spPr>
           <a:xfrm>
-            <a:off x="1036320" y="3258312"/>
+            <a:off x="165124" y="3160776"/>
             <a:ext cx="3096779" cy="2381352"/>
           </a:xfrm>
           <a:prstGeom prst="rect">
@@ -6966,12 +7559,47 @@
           </a:prstGeom>
         </p:spPr>
       </p:pic>
+      <p:sp>
+        <p:nvSpPr>
+          <p:cNvPr id="10" name="TextBox 9">
+            <a:extLst>
+              <a:ext uri="{FF2B5EF4-FFF2-40B4-BE49-F238E27FC236}">
+                <a16:creationId xmlns:a16="http://schemas.microsoft.com/office/drawing/2014/main" id="{4DCDDC07-EE6D-45CB-9C81-D691DBF98263}"/>
+              </a:ext>
+            </a:extLst>
+          </p:cNvPr>
+          <p:cNvSpPr txBox="1"/>
+          <p:nvPr/>
+        </p:nvSpPr>
+        <p:spPr>
+          <a:xfrm>
+            <a:off x="250235" y="5357135"/>
+            <a:ext cx="1876425" cy="830997"/>
+          </a:xfrm>
+          <a:prstGeom prst="rect">
+            <a:avLst/>
+          </a:prstGeom>
+          <a:noFill/>
+        </p:spPr>
+        <p:txBody>
+          <a:bodyPr wrap="square" rtlCol="0">
+            <a:spAutoFit/>
+          </a:bodyPr>
+          <a:lstStyle/>
+          <a:p>
+            <a:r>
+              <a:rPr lang="en-US" sz="1600" b="1" dirty="0"/>
+              <a:t>Happiness breakdown per score </a:t>
+            </a:r>
+          </a:p>
+        </p:txBody>
+      </p:sp>
       <p:pic>
         <p:nvPicPr>
-          <p:cNvPr id="7" name="Picture 6">
-            <a:extLst>
-              <a:ext uri="{FF2B5EF4-FFF2-40B4-BE49-F238E27FC236}">
-                <a16:creationId xmlns:a16="http://schemas.microsoft.com/office/drawing/2014/main" id="{5A008F43-6C65-47EC-AA4C-059E6A6FACD0}"/>
+          <p:cNvPr id="6" name="Picture 5">
+            <a:extLst>
+              <a:ext uri="{FF2B5EF4-FFF2-40B4-BE49-F238E27FC236}">
+                <a16:creationId xmlns:a16="http://schemas.microsoft.com/office/drawing/2014/main" id="{AEC192F8-2823-4D92-8CAE-0D57B7F68E57}"/>
               </a:ext>
             </a:extLst>
           </p:cNvPr>
@@ -6988,8 +7616,8 @@
         </p:blipFill>
         <p:spPr>
           <a:xfrm>
-            <a:off x="3811547" y="3094830"/>
-            <a:ext cx="3990389" cy="2610780"/>
+            <a:off x="3058816" y="3021621"/>
+            <a:ext cx="4149682" cy="3308752"/>
           </a:xfrm>
           <a:prstGeom prst="rect">
             <a:avLst/>
@@ -6998,10 +7626,10 @@
       </p:pic>
       <p:pic>
         <p:nvPicPr>
-          <p:cNvPr id="9" name="Picture 8">
-            <a:extLst>
-              <a:ext uri="{FF2B5EF4-FFF2-40B4-BE49-F238E27FC236}">
-                <a16:creationId xmlns:a16="http://schemas.microsoft.com/office/drawing/2014/main" id="{43868FFA-C650-4BE6-AB27-48DBE06CD4AE}"/>
+          <p:cNvPr id="11" name="Picture 10">
+            <a:extLst>
+              <a:ext uri="{FF2B5EF4-FFF2-40B4-BE49-F238E27FC236}">
+                <a16:creationId xmlns:a16="http://schemas.microsoft.com/office/drawing/2014/main" id="{B5F02E17-6644-4AC2-8963-E07D07943E39}"/>
               </a:ext>
             </a:extLst>
           </p:cNvPr>
@@ -7018,49 +7646,14 @@
         </p:blipFill>
         <p:spPr>
           <a:xfrm>
-            <a:off x="7480384" y="3034574"/>
-            <a:ext cx="3614336" cy="2507554"/>
+            <a:off x="7102064" y="2950501"/>
+            <a:ext cx="4135940" cy="3308752"/>
           </a:xfrm>
           <a:prstGeom prst="rect">
             <a:avLst/>
           </a:prstGeom>
         </p:spPr>
       </p:pic>
-      <p:sp>
-        <p:nvSpPr>
-          <p:cNvPr id="10" name="TextBox 9">
-            <a:extLst>
-              <a:ext uri="{FF2B5EF4-FFF2-40B4-BE49-F238E27FC236}">
-                <a16:creationId xmlns:a16="http://schemas.microsoft.com/office/drawing/2014/main" id="{4DCDDC07-EE6D-45CB-9C81-D691DBF98263}"/>
-              </a:ext>
-            </a:extLst>
-          </p:cNvPr>
-          <p:cNvSpPr txBox="1"/>
-          <p:nvPr/>
-        </p:nvSpPr>
-        <p:spPr>
-          <a:xfrm>
-            <a:off x="1874162" y="5357135"/>
-            <a:ext cx="1876425" cy="830997"/>
-          </a:xfrm>
-          <a:prstGeom prst="rect">
-            <a:avLst/>
-          </a:prstGeom>
-          <a:noFill/>
-        </p:spPr>
-        <p:txBody>
-          <a:bodyPr wrap="square" rtlCol="0">
-            <a:spAutoFit/>
-          </a:bodyPr>
-          <a:lstStyle/>
-          <a:p>
-            <a:r>
-              <a:rPr lang="en-US" sz="1600" b="1" dirty="0"/>
-              <a:t>Happiness breakdown per score </a:t>
-            </a:r>
-          </a:p>
-        </p:txBody>
-      </p:sp>
     </p:spTree>
     <p:extLst>
       <p:ext uri="{BB962C8B-B14F-4D97-AF65-F5344CB8AC3E}">
@@ -7705,15 +8298,6 @@
 </file>
 
 <file path=customXml/item2.xml><?xml version="1.0" encoding="utf-8"?>
-<?mso-contentType ?>
-<FormTemplates xmlns="http://schemas.microsoft.com/sharepoint/v3/contenttype/forms">
-  <Display>DocumentLibraryForm</Display>
-  <Edit>DocumentLibraryForm</Edit>
-  <New>DocumentLibraryForm</New>
-</FormTemplates>
-</file>
-
-<file path=customXml/item3.xml><?xml version="1.0" encoding="utf-8"?>
 <ct:contentTypeSchema xmlns:ct="http://schemas.microsoft.com/office/2006/metadata/contentType" xmlns:ma="http://schemas.microsoft.com/office/2006/metadata/properties/metaAttributes" ct:_="" ma:_="" ma:contentTypeName="Document" ma:contentTypeID="0x01010079F111ED35F8CC479449609E8A0923A6" ma:contentTypeVersion="12" ma:contentTypeDescription="Create a new document." ma:contentTypeScope="" ma:versionID="a410dd7f93c95333ffa1b60ed6adedd1">
   <xsd:schema xmlns:xsd="http://www.w3.org/2001/XMLSchema" xmlns:xs="http://www.w3.org/2001/XMLSchema" xmlns:p="http://schemas.microsoft.com/office/2006/metadata/properties" xmlns:ns2="71af3243-3dd4-4a8d-8c0d-dd76da1f02a5" xmlns:ns3="16c05727-aa75-4e4a-9b5f-8a80a1165891" targetNamespace="http://schemas.microsoft.com/office/2006/metadata/properties" ma:root="true" ma:fieldsID="a936d9baba76aa3866493feff160faab" ns2:_="" ns3:_="">
     <xsd:import namespace="71af3243-3dd4-4a8d-8c0d-dd76da1f02a5"/>
@@ -7934,6 +8518,15 @@
 </ct:contentTypeSchema>
 </file>
 
+<file path=customXml/item3.xml><?xml version="1.0" encoding="utf-8"?>
+<?mso-contentType ?>
+<FormTemplates xmlns="http://schemas.microsoft.com/sharepoint/v3/contenttype/forms">
+  <Display>DocumentLibraryForm</Display>
+  <Edit>DocumentLibraryForm</Edit>
+  <New>DocumentLibraryForm</New>
+</FormTemplates>
+</file>
+
 <file path=customXml/itemProps1.xml><?xml version="1.0" encoding="utf-8"?>
 <ds:datastoreItem xmlns:ds="http://schemas.openxmlformats.org/officeDocument/2006/customXml" ds:itemID="{8F3CD65D-61A5-43C9-A837-6EC73C7DA8AB}">
   <ds:schemaRefs>
@@ -7945,14 +8538,6 @@
 </file>
 
 <file path=customXml/itemProps2.xml><?xml version="1.0" encoding="utf-8"?>
-<ds:datastoreItem xmlns:ds="http://schemas.openxmlformats.org/officeDocument/2006/customXml" ds:itemID="{31F006B4-A9E1-4F39-85C8-FB836F919348}">
-  <ds:schemaRefs>
-    <ds:schemaRef ds:uri="http://schemas.microsoft.com/sharepoint/v3/contenttype/forms"/>
-  </ds:schemaRefs>
-</ds:datastoreItem>
-</file>
-
-<file path=customXml/itemProps3.xml><?xml version="1.0" encoding="utf-8"?>
 <ds:datastoreItem xmlns:ds="http://schemas.openxmlformats.org/officeDocument/2006/customXml" ds:itemID="{16377351-63A1-4C2E-8C9A-66CDD70F16AC}">
   <ds:schemaRefs>
     <ds:schemaRef ds:uri="http://schemas.microsoft.com/office/2006/metadata/contentType"/>
@@ -7969,4 +8554,12 @@
     <ds:schemaRef ds:uri="http://schemas.microsoft.com/internal/obd"/>
   </ds:schemaRefs>
 </ds:datastoreItem>
+</file>
+
+<file path=customXml/itemProps3.xml><?xml version="1.0" encoding="utf-8"?>
+<ds:datastoreItem xmlns:ds="http://schemas.openxmlformats.org/officeDocument/2006/customXml" ds:itemID="{31F006B4-A9E1-4F39-85C8-FB836F919348}">
+  <ds:schemaRefs>
+    <ds:schemaRef ds:uri="http://schemas.microsoft.com/sharepoint/v3/contenttype/forms"/>
+  </ds:schemaRefs>
+</ds:datastoreItem>
 </file>
</xml_diff>

<commit_message>
Updates to Analysis Doc and PPT
</commit_message>
<xml_diff>
--- a/Anaconda_Results_Presentation.pptx
+++ b/Anaconda_Results_Presentation.pptx
@@ -5,7 +5,7 @@
     <p:sldMasterId id="2147483660" r:id="rId4"/>
   </p:sldMasterIdLst>
   <p:notesMasterIdLst>
-    <p:notesMasterId r:id="rId22"/>
+    <p:notesMasterId r:id="rId24"/>
   </p:notesMasterIdLst>
   <p:sldIdLst>
     <p:sldId id="266" r:id="rId5"/>
@@ -17,14 +17,16 @@
     <p:sldId id="313" r:id="rId11"/>
     <p:sldId id="326" r:id="rId12"/>
     <p:sldId id="322" r:id="rId13"/>
-    <p:sldId id="327" r:id="rId14"/>
-    <p:sldId id="315" r:id="rId15"/>
-    <p:sldId id="318" r:id="rId16"/>
-    <p:sldId id="319" r:id="rId17"/>
-    <p:sldId id="316" r:id="rId18"/>
-    <p:sldId id="314" r:id="rId19"/>
-    <p:sldId id="321" r:id="rId20"/>
-    <p:sldId id="325" r:id="rId21"/>
+    <p:sldId id="315" r:id="rId14"/>
+    <p:sldId id="318" r:id="rId15"/>
+    <p:sldId id="319" r:id="rId16"/>
+    <p:sldId id="316" r:id="rId17"/>
+    <p:sldId id="314" r:id="rId18"/>
+    <p:sldId id="321" r:id="rId19"/>
+    <p:sldId id="325" r:id="rId20"/>
+    <p:sldId id="329" r:id="rId21"/>
+    <p:sldId id="327" r:id="rId22"/>
+    <p:sldId id="330" r:id="rId23"/>
   </p:sldIdLst>
   <p:sldSz cx="12192000" cy="6858000"/>
   <p:notesSz cx="6858000" cy="9144000"/>
@@ -615,29 +617,10 @@
           <a:lstStyle/>
           <a:p>
             <a:r>
-              <a:rPr lang="en-US" dirty="0"/>
-              <a:t>Bismaad:</a:t>
-            </a:r>
-          </a:p>
-          <a:p>
-            <a:pPr marL="171450" indent="-171450">
-              <a:buFont typeface="Arial" panose="020B0604020202020204" pitchFamily="34" charset="0"/>
-              <a:buChar char="•"/>
-            </a:pPr>
-            <a:r>
-              <a:rPr lang="en-US" dirty="0"/>
-              <a:t>A majority of the countries in the dataset have scores between 5.0 and 5.9</a:t>
-            </a:r>
-          </a:p>
-          <a:p>
-            <a:pPr marL="171450" indent="-171450">
-              <a:buFont typeface="Arial" panose="020B0604020202020204" pitchFamily="34" charset="0"/>
-              <a:buChar char="•"/>
-            </a:pPr>
-            <a:r>
-              <a:rPr lang="en-US" dirty="0"/>
-              <a:t>The graphs in the right show the changes in Happiness Scores for the 10 countries with the highest average happiness score and 10 countries with the lowest average happiness score</a:t>
-            </a:r>
+              <a:rPr lang="en-US" dirty="0" err="1"/>
+              <a:t>Bismaad</a:t>
+            </a:r>
+            <a:endParaRPr lang="en-US" dirty="0"/>
           </a:p>
         </p:txBody>
       </p:sp>
@@ -667,7 +650,7 @@
     </p:spTree>
     <p:extLst>
       <p:ext uri="{BB962C8B-B14F-4D97-AF65-F5344CB8AC3E}">
-        <p14:creationId xmlns:p14="http://schemas.microsoft.com/office/powerpoint/2010/main" val="1262717548"/>
+        <p14:creationId xmlns:p14="http://schemas.microsoft.com/office/powerpoint/2010/main" val="25554446"/>
       </p:ext>
     </p:extLst>
   </p:cSld>
@@ -723,7 +706,7 @@
           <a:p>
             <a:r>
               <a:rPr lang="en-US" dirty="0" err="1"/>
-              <a:t>Bismaad</a:t>
+              <a:t>Caitilin</a:t>
             </a:r>
             <a:endParaRPr lang="en-US" dirty="0"/>
           </a:p>
@@ -755,7 +738,7 @@
     </p:spTree>
     <p:extLst>
       <p:ext uri="{BB962C8B-B14F-4D97-AF65-F5344CB8AC3E}">
-        <p14:creationId xmlns:p14="http://schemas.microsoft.com/office/powerpoint/2010/main" val="25554446"/>
+        <p14:creationId xmlns:p14="http://schemas.microsoft.com/office/powerpoint/2010/main" val="54778116"/>
       </p:ext>
     </p:extLst>
   </p:cSld>
@@ -810,10 +793,9 @@
           <a:lstStyle/>
           <a:p>
             <a:r>
-              <a:rPr lang="en-US" dirty="0" err="1"/>
-              <a:t>Caitilin</a:t>
-            </a:r>
-            <a:endParaRPr lang="en-US" dirty="0"/>
+              <a:rPr lang="en-US" dirty="0"/>
+              <a:t>Letha Change graph label to avg social support and move happiness to Y axis </a:t>
+            </a:r>
           </a:p>
         </p:txBody>
       </p:sp>
@@ -843,7 +825,7 @@
     </p:spTree>
     <p:extLst>
       <p:ext uri="{BB962C8B-B14F-4D97-AF65-F5344CB8AC3E}">
-        <p14:creationId xmlns:p14="http://schemas.microsoft.com/office/powerpoint/2010/main" val="54778116"/>
+        <p14:creationId xmlns:p14="http://schemas.microsoft.com/office/powerpoint/2010/main" val="3747890149"/>
       </p:ext>
     </p:extLst>
   </p:cSld>
@@ -899,7 +881,15 @@
           <a:p>
             <a:r>
               <a:rPr lang="en-US" dirty="0"/>
-              <a:t>Letha Change graph label to avg social support and move happiness to Y axis </a:t>
+              <a:t>Sara – update assembly elected </a:t>
+            </a:r>
+            <a:r>
+              <a:rPr lang="en-US" dirty="0" err="1"/>
+              <a:t>pres</a:t>
+            </a:r>
+            <a:r>
+              <a:rPr lang="en-US" dirty="0"/>
+              <a:t> info</a:t>
             </a:r>
           </a:p>
         </p:txBody>
@@ -930,7 +920,7 @@
     </p:spTree>
     <p:extLst>
       <p:ext uri="{BB962C8B-B14F-4D97-AF65-F5344CB8AC3E}">
-        <p14:creationId xmlns:p14="http://schemas.microsoft.com/office/powerpoint/2010/main" val="3747890149"/>
+        <p14:creationId xmlns:p14="http://schemas.microsoft.com/office/powerpoint/2010/main" val="333131421"/>
       </p:ext>
     </p:extLst>
   </p:cSld>
@@ -986,15 +976,7 @@
           <a:p>
             <a:r>
               <a:rPr lang="en-US" dirty="0"/>
-              <a:t>Sara – update assembly elected </a:t>
-            </a:r>
-            <a:r>
-              <a:rPr lang="en-US" dirty="0" err="1"/>
-              <a:t>pres</a:t>
-            </a:r>
-            <a:r>
-              <a:rPr lang="en-US" dirty="0"/>
-              <a:t> info</a:t>
+              <a:t>Regine -Add labels for scatter plot or pick a country and show the weather – add in happiness level by region (top 5) </a:t>
             </a:r>
           </a:p>
         </p:txBody>
@@ -1025,7 +1007,7 @@
     </p:spTree>
     <p:extLst>
       <p:ext uri="{BB962C8B-B14F-4D97-AF65-F5344CB8AC3E}">
-        <p14:creationId xmlns:p14="http://schemas.microsoft.com/office/powerpoint/2010/main" val="333131421"/>
+        <p14:creationId xmlns:p14="http://schemas.microsoft.com/office/powerpoint/2010/main" val="2385568582"/>
       </p:ext>
     </p:extLst>
   </p:cSld>
@@ -1080,9 +1062,10 @@
           <a:lstStyle/>
           <a:p>
             <a:r>
-              <a:rPr lang="en-US" dirty="0"/>
-              <a:t>Regine -Add labels for scatter plot or pick a country and show the weather – add in happiness level by region (top 5) </a:t>
-            </a:r>
+              <a:rPr lang="en-US" dirty="0" err="1"/>
+              <a:t>Caitilin</a:t>
+            </a:r>
+            <a:endParaRPr lang="en-US" dirty="0"/>
           </a:p>
         </p:txBody>
       </p:sp>
@@ -1112,7 +1095,7 @@
     </p:spTree>
     <p:extLst>
       <p:ext uri="{BB962C8B-B14F-4D97-AF65-F5344CB8AC3E}">
-        <p14:creationId xmlns:p14="http://schemas.microsoft.com/office/powerpoint/2010/main" val="2385568582"/>
+        <p14:creationId xmlns:p14="http://schemas.microsoft.com/office/powerpoint/2010/main" val="3760327276"/>
       </p:ext>
     </p:extLst>
   </p:cSld>
@@ -1200,7 +1183,7 @@
     </p:spTree>
     <p:extLst>
       <p:ext uri="{BB962C8B-B14F-4D97-AF65-F5344CB8AC3E}">
-        <p14:creationId xmlns:p14="http://schemas.microsoft.com/office/powerpoint/2010/main" val="3760327276"/>
+        <p14:creationId xmlns:p14="http://schemas.microsoft.com/office/powerpoint/2010/main" val="3300698959"/>
       </p:ext>
     </p:extLst>
   </p:cSld>
@@ -1288,7 +1271,270 @@
     </p:spTree>
     <p:extLst>
       <p:ext uri="{BB962C8B-B14F-4D97-AF65-F5344CB8AC3E}">
-        <p14:creationId xmlns:p14="http://schemas.microsoft.com/office/powerpoint/2010/main" val="3300698959"/>
+        <p14:creationId xmlns:p14="http://schemas.microsoft.com/office/powerpoint/2010/main" val="2843158948"/>
+      </p:ext>
+    </p:extLst>
+  </p:cSld>
+  <p:clrMapOvr>
+    <a:masterClrMapping/>
+  </p:clrMapOvr>
+</p:notes>
+</file>
+
+<file path=ppt/notesSlides/notesSlide18.xml><?xml version="1.0" encoding="utf-8"?>
+<p:notes xmlns:a="http://schemas.openxmlformats.org/drawingml/2006/main" xmlns:r="http://schemas.openxmlformats.org/officeDocument/2006/relationships" xmlns:p="http://schemas.openxmlformats.org/presentationml/2006/main">
+  <p:cSld>
+    <p:spTree>
+      <p:nvGrpSpPr>
+        <p:cNvPr id="1" name=""/>
+        <p:cNvGrpSpPr/>
+        <p:nvPr/>
+      </p:nvGrpSpPr>
+      <p:grpSpPr>
+        <a:xfrm>
+          <a:off x="0" y="0"/>
+          <a:ext cx="0" cy="0"/>
+          <a:chOff x="0" y="0"/>
+          <a:chExt cx="0" cy="0"/>
+        </a:xfrm>
+      </p:grpSpPr>
+      <p:sp>
+        <p:nvSpPr>
+          <p:cNvPr id="2" name="Slide Image Placeholder 1"/>
+          <p:cNvSpPr>
+            <a:spLocks noGrp="1" noRot="1" noChangeAspect="1"/>
+          </p:cNvSpPr>
+          <p:nvPr>
+            <p:ph type="sldImg"/>
+          </p:nvPr>
+        </p:nvSpPr>
+        <p:spPr/>
+      </p:sp>
+      <p:sp>
+        <p:nvSpPr>
+          <p:cNvPr id="3" name="Notes Placeholder 2"/>
+          <p:cNvSpPr>
+            <a:spLocks noGrp="1"/>
+          </p:cNvSpPr>
+          <p:nvPr>
+            <p:ph type="body" idx="1"/>
+          </p:nvPr>
+        </p:nvSpPr>
+        <p:spPr/>
+        <p:txBody>
+          <a:bodyPr/>
+          <a:lstStyle/>
+          <a:p>
+            <a:r>
+              <a:rPr lang="en-US" dirty="0"/>
+              <a:t>Bismaad:</a:t>
+            </a:r>
+          </a:p>
+          <a:p>
+            <a:pPr marL="171450" indent="-171450">
+              <a:buFont typeface="Arial" panose="020B0604020202020204" pitchFamily="34" charset="0"/>
+              <a:buChar char="•"/>
+            </a:pPr>
+            <a:r>
+              <a:rPr lang="en-US" dirty="0"/>
+              <a:t>A majority of the countries in the dataset have scores between 5.0 and 5.9</a:t>
+            </a:r>
+          </a:p>
+          <a:p>
+            <a:pPr marL="171450" indent="-171450">
+              <a:buFont typeface="Arial" panose="020B0604020202020204" pitchFamily="34" charset="0"/>
+              <a:buChar char="•"/>
+            </a:pPr>
+            <a:r>
+              <a:rPr lang="en-US" dirty="0"/>
+              <a:t>The graphs in the right show the changes in Happiness Scores for the 10 countries with the highest average happiness score and 10 countries with the lowest average happiness score</a:t>
+            </a:r>
+          </a:p>
+        </p:txBody>
+      </p:sp>
+      <p:sp>
+        <p:nvSpPr>
+          <p:cNvPr id="4" name="Slide Number Placeholder 3"/>
+          <p:cNvSpPr>
+            <a:spLocks noGrp="1"/>
+          </p:cNvSpPr>
+          <p:nvPr>
+            <p:ph type="sldNum" sz="quarter" idx="5"/>
+          </p:nvPr>
+        </p:nvSpPr>
+        <p:spPr/>
+        <p:txBody>
+          <a:bodyPr/>
+          <a:lstStyle/>
+          <a:p>
+            <a:fld id="{324829E9-F6A8-4625-9F43-B0C3F979AFB3}" type="slidenum">
+              <a:rPr lang="en-US" smtClean="0"/>
+              <a:t>18</a:t>
+            </a:fld>
+            <a:endParaRPr lang="en-US"/>
+          </a:p>
+        </p:txBody>
+      </p:sp>
+    </p:spTree>
+    <p:extLst>
+      <p:ext uri="{BB962C8B-B14F-4D97-AF65-F5344CB8AC3E}">
+        <p14:creationId xmlns:p14="http://schemas.microsoft.com/office/powerpoint/2010/main" val="1262717548"/>
+      </p:ext>
+    </p:extLst>
+  </p:cSld>
+  <p:clrMapOvr>
+    <a:masterClrMapping/>
+  </p:clrMapOvr>
+</p:notes>
+</file>
+
+<file path=ppt/notesSlides/notesSlide19.xml><?xml version="1.0" encoding="utf-8"?>
+<p:notes xmlns:a="http://schemas.openxmlformats.org/drawingml/2006/main" xmlns:r="http://schemas.openxmlformats.org/officeDocument/2006/relationships" xmlns:p="http://schemas.openxmlformats.org/presentationml/2006/main">
+  <p:cSld>
+    <p:spTree>
+      <p:nvGrpSpPr>
+        <p:cNvPr id="1" name=""/>
+        <p:cNvGrpSpPr/>
+        <p:nvPr/>
+      </p:nvGrpSpPr>
+      <p:grpSpPr>
+        <a:xfrm>
+          <a:off x="0" y="0"/>
+          <a:ext cx="0" cy="0"/>
+          <a:chOff x="0" y="0"/>
+          <a:chExt cx="0" cy="0"/>
+        </a:xfrm>
+      </p:grpSpPr>
+      <p:sp>
+        <p:nvSpPr>
+          <p:cNvPr id="2" name="Slide Image Placeholder 1"/>
+          <p:cNvSpPr>
+            <a:spLocks noGrp="1" noRot="1" noChangeAspect="1"/>
+          </p:cNvSpPr>
+          <p:nvPr>
+            <p:ph type="sldImg"/>
+          </p:nvPr>
+        </p:nvSpPr>
+        <p:spPr/>
+      </p:sp>
+      <p:sp>
+        <p:nvSpPr>
+          <p:cNvPr id="3" name="Notes Placeholder 2"/>
+          <p:cNvSpPr>
+            <a:spLocks noGrp="1"/>
+          </p:cNvSpPr>
+          <p:nvPr>
+            <p:ph type="body" idx="1"/>
+          </p:nvPr>
+        </p:nvSpPr>
+        <p:spPr/>
+        <p:txBody>
+          <a:bodyPr/>
+          <a:lstStyle/>
+          <a:p>
+            <a:pPr marL="171450" indent="-171450">
+              <a:buFont typeface="Arial" panose="020B0604020202020204" pitchFamily="34" charset="0"/>
+              <a:buChar char="•"/>
+            </a:pPr>
+            <a:r>
+              <a:rPr lang="en-US" dirty="0"/>
+              <a:t>Substantial differences across regions</a:t>
+            </a:r>
+          </a:p>
+          <a:p>
+            <a:pPr marL="628650" lvl="1" indent="-171450">
+              <a:buFont typeface="Arial" panose="020B0604020202020204" pitchFamily="34" charset="0"/>
+              <a:buChar char="•"/>
+            </a:pPr>
+            <a:r>
+              <a:rPr lang="en-US" dirty="0"/>
+              <a:t>Highest scores are 7.29 (Australia and New Zealand) and 7.17 (North America)</a:t>
+            </a:r>
+          </a:p>
+          <a:p>
+            <a:pPr marL="628650" lvl="1" indent="-171450">
+              <a:buFont typeface="Arial" panose="020B0604020202020204" pitchFamily="34" charset="0"/>
+              <a:buChar char="•"/>
+            </a:pPr>
+            <a:r>
+              <a:rPr lang="en-US" dirty="0"/>
+              <a:t>Lowest scores are 4.19 (Sub-Saharan Africa) and 4.58 (Southern Asia)</a:t>
+            </a:r>
+          </a:p>
+          <a:p>
+            <a:pPr marL="171450" lvl="0" indent="-171450">
+              <a:buFont typeface="Arial" panose="020B0604020202020204" pitchFamily="34" charset="0"/>
+              <a:buChar char="•"/>
+            </a:pPr>
+            <a:r>
+              <a:rPr lang="en-US" dirty="0"/>
+              <a:t>Differences between regions of the world that are next to each other:</a:t>
+            </a:r>
+          </a:p>
+          <a:p>
+            <a:pPr marL="628650" lvl="1" indent="-171450">
+              <a:buFont typeface="Arial" panose="020B0604020202020204" pitchFamily="34" charset="0"/>
+              <a:buChar char="•"/>
+            </a:pPr>
+            <a:r>
+              <a:rPr lang="en-US" dirty="0"/>
+              <a:t>Western Europe = 6.79</a:t>
+            </a:r>
+          </a:p>
+          <a:p>
+            <a:pPr marL="628650" lvl="1" indent="-171450">
+              <a:buFont typeface="Arial" panose="020B0604020202020204" pitchFamily="34" charset="0"/>
+              <a:buChar char="•"/>
+            </a:pPr>
+            <a:r>
+              <a:rPr lang="en-US" dirty="0"/>
+              <a:t>Central and Eastern Europe = 5.44</a:t>
+            </a:r>
+          </a:p>
+          <a:p>
+            <a:pPr marL="628650" lvl="1" indent="-171450">
+              <a:buFont typeface="Arial" panose="020B0604020202020204" pitchFamily="34" charset="0"/>
+              <a:buChar char="•"/>
+            </a:pPr>
+            <a:r>
+              <a:rPr lang="en-US" dirty="0"/>
+              <a:t>That is </a:t>
+            </a:r>
+            <a:r>
+              <a:rPr lang="en-US"/>
+              <a:t>an increase of 24.8%</a:t>
+            </a:r>
+            <a:endParaRPr lang="en-US" dirty="0"/>
+          </a:p>
+        </p:txBody>
+      </p:sp>
+      <p:sp>
+        <p:nvSpPr>
+          <p:cNvPr id="4" name="Slide Number Placeholder 3"/>
+          <p:cNvSpPr>
+            <a:spLocks noGrp="1"/>
+          </p:cNvSpPr>
+          <p:nvPr>
+            <p:ph type="sldNum" sz="quarter" idx="5"/>
+          </p:nvPr>
+        </p:nvSpPr>
+        <p:spPr/>
+        <p:txBody>
+          <a:bodyPr/>
+          <a:lstStyle/>
+          <a:p>
+            <a:fld id="{324829E9-F6A8-4625-9F43-B0C3F979AFB3}" type="slidenum">
+              <a:rPr lang="en-US" smtClean="0"/>
+              <a:t>19</a:t>
+            </a:fld>
+            <a:endParaRPr lang="en-US"/>
+          </a:p>
+        </p:txBody>
+      </p:sp>
+    </p:spTree>
+    <p:extLst>
+      <p:ext uri="{BB962C8B-B14F-4D97-AF65-F5344CB8AC3E}">
+        <p14:creationId xmlns:p14="http://schemas.microsoft.com/office/powerpoint/2010/main" val="1017162834"/>
       </p:ext>
     </p:extLst>
   </p:cSld>
@@ -1518,7 +1764,7 @@
           <a:p>
             <a:r>
               <a:rPr lang="en-US" dirty="0"/>
-              <a:t>Letha</a:t>
+              <a:t>Bismaad</a:t>
             </a:r>
           </a:p>
         </p:txBody>
@@ -5491,189 +5737,6 @@
 <file path=ppt/slides/slide10.xml><?xml version="1.0" encoding="utf-8"?>
 <p:sld xmlns:a="http://schemas.openxmlformats.org/drawingml/2006/main" xmlns:r="http://schemas.openxmlformats.org/officeDocument/2006/relationships" xmlns:p="http://schemas.openxmlformats.org/presentationml/2006/main">
   <p:cSld>
-    <p:spTree>
-      <p:nvGrpSpPr>
-        <p:cNvPr id="1" name=""/>
-        <p:cNvGrpSpPr/>
-        <p:nvPr/>
-      </p:nvGrpSpPr>
-      <p:grpSpPr>
-        <a:xfrm>
-          <a:off x="0" y="0"/>
-          <a:ext cx="0" cy="0"/>
-          <a:chOff x="0" y="0"/>
-          <a:chExt cx="0" cy="0"/>
-        </a:xfrm>
-      </p:grpSpPr>
-      <p:sp>
-        <p:nvSpPr>
-          <p:cNvPr id="2" name="Title 1">
-            <a:extLst>
-              <a:ext uri="{FF2B5EF4-FFF2-40B4-BE49-F238E27FC236}">
-                <a16:creationId xmlns:a16="http://schemas.microsoft.com/office/drawing/2014/main" id="{66A7F96A-CE2F-405E-B325-959894CF443E}"/>
-              </a:ext>
-            </a:extLst>
-          </p:cNvPr>
-          <p:cNvSpPr>
-            <a:spLocks noGrp="1"/>
-          </p:cNvSpPr>
-          <p:nvPr>
-            <p:ph type="title"/>
-          </p:nvPr>
-        </p:nvSpPr>
-        <p:spPr/>
-        <p:txBody>
-          <a:bodyPr/>
-          <a:lstStyle/>
-          <a:p>
-            <a:r>
-              <a:rPr lang="en-US"/>
-              <a:t>Happiness Score</a:t>
-            </a:r>
-            <a:endParaRPr lang="en-US" dirty="0"/>
-          </a:p>
-        </p:txBody>
-      </p:sp>
-      <p:sp>
-        <p:nvSpPr>
-          <p:cNvPr id="10" name="TextBox 9">
-            <a:extLst>
-              <a:ext uri="{FF2B5EF4-FFF2-40B4-BE49-F238E27FC236}">
-                <a16:creationId xmlns:a16="http://schemas.microsoft.com/office/drawing/2014/main" id="{4DCDDC07-EE6D-45CB-9C81-D691DBF98263}"/>
-              </a:ext>
-            </a:extLst>
-          </p:cNvPr>
-          <p:cNvSpPr txBox="1"/>
-          <p:nvPr/>
-        </p:nvSpPr>
-        <p:spPr>
-          <a:xfrm>
-            <a:off x="0" y="4124832"/>
-            <a:ext cx="2247363" cy="276999"/>
-          </a:xfrm>
-          <a:prstGeom prst="rect">
-            <a:avLst/>
-          </a:prstGeom>
-          <a:noFill/>
-        </p:spPr>
-        <p:txBody>
-          <a:bodyPr wrap="square" rtlCol="0">
-            <a:spAutoFit/>
-          </a:bodyPr>
-          <a:lstStyle/>
-          <a:p>
-            <a:r>
-              <a:rPr lang="en-US" sz="1200" b="1"/>
-              <a:t>Breakdown of Happiness Score</a:t>
-            </a:r>
-            <a:endParaRPr lang="en-US" sz="1200" b="1" dirty="0"/>
-          </a:p>
-        </p:txBody>
-      </p:sp>
-      <p:pic>
-        <p:nvPicPr>
-          <p:cNvPr id="6" name="Picture 5">
-            <a:extLst>
-              <a:ext uri="{FF2B5EF4-FFF2-40B4-BE49-F238E27FC236}">
-                <a16:creationId xmlns:a16="http://schemas.microsoft.com/office/drawing/2014/main" id="{AEC192F8-2823-4D92-8CAE-0D57B7F68E57}"/>
-              </a:ext>
-            </a:extLst>
-          </p:cNvPr>
-          <p:cNvPicPr>
-            <a:picLocks noChangeAspect="1"/>
-          </p:cNvPicPr>
-          <p:nvPr/>
-        </p:nvPicPr>
-        <p:blipFill rotWithShape="1">
-          <a:blip r:embed="rId3"/>
-          <a:srcRect l="4417" t="3622" r="2080" b="1985"/>
-          <a:stretch/>
-        </p:blipFill>
-        <p:spPr>
-          <a:xfrm>
-            <a:off x="2584508" y="2371242"/>
-            <a:ext cx="4941442" cy="3977519"/>
-          </a:xfrm>
-          <a:prstGeom prst="rect">
-            <a:avLst/>
-          </a:prstGeom>
-        </p:spPr>
-      </p:pic>
-      <p:pic>
-        <p:nvPicPr>
-          <p:cNvPr id="11" name="Picture 10">
-            <a:extLst>
-              <a:ext uri="{FF2B5EF4-FFF2-40B4-BE49-F238E27FC236}">
-                <a16:creationId xmlns:a16="http://schemas.microsoft.com/office/drawing/2014/main" id="{B5F02E17-6644-4AC2-8963-E07D07943E39}"/>
-              </a:ext>
-            </a:extLst>
-          </p:cNvPr>
-          <p:cNvPicPr>
-            <a:picLocks noChangeAspect="1"/>
-          </p:cNvPicPr>
-          <p:nvPr/>
-        </p:nvPicPr>
-        <p:blipFill rotWithShape="1">
-          <a:blip r:embed="rId4"/>
-          <a:srcRect l="4178" t="3863" r="3176" b="1980"/>
-          <a:stretch/>
-        </p:blipFill>
-        <p:spPr>
-          <a:xfrm>
-            <a:off x="7354967" y="2371241"/>
-            <a:ext cx="4837033" cy="3977519"/>
-          </a:xfrm>
-          <a:prstGeom prst="rect">
-            <a:avLst/>
-          </a:prstGeom>
-        </p:spPr>
-      </p:pic>
-      <p:pic>
-        <p:nvPicPr>
-          <p:cNvPr id="9" name="Picture 8">
-            <a:extLst>
-              <a:ext uri="{FF2B5EF4-FFF2-40B4-BE49-F238E27FC236}">
-                <a16:creationId xmlns:a16="http://schemas.microsoft.com/office/drawing/2014/main" id="{4DD3D7F9-9F7D-4648-97D9-DF84E500EF6A}"/>
-              </a:ext>
-            </a:extLst>
-          </p:cNvPr>
-          <p:cNvPicPr>
-            <a:picLocks noChangeAspect="1"/>
-          </p:cNvPicPr>
-          <p:nvPr/>
-        </p:nvPicPr>
-        <p:blipFill>
-          <a:blip r:embed="rId5"/>
-          <a:stretch>
-            <a:fillRect/>
-          </a:stretch>
-        </p:blipFill>
-        <p:spPr>
-          <a:xfrm>
-            <a:off x="0" y="1937362"/>
-            <a:ext cx="2749534" cy="1987468"/>
-          </a:xfrm>
-          <a:prstGeom prst="rect">
-            <a:avLst/>
-          </a:prstGeom>
-        </p:spPr>
-      </p:pic>
-    </p:spTree>
-    <p:extLst>
-      <p:ext uri="{BB962C8B-B14F-4D97-AF65-F5344CB8AC3E}">
-        <p14:creationId xmlns:p14="http://schemas.microsoft.com/office/powerpoint/2010/main" val="38700731"/>
-      </p:ext>
-    </p:extLst>
-  </p:cSld>
-  <p:clrMapOvr>
-    <a:masterClrMapping/>
-  </p:clrMapOvr>
-</p:sld>
-</file>
-
-<file path=ppt/slides/slide11.xml><?xml version="1.0" encoding="utf-8"?>
-<p:sld xmlns:a="http://schemas.openxmlformats.org/drawingml/2006/main" xmlns:r="http://schemas.openxmlformats.org/officeDocument/2006/relationships" xmlns:p="http://schemas.openxmlformats.org/presentationml/2006/main">
-  <p:cSld>
     <p:bg>
       <p:bgPr>
         <a:solidFill>
@@ -6030,6 +6093,299 @@
     <p:extLst>
       <p:ext uri="{BB962C8B-B14F-4D97-AF65-F5344CB8AC3E}">
         <p14:creationId xmlns:p14="http://schemas.microsoft.com/office/powerpoint/2010/main" val="3862462912"/>
+      </p:ext>
+    </p:extLst>
+  </p:cSld>
+  <p:clrMapOvr>
+    <a:masterClrMapping/>
+  </p:clrMapOvr>
+</p:sld>
+</file>
+
+<file path=ppt/slides/slide11.xml><?xml version="1.0" encoding="utf-8"?>
+<p:sld xmlns:a="http://schemas.openxmlformats.org/drawingml/2006/main" xmlns:r="http://schemas.openxmlformats.org/officeDocument/2006/relationships" xmlns:p="http://schemas.openxmlformats.org/presentationml/2006/main">
+  <p:cSld>
+    <p:spTree>
+      <p:nvGrpSpPr>
+        <p:cNvPr id="1" name=""/>
+        <p:cNvGrpSpPr/>
+        <p:nvPr/>
+      </p:nvGrpSpPr>
+      <p:grpSpPr>
+        <a:xfrm>
+          <a:off x="0" y="0"/>
+          <a:ext cx="0" cy="0"/>
+          <a:chOff x="0" y="0"/>
+          <a:chExt cx="0" cy="0"/>
+        </a:xfrm>
+      </p:grpSpPr>
+      <p:pic>
+        <p:nvPicPr>
+          <p:cNvPr id="6" name="Picture 5">
+            <a:extLst>
+              <a:ext uri="{FF2B5EF4-FFF2-40B4-BE49-F238E27FC236}">
+                <a16:creationId xmlns:a16="http://schemas.microsoft.com/office/drawing/2014/main" id="{78DE8D32-9125-44EB-A4A0-A7E1B8D4C11B}"/>
+              </a:ext>
+            </a:extLst>
+          </p:cNvPr>
+          <p:cNvPicPr>
+            <a:picLocks noChangeAspect="1"/>
+          </p:cNvPicPr>
+          <p:nvPr/>
+        </p:nvPicPr>
+        <p:blipFill>
+          <a:blip r:embed="rId3"/>
+          <a:stretch>
+            <a:fillRect/>
+          </a:stretch>
+        </p:blipFill>
+        <p:spPr>
+          <a:xfrm>
+            <a:off x="6337267" y="3122496"/>
+            <a:ext cx="4067743" cy="2943636"/>
+          </a:xfrm>
+          <a:prstGeom prst="rect">
+            <a:avLst/>
+          </a:prstGeom>
+        </p:spPr>
+      </p:pic>
+      <p:pic>
+        <p:nvPicPr>
+          <p:cNvPr id="7" name="Picture 6">
+            <a:extLst>
+              <a:ext uri="{FF2B5EF4-FFF2-40B4-BE49-F238E27FC236}">
+                <a16:creationId xmlns:a16="http://schemas.microsoft.com/office/drawing/2014/main" id="{D0A5F3A2-5C7C-4943-903B-F8F8ABB8CF06}"/>
+              </a:ext>
+            </a:extLst>
+          </p:cNvPr>
+          <p:cNvPicPr>
+            <a:picLocks noChangeAspect="1"/>
+          </p:cNvPicPr>
+          <p:nvPr/>
+        </p:nvPicPr>
+        <p:blipFill>
+          <a:blip r:embed="rId4"/>
+          <a:stretch>
+            <a:fillRect/>
+          </a:stretch>
+        </p:blipFill>
+        <p:spPr>
+          <a:xfrm>
+            <a:off x="369695" y="3122496"/>
+            <a:ext cx="4372585" cy="2934109"/>
+          </a:xfrm>
+          <a:prstGeom prst="rect">
+            <a:avLst/>
+          </a:prstGeom>
+        </p:spPr>
+      </p:pic>
+      <p:sp>
+        <p:nvSpPr>
+          <p:cNvPr id="2" name="Title 1">
+            <a:extLst>
+              <a:ext uri="{FF2B5EF4-FFF2-40B4-BE49-F238E27FC236}">
+                <a16:creationId xmlns:a16="http://schemas.microsoft.com/office/drawing/2014/main" id="{40BD6826-2307-4B69-AC43-B1FF64626836}"/>
+              </a:ext>
+            </a:extLst>
+          </p:cNvPr>
+          <p:cNvSpPr>
+            <a:spLocks noGrp="1"/>
+          </p:cNvSpPr>
+          <p:nvPr>
+            <p:ph type="title"/>
+          </p:nvPr>
+        </p:nvSpPr>
+        <p:spPr/>
+        <p:txBody>
+          <a:bodyPr/>
+          <a:lstStyle/>
+          <a:p>
+            <a:r>
+              <a:rPr lang="en-US" dirty="0"/>
+              <a:t>Healthcare/Happiness Correlation</a:t>
+            </a:r>
+          </a:p>
+        </p:txBody>
+      </p:sp>
+      <p:sp>
+        <p:nvSpPr>
+          <p:cNvPr id="3" name="Content Placeholder 2">
+            <a:extLst>
+              <a:ext uri="{FF2B5EF4-FFF2-40B4-BE49-F238E27FC236}">
+                <a16:creationId xmlns:a16="http://schemas.microsoft.com/office/drawing/2014/main" id="{C577C011-DA16-496A-BAA9-6A7D1C179C2B}"/>
+              </a:ext>
+            </a:extLst>
+          </p:cNvPr>
+          <p:cNvSpPr>
+            <a:spLocks noGrp="1"/>
+          </p:cNvSpPr>
+          <p:nvPr>
+            <p:ph idx="1"/>
+          </p:nvPr>
+        </p:nvSpPr>
+        <p:spPr>
+          <a:xfrm>
+            <a:off x="933450" y="1822452"/>
+            <a:ext cx="10058400" cy="749298"/>
+          </a:xfrm>
+        </p:spPr>
+        <p:txBody>
+          <a:bodyPr>
+            <a:normAutofit lnSpcReduction="10000"/>
+          </a:bodyPr>
+          <a:lstStyle/>
+          <a:p>
+            <a:r>
+              <a:rPr lang="en-US" i="0" dirty="0">
+                <a:solidFill>
+                  <a:srgbClr val="202124"/>
+                </a:solidFill>
+                <a:effectLst/>
+                <a:latin typeface="Roboto"/>
+              </a:rPr>
+              <a:t>Capital health spend include health infrastructure (buildings, machinery, IT) and stocks of vaccines for emergency or outbreaks</a:t>
+            </a:r>
+          </a:p>
+          <a:p>
+            <a:endParaRPr lang="en-US" dirty="0">
+              <a:solidFill>
+                <a:srgbClr val="202124"/>
+              </a:solidFill>
+              <a:latin typeface="Roboto"/>
+            </a:endParaRPr>
+          </a:p>
+          <a:p>
+            <a:endParaRPr lang="en-US" dirty="0"/>
+          </a:p>
+          <a:p>
+            <a:endParaRPr lang="en-US" dirty="0"/>
+          </a:p>
+        </p:txBody>
+      </p:sp>
+      <p:pic>
+        <p:nvPicPr>
+          <p:cNvPr id="5" name="Picture 4">
+            <a:extLst>
+              <a:ext uri="{FF2B5EF4-FFF2-40B4-BE49-F238E27FC236}">
+                <a16:creationId xmlns:a16="http://schemas.microsoft.com/office/drawing/2014/main" id="{8AB49778-FCA7-43AA-B7C6-8433778BCE36}"/>
+              </a:ext>
+            </a:extLst>
+          </p:cNvPr>
+          <p:cNvPicPr>
+            <a:picLocks noChangeAspect="1"/>
+          </p:cNvPicPr>
+          <p:nvPr/>
+        </p:nvPicPr>
+        <p:blipFill>
+          <a:blip r:embed="rId5"/>
+          <a:stretch>
+            <a:fillRect/>
+          </a:stretch>
+        </p:blipFill>
+        <p:spPr>
+          <a:xfrm>
+            <a:off x="9170401" y="537042"/>
+            <a:ext cx="1924319" cy="1200318"/>
+          </a:xfrm>
+          <a:prstGeom prst="rect">
+            <a:avLst/>
+          </a:prstGeom>
+        </p:spPr>
+      </p:pic>
+      <p:sp>
+        <p:nvSpPr>
+          <p:cNvPr id="9" name="TextBox 8">
+            <a:extLst>
+              <a:ext uri="{FF2B5EF4-FFF2-40B4-BE49-F238E27FC236}">
+                <a16:creationId xmlns:a16="http://schemas.microsoft.com/office/drawing/2014/main" id="{1BDD26FC-15E2-4F87-AB80-0D5B5F95005F}"/>
+              </a:ext>
+            </a:extLst>
+          </p:cNvPr>
+          <p:cNvSpPr txBox="1"/>
+          <p:nvPr/>
+        </p:nvSpPr>
+        <p:spPr>
+          <a:xfrm>
+            <a:off x="3881154" y="4286251"/>
+            <a:ext cx="2247900" cy="1477328"/>
+          </a:xfrm>
+          <a:prstGeom prst="rect">
+            <a:avLst/>
+          </a:prstGeom>
+          <a:solidFill>
+            <a:schemeClr val="accent5">
+              <a:lumMod val="40000"/>
+              <a:lumOff val="60000"/>
+            </a:schemeClr>
+          </a:solidFill>
+          <a:ln>
+            <a:solidFill>
+              <a:srgbClr val="FFFF00"/>
+            </a:solidFill>
+          </a:ln>
+        </p:spPr>
+        <p:txBody>
+          <a:bodyPr wrap="square" rtlCol="0">
+            <a:spAutoFit/>
+          </a:bodyPr>
+          <a:lstStyle/>
+          <a:p>
+            <a:r>
+              <a:rPr lang="en-US" dirty="0"/>
+              <a:t>The more govt spend on health infrastructure, the more likely for happier country </a:t>
+            </a:r>
+          </a:p>
+        </p:txBody>
+      </p:sp>
+      <p:sp>
+        <p:nvSpPr>
+          <p:cNvPr id="11" name="TextBox 10">
+            <a:extLst>
+              <a:ext uri="{FF2B5EF4-FFF2-40B4-BE49-F238E27FC236}">
+                <a16:creationId xmlns:a16="http://schemas.microsoft.com/office/drawing/2014/main" id="{DB043402-89C4-4047-AA56-89FD7A16259D}"/>
+              </a:ext>
+            </a:extLst>
+          </p:cNvPr>
+          <p:cNvSpPr txBox="1"/>
+          <p:nvPr/>
+        </p:nvSpPr>
+        <p:spPr>
+          <a:xfrm>
+            <a:off x="9574405" y="4658976"/>
+            <a:ext cx="2247900" cy="923330"/>
+          </a:xfrm>
+          <a:prstGeom prst="rect">
+            <a:avLst/>
+          </a:prstGeom>
+          <a:solidFill>
+            <a:schemeClr val="accent5">
+              <a:lumMod val="40000"/>
+              <a:lumOff val="60000"/>
+            </a:schemeClr>
+          </a:solidFill>
+          <a:ln>
+            <a:solidFill>
+              <a:srgbClr val="FFFF00"/>
+            </a:solidFill>
+          </a:ln>
+        </p:spPr>
+        <p:txBody>
+          <a:bodyPr wrap="square" rtlCol="0">
+            <a:spAutoFit/>
+          </a:bodyPr>
+          <a:lstStyle/>
+          <a:p>
+            <a:r>
+              <a:rPr lang="en-US" dirty="0"/>
+              <a:t>No correlation between population and happiness</a:t>
+            </a:r>
+          </a:p>
+        </p:txBody>
+      </p:sp>
+    </p:spTree>
+    <p:extLst>
+      <p:ext uri="{BB962C8B-B14F-4D97-AF65-F5344CB8AC3E}">
+        <p14:creationId xmlns:p14="http://schemas.microsoft.com/office/powerpoint/2010/main" val="3538280424"/>
       </p:ext>
     </p:extLst>
   </p:cSld>
@@ -6056,19 +6412,56 @@
           <a:chExt cx="0" cy="0"/>
         </a:xfrm>
       </p:grpSpPr>
+      <p:sp>
+        <p:nvSpPr>
+          <p:cNvPr id="2" name="Title 1">
+            <a:extLst>
+              <a:ext uri="{FF2B5EF4-FFF2-40B4-BE49-F238E27FC236}">
+                <a16:creationId xmlns:a16="http://schemas.microsoft.com/office/drawing/2014/main" id="{3216E208-84BD-4B4F-85E5-8BCA0C4F3D5B}"/>
+              </a:ext>
+            </a:extLst>
+          </p:cNvPr>
+          <p:cNvSpPr>
+            <a:spLocks noGrp="1"/>
+          </p:cNvSpPr>
+          <p:nvPr>
+            <p:ph type="title" idx="4294967295"/>
+          </p:nvPr>
+        </p:nvSpPr>
+        <p:spPr>
+          <a:xfrm>
+            <a:off x="243840" y="148273"/>
+            <a:ext cx="8757920" cy="566102"/>
+          </a:xfrm>
+        </p:spPr>
+        <p:txBody>
+          <a:bodyPr>
+            <a:normAutofit fontScale="90000"/>
+          </a:bodyPr>
+          <a:lstStyle/>
+          <a:p>
+            <a:r>
+              <a:rPr lang="en-US" dirty="0"/>
+              <a:t>Social Support/Happiness Correlation </a:t>
+            </a:r>
+          </a:p>
+        </p:txBody>
+      </p:sp>
       <p:pic>
         <p:nvPicPr>
-          <p:cNvPr id="6" name="Picture 5">
-            <a:extLst>
-              <a:ext uri="{FF2B5EF4-FFF2-40B4-BE49-F238E27FC236}">
-                <a16:creationId xmlns:a16="http://schemas.microsoft.com/office/drawing/2014/main" id="{78DE8D32-9125-44EB-A4A0-A7E1B8D4C11B}"/>
+          <p:cNvPr id="6" name="Content Placeholder 5">
+            <a:extLst>
+              <a:ext uri="{FF2B5EF4-FFF2-40B4-BE49-F238E27FC236}">
+                <a16:creationId xmlns:a16="http://schemas.microsoft.com/office/drawing/2014/main" id="{7603C826-2B61-4A00-B0CA-440200138749}"/>
               </a:ext>
             </a:extLst>
           </p:cNvPr>
           <p:cNvPicPr>
-            <a:picLocks noChangeAspect="1"/>
+            <a:picLocks noGrp="1" noChangeAspect="1"/>
           </p:cNvPicPr>
-          <p:nvPr/>
+          <p:nvPr>
+            <p:ph idx="4294967295"/>
+          </p:nvPr>
         </p:nvPicPr>
         <p:blipFill>
           <a:blip r:embed="rId3"/>
@@ -6078,20 +6471,17 @@
         </p:blipFill>
         <p:spPr>
           <a:xfrm>
-            <a:off x="6337267" y="3122496"/>
-            <a:ext cx="4067743" cy="2943636"/>
-          </a:xfrm>
-          <a:prstGeom prst="rect">
-            <a:avLst/>
-          </a:prstGeom>
+            <a:off x="4753708" y="952046"/>
+            <a:ext cx="7410485" cy="3118325"/>
+          </a:xfrm>
         </p:spPr>
       </p:pic>
       <p:pic>
         <p:nvPicPr>
-          <p:cNvPr id="7" name="Picture 6">
-            <a:extLst>
-              <a:ext uri="{FF2B5EF4-FFF2-40B4-BE49-F238E27FC236}">
-                <a16:creationId xmlns:a16="http://schemas.microsoft.com/office/drawing/2014/main" id="{D0A5F3A2-5C7C-4943-903B-F8F8ABB8CF06}"/>
+          <p:cNvPr id="5" name="Picture 4">
+            <a:extLst>
+              <a:ext uri="{FF2B5EF4-FFF2-40B4-BE49-F238E27FC236}">
+                <a16:creationId xmlns:a16="http://schemas.microsoft.com/office/drawing/2014/main" id="{33D1508A-9E80-4A8B-9717-C1C7E4BBD2EA}"/>
               </a:ext>
             </a:extLst>
           </p:cNvPr>
@@ -6108,8 +6498,8 @@
         </p:blipFill>
         <p:spPr>
           <a:xfrm>
-            <a:off x="369695" y="3122496"/>
-            <a:ext cx="4372585" cy="2934109"/>
+            <a:off x="8290891" y="1"/>
+            <a:ext cx="1106764" cy="714374"/>
           </a:xfrm>
           <a:prstGeom prst="rect">
             <a:avLst/>
@@ -6118,123 +6508,10 @@
       </p:pic>
       <p:sp>
         <p:nvSpPr>
-          <p:cNvPr id="2" name="Title 1">
-            <a:extLst>
-              <a:ext uri="{FF2B5EF4-FFF2-40B4-BE49-F238E27FC236}">
-                <a16:creationId xmlns:a16="http://schemas.microsoft.com/office/drawing/2014/main" id="{40BD6826-2307-4B69-AC43-B1FF64626836}"/>
-              </a:ext>
-            </a:extLst>
-          </p:cNvPr>
-          <p:cNvSpPr>
-            <a:spLocks noGrp="1"/>
-          </p:cNvSpPr>
-          <p:nvPr>
-            <p:ph type="title"/>
-          </p:nvPr>
-        </p:nvSpPr>
-        <p:spPr/>
-        <p:txBody>
-          <a:bodyPr/>
-          <a:lstStyle/>
-          <a:p>
-            <a:r>
-              <a:rPr lang="en-US" dirty="0"/>
-              <a:t>Healthcare/Happiness Correlation</a:t>
-            </a:r>
-          </a:p>
-        </p:txBody>
-      </p:sp>
-      <p:sp>
-        <p:nvSpPr>
-          <p:cNvPr id="3" name="Content Placeholder 2">
-            <a:extLst>
-              <a:ext uri="{FF2B5EF4-FFF2-40B4-BE49-F238E27FC236}">
-                <a16:creationId xmlns:a16="http://schemas.microsoft.com/office/drawing/2014/main" id="{C577C011-DA16-496A-BAA9-6A7D1C179C2B}"/>
-              </a:ext>
-            </a:extLst>
-          </p:cNvPr>
-          <p:cNvSpPr>
-            <a:spLocks noGrp="1"/>
-          </p:cNvSpPr>
-          <p:nvPr>
-            <p:ph idx="1"/>
-          </p:nvPr>
-        </p:nvSpPr>
-        <p:spPr>
-          <a:xfrm>
-            <a:off x="933450" y="1822452"/>
-            <a:ext cx="10058400" cy="749298"/>
-          </a:xfrm>
-        </p:spPr>
-        <p:txBody>
-          <a:bodyPr>
-            <a:normAutofit lnSpcReduction="10000"/>
-          </a:bodyPr>
-          <a:lstStyle/>
-          <a:p>
-            <a:r>
-              <a:rPr lang="en-US" i="0" dirty="0">
-                <a:solidFill>
-                  <a:srgbClr val="202124"/>
-                </a:solidFill>
-                <a:effectLst/>
-                <a:latin typeface="Roboto"/>
-              </a:rPr>
-              <a:t>Capital health spend include health infrastructure (buildings, machinery, IT) and stocks of vaccines for emergency or outbreaks</a:t>
-            </a:r>
-          </a:p>
-          <a:p>
-            <a:endParaRPr lang="en-US" dirty="0">
-              <a:solidFill>
-                <a:srgbClr val="202124"/>
-              </a:solidFill>
-              <a:latin typeface="Roboto"/>
-            </a:endParaRPr>
-          </a:p>
-          <a:p>
-            <a:endParaRPr lang="en-US" dirty="0"/>
-          </a:p>
-          <a:p>
-            <a:endParaRPr lang="en-US" dirty="0"/>
-          </a:p>
-        </p:txBody>
-      </p:sp>
-      <p:pic>
-        <p:nvPicPr>
-          <p:cNvPr id="5" name="Picture 4">
-            <a:extLst>
-              <a:ext uri="{FF2B5EF4-FFF2-40B4-BE49-F238E27FC236}">
-                <a16:creationId xmlns:a16="http://schemas.microsoft.com/office/drawing/2014/main" id="{8AB49778-FCA7-43AA-B7C6-8433778BCE36}"/>
-              </a:ext>
-            </a:extLst>
-          </p:cNvPr>
-          <p:cNvPicPr>
-            <a:picLocks noChangeAspect="1"/>
-          </p:cNvPicPr>
-          <p:nvPr/>
-        </p:nvPicPr>
-        <p:blipFill>
-          <a:blip r:embed="rId5"/>
-          <a:stretch>
-            <a:fillRect/>
-          </a:stretch>
-        </p:blipFill>
-        <p:spPr>
-          <a:xfrm>
-            <a:off x="9170401" y="537042"/>
-            <a:ext cx="1924319" cy="1200318"/>
-          </a:xfrm>
-          <a:prstGeom prst="rect">
-            <a:avLst/>
-          </a:prstGeom>
-        </p:spPr>
-      </p:pic>
-      <p:sp>
-        <p:nvSpPr>
           <p:cNvPr id="9" name="TextBox 8">
             <a:extLst>
               <a:ext uri="{FF2B5EF4-FFF2-40B4-BE49-F238E27FC236}">
-                <a16:creationId xmlns:a16="http://schemas.microsoft.com/office/drawing/2014/main" id="{1BDD26FC-15E2-4F87-AB80-0D5B5F95005F}"/>
+                <a16:creationId xmlns:a16="http://schemas.microsoft.com/office/drawing/2014/main" id="{1449789E-977D-4D9C-A843-530179048D57}"/>
               </a:ext>
             </a:extLst>
           </p:cNvPr>
@@ -6243,8 +6520,8 @@
         </p:nvSpPr>
         <p:spPr>
           <a:xfrm>
-            <a:off x="3881154" y="4286251"/>
-            <a:ext cx="2247900" cy="1477328"/>
+            <a:off x="5123687" y="1289036"/>
+            <a:ext cx="2408253" cy="1200329"/>
           </a:xfrm>
           <a:prstGeom prst="rect">
             <a:avLst/>
@@ -6269,17 +6546,17 @@
           <a:p>
             <a:r>
               <a:rPr lang="en-US" dirty="0"/>
-              <a:t>The more govt spend on health infrastructure, the more likely for happier country </a:t>
-            </a:r>
-          </a:p>
-        </p:txBody>
-      </p:sp>
-      <p:sp>
-        <p:nvSpPr>
-          <p:cNvPr id="11" name="TextBox 10">
-            <a:extLst>
-              <a:ext uri="{FF2B5EF4-FFF2-40B4-BE49-F238E27FC236}">
-                <a16:creationId xmlns:a16="http://schemas.microsoft.com/office/drawing/2014/main" id="{DB043402-89C4-4047-AA56-89FD7A16259D}"/>
+              <a:t>Strong correlation (.78) between amount of social support and happiness! </a:t>
+            </a:r>
+          </a:p>
+        </p:txBody>
+      </p:sp>
+      <p:sp>
+        <p:nvSpPr>
+          <p:cNvPr id="10" name="TextBox 9">
+            <a:extLst>
+              <a:ext uri="{FF2B5EF4-FFF2-40B4-BE49-F238E27FC236}">
+                <a16:creationId xmlns:a16="http://schemas.microsoft.com/office/drawing/2014/main" id="{13285194-958B-44E5-B6EB-AF33DC2352EC}"/>
               </a:ext>
             </a:extLst>
           </p:cNvPr>
@@ -6288,8 +6565,8 @@
         </p:nvSpPr>
         <p:spPr>
           <a:xfrm>
-            <a:off x="9574405" y="4658976"/>
-            <a:ext cx="2247900" cy="923330"/>
+            <a:off x="6580603" y="4751790"/>
+            <a:ext cx="4955762" cy="1477328"/>
           </a:xfrm>
           <a:prstGeom prst="rect">
             <a:avLst/>
@@ -6314,15 +6591,295 @@
           <a:p>
             <a:r>
               <a:rPr lang="en-US" dirty="0"/>
-              <a:t>No correlation between population and happiness</a:t>
-            </a:r>
-          </a:p>
-        </p:txBody>
-      </p:sp>
+              <a:t>Generous counties, were not automatically happy until social support was added in too! We like to think this says people, in general are good, and want to make others happy, even if they aren’t happy themselves. </a:t>
+            </a:r>
+          </a:p>
+        </p:txBody>
+      </p:sp>
+      <p:sp>
+        <p:nvSpPr>
+          <p:cNvPr id="11" name="TextBox 10">
+            <a:extLst>
+              <a:ext uri="{FF2B5EF4-FFF2-40B4-BE49-F238E27FC236}">
+                <a16:creationId xmlns:a16="http://schemas.microsoft.com/office/drawing/2014/main" id="{CC899739-D07D-49A0-AF23-E1BDB9C19E49}"/>
+              </a:ext>
+            </a:extLst>
+          </p:cNvPr>
+          <p:cNvSpPr txBox="1"/>
+          <p:nvPr/>
+        </p:nvSpPr>
+        <p:spPr>
+          <a:xfrm>
+            <a:off x="449777" y="628881"/>
+            <a:ext cx="4694548" cy="646331"/>
+          </a:xfrm>
+          <a:prstGeom prst="rect">
+            <a:avLst/>
+          </a:prstGeom>
+          <a:noFill/>
+        </p:spPr>
+        <p:txBody>
+          <a:bodyPr wrap="square" rtlCol="0">
+            <a:spAutoFit/>
+          </a:bodyPr>
+          <a:lstStyle/>
+          <a:p>
+            <a:r>
+              <a:rPr lang="en-US" i="1" dirty="0"/>
+              <a:t>“if you were in trouble, do you have someone to count on”</a:t>
+            </a:r>
+          </a:p>
+        </p:txBody>
+      </p:sp>
+      <p:sp>
+        <p:nvSpPr>
+          <p:cNvPr id="12" name="TextBox 11">
+            <a:extLst>
+              <a:ext uri="{FF2B5EF4-FFF2-40B4-BE49-F238E27FC236}">
+                <a16:creationId xmlns:a16="http://schemas.microsoft.com/office/drawing/2014/main" id="{DD45255D-2E10-4090-B1A7-BBC101CACCAC}"/>
+              </a:ext>
+            </a:extLst>
+          </p:cNvPr>
+          <p:cNvSpPr txBox="1"/>
+          <p:nvPr/>
+        </p:nvSpPr>
+        <p:spPr>
+          <a:xfrm>
+            <a:off x="5526885" y="628882"/>
+            <a:ext cx="4251489" cy="646331"/>
+          </a:xfrm>
+          <a:prstGeom prst="rect">
+            <a:avLst/>
+          </a:prstGeom>
+          <a:noFill/>
+        </p:spPr>
+        <p:txBody>
+          <a:bodyPr wrap="square" rtlCol="0">
+            <a:spAutoFit/>
+          </a:bodyPr>
+          <a:lstStyle/>
+          <a:p>
+            <a:r>
+              <a:rPr lang="en-US" i="1" dirty="0"/>
+              <a:t>“have you donated to a charity in the past month?”</a:t>
+            </a:r>
+          </a:p>
+        </p:txBody>
+      </p:sp>
+      <p:pic>
+        <p:nvPicPr>
+          <p:cNvPr id="13" name="Picture 12">
+            <a:extLst>
+              <a:ext uri="{FF2B5EF4-FFF2-40B4-BE49-F238E27FC236}">
+                <a16:creationId xmlns:a16="http://schemas.microsoft.com/office/drawing/2014/main" id="{DA3EFC52-DFDA-48D4-AB3F-79CFD568CF96}"/>
+              </a:ext>
+            </a:extLst>
+          </p:cNvPr>
+          <p:cNvPicPr>
+            <a:picLocks noChangeAspect="1"/>
+          </p:cNvPicPr>
+          <p:nvPr/>
+        </p:nvPicPr>
+        <p:blipFill>
+          <a:blip r:embed="rId5"/>
+          <a:stretch>
+            <a:fillRect/>
+          </a:stretch>
+        </p:blipFill>
+        <p:spPr>
+          <a:xfrm>
+            <a:off x="0" y="4042782"/>
+            <a:ext cx="5900814" cy="2387516"/>
+          </a:xfrm>
+          <a:prstGeom prst="rect">
+            <a:avLst/>
+          </a:prstGeom>
+        </p:spPr>
+      </p:pic>
+      <p:cxnSp>
+        <p:nvCxnSpPr>
+          <p:cNvPr id="4" name="Straight Arrow Connector 3">
+            <a:extLst>
+              <a:ext uri="{FF2B5EF4-FFF2-40B4-BE49-F238E27FC236}">
+                <a16:creationId xmlns:a16="http://schemas.microsoft.com/office/drawing/2014/main" id="{D0FBFDD4-EEB2-41E4-A8E5-8B54088D7A41}"/>
+              </a:ext>
+            </a:extLst>
+          </p:cNvPr>
+          <p:cNvCxnSpPr>
+            <a:cxnSpLocks/>
+          </p:cNvCxnSpPr>
+          <p:nvPr/>
+        </p:nvCxnSpPr>
+        <p:spPr>
+          <a:xfrm flipH="1" flipV="1">
+            <a:off x="8525196" y="1355036"/>
+            <a:ext cx="1372837" cy="72760"/>
+          </a:xfrm>
+          <a:prstGeom prst="straightConnector1">
+            <a:avLst/>
+          </a:prstGeom>
+          <a:ln>
+            <a:tailEnd type="triangle"/>
+          </a:ln>
+        </p:spPr>
+        <p:style>
+          <a:lnRef idx="1">
+            <a:schemeClr val="accent1"/>
+          </a:lnRef>
+          <a:fillRef idx="0">
+            <a:schemeClr val="accent1"/>
+          </a:fillRef>
+          <a:effectRef idx="0">
+            <a:schemeClr val="accent1"/>
+          </a:effectRef>
+          <a:fontRef idx="minor">
+            <a:schemeClr val="tx1"/>
+          </a:fontRef>
+        </p:style>
+      </p:cxnSp>
+      <p:sp>
+        <p:nvSpPr>
+          <p:cNvPr id="7" name="TextBox 6">
+            <a:extLst>
+              <a:ext uri="{FF2B5EF4-FFF2-40B4-BE49-F238E27FC236}">
+                <a16:creationId xmlns:a16="http://schemas.microsoft.com/office/drawing/2014/main" id="{7D7B46F7-480D-47FC-ABAE-FD72D951A46F}"/>
+              </a:ext>
+            </a:extLst>
+          </p:cNvPr>
+          <p:cNvSpPr txBox="1"/>
+          <p:nvPr/>
+        </p:nvSpPr>
+        <p:spPr>
+          <a:xfrm>
+            <a:off x="9824489" y="1254059"/>
+            <a:ext cx="1066800" cy="369332"/>
+          </a:xfrm>
+          <a:prstGeom prst="rect">
+            <a:avLst/>
+          </a:prstGeom>
+          <a:noFill/>
+        </p:spPr>
+        <p:txBody>
+          <a:bodyPr wrap="square" rtlCol="0">
+            <a:spAutoFit/>
+          </a:bodyPr>
+          <a:lstStyle/>
+          <a:p>
+            <a:r>
+              <a:rPr lang="en-US" dirty="0"/>
+              <a:t>Myanmar</a:t>
+            </a:r>
+          </a:p>
+        </p:txBody>
+      </p:sp>
+      <p:cxnSp>
+        <p:nvCxnSpPr>
+          <p:cNvPr id="16" name="Straight Arrow Connector 15">
+            <a:extLst>
+              <a:ext uri="{FF2B5EF4-FFF2-40B4-BE49-F238E27FC236}">
+                <a16:creationId xmlns:a16="http://schemas.microsoft.com/office/drawing/2014/main" id="{F944668B-E115-4E3F-90A7-D59C1FB2EBB4}"/>
+              </a:ext>
+            </a:extLst>
+          </p:cNvPr>
+          <p:cNvCxnSpPr/>
+          <p:nvPr/>
+        </p:nvCxnSpPr>
+        <p:spPr>
+          <a:xfrm flipH="1">
+            <a:off x="5655277" y="3158778"/>
+            <a:ext cx="462924" cy="0"/>
+          </a:xfrm>
+          <a:prstGeom prst="straightConnector1">
+            <a:avLst/>
+          </a:prstGeom>
+          <a:ln>
+            <a:tailEnd type="triangle"/>
+          </a:ln>
+        </p:spPr>
+        <p:style>
+          <a:lnRef idx="1">
+            <a:schemeClr val="accent1"/>
+          </a:lnRef>
+          <a:fillRef idx="0">
+            <a:schemeClr val="accent1"/>
+          </a:fillRef>
+          <a:effectRef idx="0">
+            <a:schemeClr val="accent1"/>
+          </a:effectRef>
+          <a:fontRef idx="minor">
+            <a:schemeClr val="tx1"/>
+          </a:fontRef>
+        </p:style>
+      </p:cxnSp>
+      <p:sp>
+        <p:nvSpPr>
+          <p:cNvPr id="17" name="TextBox 16">
+            <a:extLst>
+              <a:ext uri="{FF2B5EF4-FFF2-40B4-BE49-F238E27FC236}">
+                <a16:creationId xmlns:a16="http://schemas.microsoft.com/office/drawing/2014/main" id="{D20BB5D4-730C-40F0-A158-3F9916AC363C}"/>
+              </a:ext>
+            </a:extLst>
+          </p:cNvPr>
+          <p:cNvSpPr txBox="1"/>
+          <p:nvPr/>
+        </p:nvSpPr>
+        <p:spPr>
+          <a:xfrm>
+            <a:off x="5655277" y="3112612"/>
+            <a:ext cx="740929" cy="369332"/>
+          </a:xfrm>
+          <a:prstGeom prst="rect">
+            <a:avLst/>
+          </a:prstGeom>
+          <a:noFill/>
+        </p:spPr>
+        <p:txBody>
+          <a:bodyPr wrap="square" rtlCol="0">
+            <a:spAutoFit/>
+          </a:bodyPr>
+          <a:lstStyle/>
+          <a:p>
+            <a:r>
+              <a:rPr lang="en-US" dirty="0"/>
+              <a:t>Togo</a:t>
+            </a:r>
+          </a:p>
+        </p:txBody>
+      </p:sp>
+      <p:pic>
+        <p:nvPicPr>
+          <p:cNvPr id="18" name="Picture 17">
+            <a:extLst>
+              <a:ext uri="{FF2B5EF4-FFF2-40B4-BE49-F238E27FC236}">
+                <a16:creationId xmlns:a16="http://schemas.microsoft.com/office/drawing/2014/main" id="{DFD455F5-6208-4801-BD80-3E729CAC2697}"/>
+              </a:ext>
+            </a:extLst>
+          </p:cNvPr>
+          <p:cNvPicPr>
+            <a:picLocks noChangeAspect="1"/>
+          </p:cNvPicPr>
+          <p:nvPr/>
+        </p:nvPicPr>
+        <p:blipFill>
+          <a:blip r:embed="rId6"/>
+          <a:stretch>
+            <a:fillRect/>
+          </a:stretch>
+        </p:blipFill>
+        <p:spPr>
+          <a:xfrm>
+            <a:off x="67217" y="1161823"/>
+            <a:ext cx="5022545" cy="2762124"/>
+          </a:xfrm>
+          <a:prstGeom prst="rect">
+            <a:avLst/>
+          </a:prstGeom>
+        </p:spPr>
+      </p:pic>
     </p:spTree>
     <p:extLst>
       <p:ext uri="{BB962C8B-B14F-4D97-AF65-F5344CB8AC3E}">
-        <p14:creationId xmlns:p14="http://schemas.microsoft.com/office/powerpoint/2010/main" val="3538280424"/>
+        <p14:creationId xmlns:p14="http://schemas.microsoft.com/office/powerpoint/2010/main" val="3770245964"/>
       </p:ext>
     </p:extLst>
   </p:cSld>
@@ -6354,42 +6911,35 @@
           <p:cNvPr id="2" name="Title 1">
             <a:extLst>
               <a:ext uri="{FF2B5EF4-FFF2-40B4-BE49-F238E27FC236}">
-                <a16:creationId xmlns:a16="http://schemas.microsoft.com/office/drawing/2014/main" id="{3216E208-84BD-4B4F-85E5-8BCA0C4F3D5B}"/>
-              </a:ext>
-            </a:extLst>
-          </p:cNvPr>
-          <p:cNvSpPr>
-            <a:spLocks noGrp="1"/>
-          </p:cNvSpPr>
-          <p:nvPr>
-            <p:ph type="title" idx="4294967295"/>
-          </p:nvPr>
-        </p:nvSpPr>
-        <p:spPr>
-          <a:xfrm>
-            <a:off x="243840" y="148273"/>
-            <a:ext cx="8757920" cy="566102"/>
-          </a:xfrm>
-        </p:spPr>
-        <p:txBody>
-          <a:bodyPr>
-            <a:normAutofit fontScale="90000"/>
-          </a:bodyPr>
+                <a16:creationId xmlns:a16="http://schemas.microsoft.com/office/drawing/2014/main" id="{B23B07FD-33BE-4BD8-AF80-0793A9044D79}"/>
+              </a:ext>
+            </a:extLst>
+          </p:cNvPr>
+          <p:cNvSpPr>
+            <a:spLocks noGrp="1"/>
+          </p:cNvSpPr>
+          <p:nvPr>
+            <p:ph type="title"/>
+          </p:nvPr>
+        </p:nvSpPr>
+        <p:spPr/>
+        <p:txBody>
+          <a:bodyPr/>
           <a:lstStyle/>
           <a:p>
             <a:r>
               <a:rPr lang="en-US" dirty="0"/>
-              <a:t>Social Support/Happiness Correlation </a:t>
+              <a:t>Government Types/Happiness </a:t>
             </a:r>
           </a:p>
         </p:txBody>
       </p:sp>
       <p:pic>
         <p:nvPicPr>
-          <p:cNvPr id="6" name="Content Placeholder 5">
-            <a:extLst>
-              <a:ext uri="{FF2B5EF4-FFF2-40B4-BE49-F238E27FC236}">
-                <a16:creationId xmlns:a16="http://schemas.microsoft.com/office/drawing/2014/main" id="{7603C826-2B61-4A00-B0CA-440200138749}"/>
+          <p:cNvPr id="5" name="Content Placeholder 4">
+            <a:extLst>
+              <a:ext uri="{FF2B5EF4-FFF2-40B4-BE49-F238E27FC236}">
+                <a16:creationId xmlns:a16="http://schemas.microsoft.com/office/drawing/2014/main" id="{C1DB05DB-995C-4974-9A76-100C1A36C908}"/>
               </a:ext>
             </a:extLst>
           </p:cNvPr>
@@ -6397,7 +6947,7 @@
             <a:picLocks noGrp="1" noChangeAspect="1"/>
           </p:cNvPicPr>
           <p:nvPr>
-            <p:ph idx="4294967295"/>
+            <p:ph idx="1"/>
           </p:nvPr>
         </p:nvPicPr>
         <p:blipFill>
@@ -6408,17 +6958,17 @@
         </p:blipFill>
         <p:spPr>
           <a:xfrm>
-            <a:off x="4753708" y="952046"/>
-            <a:ext cx="7410485" cy="3118325"/>
+            <a:off x="539962" y="2282825"/>
+            <a:ext cx="3739091" cy="3760788"/>
           </a:xfrm>
         </p:spPr>
       </p:pic>
       <p:pic>
         <p:nvPicPr>
-          <p:cNvPr id="5" name="Picture 4">
-            <a:extLst>
-              <a:ext uri="{FF2B5EF4-FFF2-40B4-BE49-F238E27FC236}">
-                <a16:creationId xmlns:a16="http://schemas.microsoft.com/office/drawing/2014/main" id="{33D1508A-9E80-4A8B-9717-C1C7E4BBD2EA}"/>
+          <p:cNvPr id="7" name="Picture 6">
+            <a:extLst>
+              <a:ext uri="{FF2B5EF4-FFF2-40B4-BE49-F238E27FC236}">
+                <a16:creationId xmlns:a16="http://schemas.microsoft.com/office/drawing/2014/main" id="{7C3D8F98-4FB4-4406-9194-B803D216FC50}"/>
               </a:ext>
             </a:extLst>
           </p:cNvPr>
@@ -6435,8 +6985,8 @@
         </p:blipFill>
         <p:spPr>
           <a:xfrm>
-            <a:off x="8290891" y="1"/>
-            <a:ext cx="1106764" cy="714374"/>
+            <a:off x="8735110" y="169643"/>
+            <a:ext cx="2591162" cy="1638529"/>
           </a:xfrm>
           <a:prstGeom prst="rect">
             <a:avLst/>
@@ -6445,10 +6995,10 @@
       </p:pic>
       <p:sp>
         <p:nvSpPr>
-          <p:cNvPr id="9" name="TextBox 8">
-            <a:extLst>
-              <a:ext uri="{FF2B5EF4-FFF2-40B4-BE49-F238E27FC236}">
-                <a16:creationId xmlns:a16="http://schemas.microsoft.com/office/drawing/2014/main" id="{1449789E-977D-4D9C-A843-530179048D57}"/>
+          <p:cNvPr id="8" name="TextBox 7">
+            <a:extLst>
+              <a:ext uri="{FF2B5EF4-FFF2-40B4-BE49-F238E27FC236}">
+                <a16:creationId xmlns:a16="http://schemas.microsoft.com/office/drawing/2014/main" id="{FC4DCC5A-DE60-4551-9F06-B80593C45BC0}"/>
               </a:ext>
             </a:extLst>
           </p:cNvPr>
@@ -6457,98 +7007,8 @@
         </p:nvSpPr>
         <p:spPr>
           <a:xfrm>
-            <a:off x="5123687" y="1289036"/>
-            <a:ext cx="2408253" cy="1200329"/>
-          </a:xfrm>
-          <a:prstGeom prst="rect">
-            <a:avLst/>
-          </a:prstGeom>
-          <a:solidFill>
-            <a:schemeClr val="accent5">
-              <a:lumMod val="40000"/>
-              <a:lumOff val="60000"/>
-            </a:schemeClr>
-          </a:solidFill>
-          <a:ln>
-            <a:solidFill>
-              <a:srgbClr val="FFFF00"/>
-            </a:solidFill>
-          </a:ln>
-        </p:spPr>
-        <p:txBody>
-          <a:bodyPr wrap="square" rtlCol="0">
-            <a:spAutoFit/>
-          </a:bodyPr>
-          <a:lstStyle/>
-          <a:p>
-            <a:r>
-              <a:rPr lang="en-US" dirty="0"/>
-              <a:t>Strong correlation (.78) between amount of social support and happiness! </a:t>
-            </a:r>
-          </a:p>
-        </p:txBody>
-      </p:sp>
-      <p:sp>
-        <p:nvSpPr>
-          <p:cNvPr id="10" name="TextBox 9">
-            <a:extLst>
-              <a:ext uri="{FF2B5EF4-FFF2-40B4-BE49-F238E27FC236}">
-                <a16:creationId xmlns:a16="http://schemas.microsoft.com/office/drawing/2014/main" id="{13285194-958B-44E5-B6EB-AF33DC2352EC}"/>
-              </a:ext>
-            </a:extLst>
-          </p:cNvPr>
-          <p:cNvSpPr txBox="1"/>
-          <p:nvPr/>
-        </p:nvSpPr>
-        <p:spPr>
-          <a:xfrm>
-            <a:off x="6580603" y="4751790"/>
-            <a:ext cx="4955762" cy="1477328"/>
-          </a:xfrm>
-          <a:prstGeom prst="rect">
-            <a:avLst/>
-          </a:prstGeom>
-          <a:solidFill>
-            <a:schemeClr val="accent5">
-              <a:lumMod val="40000"/>
-              <a:lumOff val="60000"/>
-            </a:schemeClr>
-          </a:solidFill>
-          <a:ln>
-            <a:solidFill>
-              <a:srgbClr val="FFFF00"/>
-            </a:solidFill>
-          </a:ln>
-        </p:spPr>
-        <p:txBody>
-          <a:bodyPr wrap="square" rtlCol="0">
-            <a:spAutoFit/>
-          </a:bodyPr>
-          <a:lstStyle/>
-          <a:p>
-            <a:r>
-              <a:rPr lang="en-US" dirty="0"/>
-              <a:t>Generous counties, were not automatically happy until social support was added in too! We like to think this says people, in general are good, and want to make others happy, even if they aren’t happy themselves. </a:t>
-            </a:r>
-          </a:p>
-        </p:txBody>
-      </p:sp>
-      <p:sp>
-        <p:nvSpPr>
-          <p:cNvPr id="11" name="TextBox 10">
-            <a:extLst>
-              <a:ext uri="{FF2B5EF4-FFF2-40B4-BE49-F238E27FC236}">
-                <a16:creationId xmlns:a16="http://schemas.microsoft.com/office/drawing/2014/main" id="{CC899739-D07D-49A0-AF23-E1BDB9C19E49}"/>
-              </a:ext>
-            </a:extLst>
-          </p:cNvPr>
-          <p:cNvSpPr txBox="1"/>
-          <p:nvPr/>
-        </p:nvSpPr>
-        <p:spPr>
-          <a:xfrm>
-            <a:off x="449777" y="628881"/>
-            <a:ext cx="4694548" cy="646331"/>
+            <a:off x="4622276" y="3609976"/>
+            <a:ext cx="6533404" cy="1323439"/>
           </a:xfrm>
           <a:prstGeom prst="rect">
             <a:avLst/>
@@ -6556,24 +7016,165 @@
           <a:noFill/>
         </p:spPr>
         <p:txBody>
-          <a:bodyPr wrap="square" rtlCol="0">
+          <a:bodyPr wrap="square">
             <a:spAutoFit/>
           </a:bodyPr>
           <a:lstStyle/>
           <a:p>
-            <a:r>
-              <a:rPr lang="en-US" i="1" dirty="0"/>
-              <a:t>“if you were in trouble, do you have someone to count on”</a:t>
-            </a:r>
-          </a:p>
-        </p:txBody>
-      </p:sp>
-      <p:sp>
-        <p:nvSpPr>
-          <p:cNvPr id="12" name="TextBox 11">
-            <a:extLst>
-              <a:ext uri="{FF2B5EF4-FFF2-40B4-BE49-F238E27FC236}">
-                <a16:creationId xmlns:a16="http://schemas.microsoft.com/office/drawing/2014/main" id="{DD45255D-2E10-4090-B1A7-BBC101CACCAC}"/>
+            <a:pPr>
+              <a:buFont typeface="Arial" panose="020B0604020202020204" pitchFamily="34" charset="0"/>
+              <a:buChar char="•"/>
+            </a:pPr>
+            <a:r>
+              <a:rPr lang="en-US" sz="1600" b="1" i="0" dirty="0">
+                <a:solidFill>
+                  <a:srgbClr val="000000"/>
+                </a:solidFill>
+                <a:effectLst/>
+                <a:highlight>
+                  <a:srgbClr val="FFFF00"/>
+                </a:highlight>
+                <a:latin typeface="Helvetica Neue"/>
+              </a:rPr>
+              <a:t>Parliamentary</a:t>
+            </a:r>
+            <a:r>
+              <a:rPr lang="en-US" sz="1600" b="0" i="0" dirty="0">
+                <a:solidFill>
+                  <a:srgbClr val="000000"/>
+                </a:solidFill>
+                <a:effectLst/>
+                <a:latin typeface="Helvetica Neue"/>
+              </a:rPr>
+              <a:t>- Countries in which people vote for a party and party selects leader. (</a:t>
+            </a:r>
+            <a:r>
+              <a:rPr lang="en-US" sz="1600" b="0" i="0" dirty="0" err="1">
+                <a:solidFill>
+                  <a:srgbClr val="000000"/>
+                </a:solidFill>
+                <a:effectLst/>
+                <a:latin typeface="Helvetica Neue"/>
+              </a:rPr>
+              <a:t>ex:Britain</a:t>
+            </a:r>
+            <a:r>
+              <a:rPr lang="en-US" sz="1600" b="0" i="0" dirty="0">
+                <a:solidFill>
+                  <a:srgbClr val="000000"/>
+                </a:solidFill>
+                <a:effectLst/>
+                <a:latin typeface="Helvetica Neue"/>
+              </a:rPr>
+              <a:t>)</a:t>
+            </a:r>
+          </a:p>
+          <a:p>
+            <a:pPr>
+              <a:buFont typeface="Arial" panose="020B0604020202020204" pitchFamily="34" charset="0"/>
+              <a:buChar char="•"/>
+            </a:pPr>
+            <a:r>
+              <a:rPr lang="en-US" sz="1600" b="1" i="0" dirty="0">
+                <a:solidFill>
+                  <a:srgbClr val="000000"/>
+                </a:solidFill>
+                <a:effectLst/>
+                <a:highlight>
+                  <a:srgbClr val="FFFF00"/>
+                </a:highlight>
+                <a:latin typeface="Helvetica Neue"/>
+              </a:rPr>
+              <a:t>Direct Presidential </a:t>
+            </a:r>
+            <a:r>
+              <a:rPr lang="en-US" sz="1600" b="0" i="0" dirty="0">
+                <a:solidFill>
+                  <a:srgbClr val="000000"/>
+                </a:solidFill>
+                <a:effectLst/>
+                <a:latin typeface="Helvetica Neue"/>
+              </a:rPr>
+              <a:t>– Countries in which people for the executive leader directly. (</a:t>
+            </a:r>
+            <a:r>
+              <a:rPr lang="en-US" sz="1600" b="0" i="0" dirty="0" err="1">
+                <a:solidFill>
+                  <a:srgbClr val="000000"/>
+                </a:solidFill>
+                <a:effectLst/>
+                <a:latin typeface="Helvetica Neue"/>
+              </a:rPr>
+              <a:t>ex:USA</a:t>
+            </a:r>
+            <a:r>
+              <a:rPr lang="en-US" sz="1600" b="0" i="0" dirty="0">
+                <a:solidFill>
+                  <a:srgbClr val="000000"/>
+                </a:solidFill>
+                <a:effectLst/>
+                <a:latin typeface="Helvetica Neue"/>
+              </a:rPr>
+              <a:t>)</a:t>
+            </a:r>
+          </a:p>
+          <a:p>
+            <a:pPr>
+              <a:buFont typeface="Arial" panose="020B0604020202020204" pitchFamily="34" charset="0"/>
+              <a:buChar char="•"/>
+            </a:pPr>
+            <a:r>
+              <a:rPr lang="en-US" sz="1600" b="1" i="0" dirty="0">
+                <a:solidFill>
+                  <a:srgbClr val="000000"/>
+                </a:solidFill>
+                <a:effectLst/>
+                <a:highlight>
+                  <a:srgbClr val="FFFF00"/>
+                </a:highlight>
+                <a:latin typeface="Helvetica Neue"/>
+              </a:rPr>
+              <a:t>Assembly-elected President </a:t>
+            </a:r>
+            <a:r>
+              <a:rPr lang="en-US" sz="1600" b="0" i="0" dirty="0">
+                <a:solidFill>
+                  <a:srgbClr val="000000"/>
+                </a:solidFill>
+                <a:effectLst/>
+                <a:latin typeface="Helvetica Neue"/>
+              </a:rPr>
+              <a:t>– Is done by an assembly. (</a:t>
+            </a:r>
+            <a:r>
+              <a:rPr lang="en-US" sz="1600" b="0" i="0" dirty="0" err="1">
+                <a:solidFill>
+                  <a:srgbClr val="000000"/>
+                </a:solidFill>
+                <a:effectLst/>
+                <a:latin typeface="Helvetica Neue"/>
+              </a:rPr>
+              <a:t>ex:China</a:t>
+            </a:r>
+            <a:r>
+              <a:rPr lang="en-US" sz="1600" b="0" i="0" dirty="0">
+                <a:solidFill>
+                  <a:srgbClr val="000000"/>
+                </a:solidFill>
+                <a:effectLst/>
+                <a:latin typeface="Helvetica Neue"/>
+              </a:rPr>
+              <a:t>)</a:t>
+            </a:r>
+          </a:p>
+        </p:txBody>
+      </p:sp>
+      <p:sp>
+        <p:nvSpPr>
+          <p:cNvPr id="3" name="TextBox 2">
+            <a:extLst>
+              <a:ext uri="{FF2B5EF4-FFF2-40B4-BE49-F238E27FC236}">
+                <a16:creationId xmlns:a16="http://schemas.microsoft.com/office/drawing/2014/main" id="{F8F998B5-79EF-4AE1-A08F-BC6B67523676}"/>
               </a:ext>
             </a:extLst>
           </p:cNvPr>
@@ -6582,8 +7183,8 @@
         </p:nvSpPr>
         <p:spPr>
           <a:xfrm>
-            <a:off x="5526885" y="628882"/>
-            <a:ext cx="4251489" cy="646331"/>
+            <a:off x="4646247" y="1995294"/>
+            <a:ext cx="5645997" cy="923330"/>
           </a:xfrm>
           <a:prstGeom prst="rect">
             <a:avLst/>
@@ -6597,226 +7198,16 @@
           <a:lstStyle/>
           <a:p>
             <a:r>
-              <a:rPr lang="en-US" i="1" dirty="0"/>
-              <a:t>“have you donated to a charity in the past month?”</a:t>
-            </a:r>
-          </a:p>
-        </p:txBody>
-      </p:sp>
-      <p:pic>
-        <p:nvPicPr>
-          <p:cNvPr id="13" name="Picture 12">
-            <a:extLst>
-              <a:ext uri="{FF2B5EF4-FFF2-40B4-BE49-F238E27FC236}">
-                <a16:creationId xmlns:a16="http://schemas.microsoft.com/office/drawing/2014/main" id="{DA3EFC52-DFDA-48D4-AB3F-79CFD568CF96}"/>
-              </a:ext>
-            </a:extLst>
-          </p:cNvPr>
-          <p:cNvPicPr>
-            <a:picLocks noChangeAspect="1"/>
-          </p:cNvPicPr>
-          <p:nvPr/>
-        </p:nvPicPr>
-        <p:blipFill>
-          <a:blip r:embed="rId5"/>
-          <a:stretch>
-            <a:fillRect/>
-          </a:stretch>
-        </p:blipFill>
-        <p:spPr>
-          <a:xfrm>
-            <a:off x="0" y="4042782"/>
-            <a:ext cx="5900814" cy="2387516"/>
-          </a:xfrm>
-          <a:prstGeom prst="rect">
-            <a:avLst/>
-          </a:prstGeom>
-        </p:spPr>
-      </p:pic>
-      <p:cxnSp>
-        <p:nvCxnSpPr>
-          <p:cNvPr id="4" name="Straight Arrow Connector 3">
-            <a:extLst>
-              <a:ext uri="{FF2B5EF4-FFF2-40B4-BE49-F238E27FC236}">
-                <a16:creationId xmlns:a16="http://schemas.microsoft.com/office/drawing/2014/main" id="{D0FBFDD4-EEB2-41E4-A8E5-8B54088D7A41}"/>
-              </a:ext>
-            </a:extLst>
-          </p:cNvPr>
-          <p:cNvCxnSpPr>
-            <a:cxnSpLocks/>
-          </p:cNvCxnSpPr>
-          <p:nvPr/>
-        </p:nvCxnSpPr>
-        <p:spPr>
-          <a:xfrm flipH="1" flipV="1">
-            <a:off x="8525196" y="1355036"/>
-            <a:ext cx="1372837" cy="72760"/>
-          </a:xfrm>
-          <a:prstGeom prst="straightConnector1">
-            <a:avLst/>
-          </a:prstGeom>
-          <a:ln>
-            <a:tailEnd type="triangle"/>
-          </a:ln>
-        </p:spPr>
-        <p:style>
-          <a:lnRef idx="1">
-            <a:schemeClr val="accent1"/>
-          </a:lnRef>
-          <a:fillRef idx="0">
-            <a:schemeClr val="accent1"/>
-          </a:fillRef>
-          <a:effectRef idx="0">
-            <a:schemeClr val="accent1"/>
-          </a:effectRef>
-          <a:fontRef idx="minor">
-            <a:schemeClr val="tx1"/>
-          </a:fontRef>
-        </p:style>
-      </p:cxnSp>
-      <p:sp>
-        <p:nvSpPr>
-          <p:cNvPr id="7" name="TextBox 6">
-            <a:extLst>
-              <a:ext uri="{FF2B5EF4-FFF2-40B4-BE49-F238E27FC236}">
-                <a16:creationId xmlns:a16="http://schemas.microsoft.com/office/drawing/2014/main" id="{7D7B46F7-480D-47FC-ABAE-FD72D951A46F}"/>
-              </a:ext>
-            </a:extLst>
-          </p:cNvPr>
-          <p:cNvSpPr txBox="1"/>
-          <p:nvPr/>
-        </p:nvSpPr>
-        <p:spPr>
-          <a:xfrm>
-            <a:off x="9824489" y="1254059"/>
-            <a:ext cx="1066800" cy="369332"/>
-          </a:xfrm>
-          <a:prstGeom prst="rect">
-            <a:avLst/>
-          </a:prstGeom>
-          <a:noFill/>
-        </p:spPr>
-        <p:txBody>
-          <a:bodyPr wrap="square" rtlCol="0">
-            <a:spAutoFit/>
-          </a:bodyPr>
-          <a:lstStyle/>
-          <a:p>
-            <a:r>
               <a:rPr lang="en-US" dirty="0"/>
-              <a:t>Myanmar</a:t>
-            </a:r>
-          </a:p>
-        </p:txBody>
-      </p:sp>
-      <p:cxnSp>
-        <p:nvCxnSpPr>
-          <p:cNvPr id="16" name="Straight Arrow Connector 15">
-            <a:extLst>
-              <a:ext uri="{FF2B5EF4-FFF2-40B4-BE49-F238E27FC236}">
-                <a16:creationId xmlns:a16="http://schemas.microsoft.com/office/drawing/2014/main" id="{F944668B-E115-4E3F-90A7-D59C1FB2EBB4}"/>
-              </a:ext>
-            </a:extLst>
-          </p:cNvPr>
-          <p:cNvCxnSpPr/>
-          <p:nvPr/>
-        </p:nvCxnSpPr>
-        <p:spPr>
-          <a:xfrm flipH="1">
-            <a:off x="5655277" y="3158778"/>
-            <a:ext cx="462924" cy="0"/>
-          </a:xfrm>
-          <a:prstGeom prst="straightConnector1">
-            <a:avLst/>
-          </a:prstGeom>
-          <a:ln>
-            <a:tailEnd type="triangle"/>
-          </a:ln>
-        </p:spPr>
-        <p:style>
-          <a:lnRef idx="1">
-            <a:schemeClr val="accent1"/>
-          </a:lnRef>
-          <a:fillRef idx="0">
-            <a:schemeClr val="accent1"/>
-          </a:fillRef>
-          <a:effectRef idx="0">
-            <a:schemeClr val="accent1"/>
-          </a:effectRef>
-          <a:fontRef idx="minor">
-            <a:schemeClr val="tx1"/>
-          </a:fontRef>
-        </p:style>
-      </p:cxnSp>
-      <p:sp>
-        <p:nvSpPr>
-          <p:cNvPr id="17" name="TextBox 16">
-            <a:extLst>
-              <a:ext uri="{FF2B5EF4-FFF2-40B4-BE49-F238E27FC236}">
-                <a16:creationId xmlns:a16="http://schemas.microsoft.com/office/drawing/2014/main" id="{D20BB5D4-730C-40F0-A158-3F9916AC363C}"/>
-              </a:ext>
-            </a:extLst>
-          </p:cNvPr>
-          <p:cNvSpPr txBox="1"/>
-          <p:nvPr/>
-        </p:nvSpPr>
-        <p:spPr>
-          <a:xfrm>
-            <a:off x="5655277" y="3112612"/>
-            <a:ext cx="740929" cy="369332"/>
-          </a:xfrm>
-          <a:prstGeom prst="rect">
-            <a:avLst/>
-          </a:prstGeom>
-          <a:noFill/>
-        </p:spPr>
-        <p:txBody>
-          <a:bodyPr wrap="square" rtlCol="0">
-            <a:spAutoFit/>
-          </a:bodyPr>
-          <a:lstStyle/>
-          <a:p>
-            <a:r>
-              <a:rPr lang="en-US" dirty="0"/>
-              <a:t>Togo</a:t>
-            </a:r>
-          </a:p>
-        </p:txBody>
-      </p:sp>
-      <p:pic>
-        <p:nvPicPr>
-          <p:cNvPr id="18" name="Picture 17">
-            <a:extLst>
-              <a:ext uri="{FF2B5EF4-FFF2-40B4-BE49-F238E27FC236}">
-                <a16:creationId xmlns:a16="http://schemas.microsoft.com/office/drawing/2014/main" id="{DFD455F5-6208-4801-BD80-3E729CAC2697}"/>
-              </a:ext>
-            </a:extLst>
-          </p:cNvPr>
-          <p:cNvPicPr>
-            <a:picLocks noChangeAspect="1"/>
-          </p:cNvPicPr>
-          <p:nvPr/>
-        </p:nvPicPr>
-        <p:blipFill>
-          <a:blip r:embed="rId6"/>
-          <a:stretch>
-            <a:fillRect/>
-          </a:stretch>
-        </p:blipFill>
-        <p:spPr>
-          <a:xfrm>
-            <a:off x="67217" y="1161823"/>
-            <a:ext cx="5022545" cy="2762124"/>
-          </a:xfrm>
-          <a:prstGeom prst="rect">
-            <a:avLst/>
-          </a:prstGeom>
-        </p:spPr>
-      </p:pic>
+              <a:t>Why we chose to look government type– we noticed bottom countries on happiness score were going through political turmoil in the last few years. </a:t>
+            </a:r>
+          </a:p>
+        </p:txBody>
+      </p:sp>
     </p:spTree>
     <p:extLst>
       <p:ext uri="{BB962C8B-B14F-4D97-AF65-F5344CB8AC3E}">
-        <p14:creationId xmlns:p14="http://schemas.microsoft.com/office/powerpoint/2010/main" val="3770245964"/>
+        <p14:creationId xmlns:p14="http://schemas.microsoft.com/office/powerpoint/2010/main" val="2480795033"/>
       </p:ext>
     </p:extLst>
   </p:cSld>
@@ -6848,7 +7239,7 @@
           <p:cNvPr id="2" name="Title 1">
             <a:extLst>
               <a:ext uri="{FF2B5EF4-FFF2-40B4-BE49-F238E27FC236}">
-                <a16:creationId xmlns:a16="http://schemas.microsoft.com/office/drawing/2014/main" id="{B23B07FD-33BE-4BD8-AF80-0793A9044D79}"/>
+                <a16:creationId xmlns:a16="http://schemas.microsoft.com/office/drawing/2014/main" id="{459AD078-27CE-423F-AB39-A6E44464212F}"/>
               </a:ext>
             </a:extLst>
           </p:cNvPr>
@@ -6866,26 +7257,24 @@
           <a:p>
             <a:r>
               <a:rPr lang="en-US" dirty="0"/>
-              <a:t>Government Types/Happiness </a:t>
+              <a:t>What’s the weather today for our happy countries? </a:t>
             </a:r>
           </a:p>
         </p:txBody>
       </p:sp>
       <p:pic>
         <p:nvPicPr>
-          <p:cNvPr id="5" name="Content Placeholder 4">
-            <a:extLst>
-              <a:ext uri="{FF2B5EF4-FFF2-40B4-BE49-F238E27FC236}">
-                <a16:creationId xmlns:a16="http://schemas.microsoft.com/office/drawing/2014/main" id="{C1DB05DB-995C-4974-9A76-100C1A36C908}"/>
+          <p:cNvPr id="5" name="Picture 4">
+            <a:extLst>
+              <a:ext uri="{FF2B5EF4-FFF2-40B4-BE49-F238E27FC236}">
+                <a16:creationId xmlns:a16="http://schemas.microsoft.com/office/drawing/2014/main" id="{AC35DD49-2730-4547-BADD-E7BCCF6349C4}"/>
               </a:ext>
             </a:extLst>
           </p:cNvPr>
           <p:cNvPicPr>
-            <a:picLocks noGrp="1" noChangeAspect="1"/>
+            <a:picLocks noChangeAspect="1"/>
           </p:cNvPicPr>
-          <p:nvPr>
-            <p:ph idx="1"/>
-          </p:nvPr>
+          <p:nvPr/>
         </p:nvPicPr>
         <p:blipFill>
           <a:blip r:embed="rId3"/>
@@ -6895,24 +7284,29 @@
         </p:blipFill>
         <p:spPr>
           <a:xfrm>
-            <a:off x="539962" y="2282825"/>
-            <a:ext cx="3739091" cy="3760788"/>
-          </a:xfrm>
+            <a:off x="9953402" y="313485"/>
+            <a:ext cx="1655668" cy="1450758"/>
+          </a:xfrm>
+          <a:prstGeom prst="rect">
+            <a:avLst/>
+          </a:prstGeom>
         </p:spPr>
       </p:pic>
       <p:pic>
         <p:nvPicPr>
-          <p:cNvPr id="7" name="Picture 6">
-            <a:extLst>
-              <a:ext uri="{FF2B5EF4-FFF2-40B4-BE49-F238E27FC236}">
-                <a16:creationId xmlns:a16="http://schemas.microsoft.com/office/drawing/2014/main" id="{7C3D8F98-4FB4-4406-9194-B803D216FC50}"/>
+          <p:cNvPr id="10" name="Content Placeholder 9">
+            <a:extLst>
+              <a:ext uri="{FF2B5EF4-FFF2-40B4-BE49-F238E27FC236}">
+                <a16:creationId xmlns:a16="http://schemas.microsoft.com/office/drawing/2014/main" id="{DA996BA9-42C6-42DE-B658-6ECBE2BE3002}"/>
               </a:ext>
             </a:extLst>
           </p:cNvPr>
           <p:cNvPicPr>
-            <a:picLocks noChangeAspect="1"/>
+            <a:picLocks noGrp="1" noChangeAspect="1"/>
           </p:cNvPicPr>
-          <p:nvPr/>
+          <p:nvPr>
+            <p:ph idx="1"/>
+          </p:nvPr>
         </p:nvPicPr>
         <p:blipFill>
           <a:blip r:embed="rId4"/>
@@ -6922,229 +7316,105 @@
         </p:blipFill>
         <p:spPr>
           <a:xfrm>
-            <a:off x="8735110" y="169643"/>
-            <a:ext cx="2591162" cy="1638529"/>
+            <a:off x="856804" y="2080788"/>
+            <a:ext cx="3024546" cy="2028225"/>
+          </a:xfrm>
+        </p:spPr>
+      </p:pic>
+      <p:pic>
+        <p:nvPicPr>
+          <p:cNvPr id="12" name="Picture 11">
+            <a:extLst>
+              <a:ext uri="{FF2B5EF4-FFF2-40B4-BE49-F238E27FC236}">
+                <a16:creationId xmlns:a16="http://schemas.microsoft.com/office/drawing/2014/main" id="{8CF33ABD-BF90-4C46-AF13-7553BA0F3CEA}"/>
+              </a:ext>
+            </a:extLst>
+          </p:cNvPr>
+          <p:cNvPicPr>
+            <a:picLocks noChangeAspect="1"/>
+          </p:cNvPicPr>
+          <p:nvPr/>
+        </p:nvPicPr>
+        <p:blipFill>
+          <a:blip r:embed="rId5"/>
+          <a:stretch>
+            <a:fillRect/>
+          </a:stretch>
+        </p:blipFill>
+        <p:spPr>
+          <a:xfrm>
+            <a:off x="4276407" y="1978242"/>
+            <a:ext cx="3229426" cy="2229161"/>
           </a:xfrm>
           <a:prstGeom prst="rect">
             <a:avLst/>
           </a:prstGeom>
         </p:spPr>
       </p:pic>
-      <p:sp>
-        <p:nvSpPr>
-          <p:cNvPr id="8" name="TextBox 7">
-            <a:extLst>
-              <a:ext uri="{FF2B5EF4-FFF2-40B4-BE49-F238E27FC236}">
-                <a16:creationId xmlns:a16="http://schemas.microsoft.com/office/drawing/2014/main" id="{FC4DCC5A-DE60-4551-9F06-B80593C45BC0}"/>
-              </a:ext>
-            </a:extLst>
-          </p:cNvPr>
-          <p:cNvSpPr txBox="1"/>
+      <p:pic>
+        <p:nvPicPr>
+          <p:cNvPr id="14" name="Picture 13">
+            <a:extLst>
+              <a:ext uri="{FF2B5EF4-FFF2-40B4-BE49-F238E27FC236}">
+                <a16:creationId xmlns:a16="http://schemas.microsoft.com/office/drawing/2014/main" id="{41A296EC-7120-447E-98CD-A86A1F43B1A3}"/>
+              </a:ext>
+            </a:extLst>
+          </p:cNvPr>
+          <p:cNvPicPr>
+            <a:picLocks noChangeAspect="1"/>
+          </p:cNvPicPr>
           <p:nvPr/>
-        </p:nvSpPr>
-        <p:spPr>
-          <a:xfrm>
-            <a:off x="4622276" y="3609976"/>
-            <a:ext cx="6533404" cy="1323439"/>
+        </p:nvPicPr>
+        <p:blipFill>
+          <a:blip r:embed="rId6"/>
+          <a:stretch>
+            <a:fillRect/>
+          </a:stretch>
+        </p:blipFill>
+        <p:spPr>
+          <a:xfrm>
+            <a:off x="7926254" y="1978242"/>
+            <a:ext cx="3229426" cy="2152950"/>
           </a:xfrm>
           <a:prstGeom prst="rect">
             <a:avLst/>
           </a:prstGeom>
-          <a:noFill/>
-        </p:spPr>
-        <p:txBody>
-          <a:bodyPr wrap="square">
-            <a:spAutoFit/>
-          </a:bodyPr>
-          <a:lstStyle/>
-          <a:p>
-            <a:pPr>
-              <a:buFont typeface="Arial" panose="020B0604020202020204" pitchFamily="34" charset="0"/>
-              <a:buChar char="•"/>
-            </a:pPr>
-            <a:r>
-              <a:rPr lang="en-US" sz="1600" b="1" i="0" dirty="0">
-                <a:solidFill>
-                  <a:srgbClr val="000000"/>
-                </a:solidFill>
-                <a:effectLst/>
-                <a:highlight>
-                  <a:srgbClr val="FFFF00"/>
-                </a:highlight>
-                <a:latin typeface="Helvetica Neue"/>
-              </a:rPr>
-              <a:t>Parliamentary</a:t>
-            </a:r>
-            <a:r>
-              <a:rPr lang="en-US" sz="1600" b="0" i="0" dirty="0">
-                <a:solidFill>
-                  <a:srgbClr val="000000"/>
-                </a:solidFill>
-                <a:effectLst/>
-                <a:latin typeface="Helvetica Neue"/>
-              </a:rPr>
-              <a:t>- Countries in which people vote for a party and party selects leader. (</a:t>
-            </a:r>
-            <a:r>
-              <a:rPr lang="en-US" sz="1600" b="0" i="0" dirty="0" err="1">
-                <a:solidFill>
-                  <a:srgbClr val="000000"/>
-                </a:solidFill>
-                <a:effectLst/>
-                <a:latin typeface="Helvetica Neue"/>
-              </a:rPr>
-              <a:t>ex:Britain</a:t>
-            </a:r>
-            <a:r>
-              <a:rPr lang="en-US" sz="1600" b="0" i="0" dirty="0">
-                <a:solidFill>
-                  <a:srgbClr val="000000"/>
-                </a:solidFill>
-                <a:effectLst/>
-                <a:latin typeface="Helvetica Neue"/>
-              </a:rPr>
-              <a:t>)</a:t>
-            </a:r>
-          </a:p>
-          <a:p>
-            <a:pPr>
-              <a:buFont typeface="Arial" panose="020B0604020202020204" pitchFamily="34" charset="0"/>
-              <a:buChar char="•"/>
-            </a:pPr>
-            <a:r>
-              <a:rPr lang="en-US" sz="1600" b="1" i="0" dirty="0">
-                <a:solidFill>
-                  <a:srgbClr val="000000"/>
-                </a:solidFill>
-                <a:effectLst/>
-                <a:highlight>
-                  <a:srgbClr val="FFFF00"/>
-                </a:highlight>
-                <a:latin typeface="Helvetica Neue"/>
-              </a:rPr>
-              <a:t>Direct Presidential </a:t>
-            </a:r>
-            <a:r>
-              <a:rPr lang="en-US" sz="1600" b="0" i="0" dirty="0">
-                <a:solidFill>
-                  <a:srgbClr val="000000"/>
-                </a:solidFill>
-                <a:effectLst/>
-                <a:latin typeface="Helvetica Neue"/>
-              </a:rPr>
-              <a:t>– Countries in which people for the executive leader directly. (</a:t>
-            </a:r>
-            <a:r>
-              <a:rPr lang="en-US" sz="1600" b="0" i="0" dirty="0" err="1">
-                <a:solidFill>
-                  <a:srgbClr val="000000"/>
-                </a:solidFill>
-                <a:effectLst/>
-                <a:latin typeface="Helvetica Neue"/>
-              </a:rPr>
-              <a:t>ex:USA</a:t>
-            </a:r>
-            <a:r>
-              <a:rPr lang="en-US" sz="1600" b="0" i="0" dirty="0">
-                <a:solidFill>
-                  <a:srgbClr val="000000"/>
-                </a:solidFill>
-                <a:effectLst/>
-                <a:latin typeface="Helvetica Neue"/>
-              </a:rPr>
-              <a:t>)</a:t>
-            </a:r>
-          </a:p>
-          <a:p>
-            <a:pPr>
-              <a:buFont typeface="Arial" panose="020B0604020202020204" pitchFamily="34" charset="0"/>
-              <a:buChar char="•"/>
-            </a:pPr>
-            <a:r>
-              <a:rPr lang="en-US" sz="1600" b="1" i="0" dirty="0">
-                <a:solidFill>
-                  <a:srgbClr val="000000"/>
-                </a:solidFill>
-                <a:effectLst/>
-                <a:highlight>
-                  <a:srgbClr val="FFFF00"/>
-                </a:highlight>
-                <a:latin typeface="Helvetica Neue"/>
-              </a:rPr>
-              <a:t>Assembly-elected President </a:t>
-            </a:r>
-            <a:r>
-              <a:rPr lang="en-US" sz="1600" b="0" i="0" dirty="0">
-                <a:solidFill>
-                  <a:srgbClr val="000000"/>
-                </a:solidFill>
-                <a:effectLst/>
-                <a:latin typeface="Helvetica Neue"/>
-              </a:rPr>
-              <a:t>– Is done by an assembly. (</a:t>
-            </a:r>
-            <a:r>
-              <a:rPr lang="en-US" sz="1600" b="0" i="0" dirty="0" err="1">
-                <a:solidFill>
-                  <a:srgbClr val="000000"/>
-                </a:solidFill>
-                <a:effectLst/>
-                <a:latin typeface="Helvetica Neue"/>
-              </a:rPr>
-              <a:t>ex:China</a:t>
-            </a:r>
-            <a:r>
-              <a:rPr lang="en-US" sz="1600" b="0" i="0" dirty="0">
-                <a:solidFill>
-                  <a:srgbClr val="000000"/>
-                </a:solidFill>
-                <a:effectLst/>
-                <a:latin typeface="Helvetica Neue"/>
-              </a:rPr>
-              <a:t>)</a:t>
-            </a:r>
-          </a:p>
-        </p:txBody>
-      </p:sp>
-      <p:sp>
-        <p:nvSpPr>
-          <p:cNvPr id="3" name="TextBox 2">
-            <a:extLst>
-              <a:ext uri="{FF2B5EF4-FFF2-40B4-BE49-F238E27FC236}">
-                <a16:creationId xmlns:a16="http://schemas.microsoft.com/office/drawing/2014/main" id="{F8F998B5-79EF-4AE1-A08F-BC6B67523676}"/>
-              </a:ext>
-            </a:extLst>
-          </p:cNvPr>
-          <p:cNvSpPr txBox="1"/>
+        </p:spPr>
+      </p:pic>
+      <p:pic>
+        <p:nvPicPr>
+          <p:cNvPr id="16" name="Picture 15">
+            <a:extLst>
+              <a:ext uri="{FF2B5EF4-FFF2-40B4-BE49-F238E27FC236}">
+                <a16:creationId xmlns:a16="http://schemas.microsoft.com/office/drawing/2014/main" id="{ADF52B86-0C38-4AE2-A1CF-D65EA3F155A0}"/>
+              </a:ext>
+            </a:extLst>
+          </p:cNvPr>
+          <p:cNvPicPr>
+            <a:picLocks noChangeAspect="1"/>
+          </p:cNvPicPr>
           <p:nvPr/>
-        </p:nvSpPr>
-        <p:spPr>
-          <a:xfrm>
-            <a:off x="4646247" y="1995294"/>
-            <a:ext cx="5645997" cy="923330"/>
+        </p:nvPicPr>
+        <p:blipFill>
+          <a:blip r:embed="rId7"/>
+          <a:stretch>
+            <a:fillRect/>
+          </a:stretch>
+        </p:blipFill>
+        <p:spPr>
+          <a:xfrm>
+            <a:off x="856804" y="4109013"/>
+            <a:ext cx="3172268" cy="2200582"/>
           </a:xfrm>
           <a:prstGeom prst="rect">
             <a:avLst/>
           </a:prstGeom>
-          <a:noFill/>
-        </p:spPr>
-        <p:txBody>
-          <a:bodyPr wrap="square" rtlCol="0">
-            <a:spAutoFit/>
-          </a:bodyPr>
-          <a:lstStyle/>
-          <a:p>
-            <a:r>
-              <a:rPr lang="en-US" dirty="0"/>
-              <a:t>Why we chose to look government type– we noticed bottom countries on happiness score were going through political turmoil in the last few years. </a:t>
-            </a:r>
-          </a:p>
-        </p:txBody>
-      </p:sp>
+        </p:spPr>
+      </p:pic>
     </p:spTree>
     <p:extLst>
       <p:ext uri="{BB962C8B-B14F-4D97-AF65-F5344CB8AC3E}">
-        <p14:creationId xmlns:p14="http://schemas.microsoft.com/office/powerpoint/2010/main" val="2480795033"/>
+        <p14:creationId xmlns:p14="http://schemas.microsoft.com/office/powerpoint/2010/main" val="647234098"/>
       </p:ext>
     </p:extLst>
   </p:cSld>
@@ -7176,7 +7446,7 @@
           <p:cNvPr id="2" name="Title 1">
             <a:extLst>
               <a:ext uri="{FF2B5EF4-FFF2-40B4-BE49-F238E27FC236}">
-                <a16:creationId xmlns:a16="http://schemas.microsoft.com/office/drawing/2014/main" id="{459AD078-27CE-423F-AB39-A6E44464212F}"/>
+                <a16:creationId xmlns:a16="http://schemas.microsoft.com/office/drawing/2014/main" id="{951FCCE5-F396-4E4F-9258-CD5C309F7143}"/>
               </a:ext>
             </a:extLst>
           </p:cNvPr>
@@ -7194,164 +7464,71 @@
           <a:p>
             <a:r>
               <a:rPr lang="en-US" dirty="0"/>
-              <a:t>What’s the weather today for our happy countries? </a:t>
-            </a:r>
-          </a:p>
-        </p:txBody>
-      </p:sp>
-      <p:pic>
-        <p:nvPicPr>
-          <p:cNvPr id="5" name="Picture 4">
-            <a:extLst>
-              <a:ext uri="{FF2B5EF4-FFF2-40B4-BE49-F238E27FC236}">
-                <a16:creationId xmlns:a16="http://schemas.microsoft.com/office/drawing/2014/main" id="{AC35DD49-2730-4547-BADD-E7BCCF6349C4}"/>
-              </a:ext>
-            </a:extLst>
-          </p:cNvPr>
-          <p:cNvPicPr>
-            <a:picLocks noChangeAspect="1"/>
-          </p:cNvPicPr>
-          <p:nvPr/>
-        </p:nvPicPr>
-        <p:blipFill>
-          <a:blip r:embed="rId3"/>
-          <a:stretch>
-            <a:fillRect/>
-          </a:stretch>
-        </p:blipFill>
-        <p:spPr>
-          <a:xfrm>
-            <a:off x="9953402" y="313485"/>
-            <a:ext cx="1655668" cy="1450758"/>
-          </a:xfrm>
-          <a:prstGeom prst="rect">
-            <a:avLst/>
-          </a:prstGeom>
-        </p:spPr>
-      </p:pic>
-      <p:pic>
-        <p:nvPicPr>
-          <p:cNvPr id="10" name="Content Placeholder 9">
-            <a:extLst>
-              <a:ext uri="{FF2B5EF4-FFF2-40B4-BE49-F238E27FC236}">
-                <a16:creationId xmlns:a16="http://schemas.microsoft.com/office/drawing/2014/main" id="{DA996BA9-42C6-42DE-B658-6ECBE2BE3002}"/>
-              </a:ext>
-            </a:extLst>
-          </p:cNvPr>
-          <p:cNvPicPr>
-            <a:picLocks noGrp="1" noChangeAspect="1"/>
-          </p:cNvPicPr>
+              <a:t>Implications </a:t>
+            </a:r>
+          </a:p>
+        </p:txBody>
+      </p:sp>
+      <p:sp>
+        <p:nvSpPr>
+          <p:cNvPr id="3" name="Content Placeholder 2">
+            <a:extLst>
+              <a:ext uri="{FF2B5EF4-FFF2-40B4-BE49-F238E27FC236}">
+                <a16:creationId xmlns:a16="http://schemas.microsoft.com/office/drawing/2014/main" id="{90052CD4-9FA3-43F1-8BC8-F2D881422588}"/>
+              </a:ext>
+            </a:extLst>
+          </p:cNvPr>
+          <p:cNvSpPr>
+            <a:spLocks noGrp="1"/>
+          </p:cNvSpPr>
           <p:nvPr>
             <p:ph idx="1"/>
           </p:nvPr>
-        </p:nvPicPr>
-        <p:blipFill>
-          <a:blip r:embed="rId4"/>
-          <a:stretch>
-            <a:fillRect/>
-          </a:stretch>
-        </p:blipFill>
-        <p:spPr>
-          <a:xfrm>
-            <a:off x="856804" y="2080788"/>
-            <a:ext cx="3024546" cy="2028225"/>
-          </a:xfrm>
-        </p:spPr>
-      </p:pic>
-      <p:pic>
-        <p:nvPicPr>
-          <p:cNvPr id="12" name="Picture 11">
-            <a:extLst>
-              <a:ext uri="{FF2B5EF4-FFF2-40B4-BE49-F238E27FC236}">
-                <a16:creationId xmlns:a16="http://schemas.microsoft.com/office/drawing/2014/main" id="{8CF33ABD-BF90-4C46-AF13-7553BA0F3CEA}"/>
-              </a:ext>
-            </a:extLst>
-          </p:cNvPr>
-          <p:cNvPicPr>
-            <a:picLocks noChangeAspect="1"/>
-          </p:cNvPicPr>
-          <p:nvPr/>
-        </p:nvPicPr>
-        <p:blipFill>
-          <a:blip r:embed="rId5"/>
-          <a:stretch>
-            <a:fillRect/>
-          </a:stretch>
-        </p:blipFill>
-        <p:spPr>
-          <a:xfrm>
-            <a:off x="4276407" y="1978242"/>
-            <a:ext cx="3229426" cy="2229161"/>
-          </a:xfrm>
-          <a:prstGeom prst="rect">
-            <a:avLst/>
-          </a:prstGeom>
-        </p:spPr>
-      </p:pic>
-      <p:pic>
-        <p:nvPicPr>
-          <p:cNvPr id="14" name="Picture 13">
-            <a:extLst>
-              <a:ext uri="{FF2B5EF4-FFF2-40B4-BE49-F238E27FC236}">
-                <a16:creationId xmlns:a16="http://schemas.microsoft.com/office/drawing/2014/main" id="{41A296EC-7120-447E-98CD-A86A1F43B1A3}"/>
-              </a:ext>
-            </a:extLst>
-          </p:cNvPr>
-          <p:cNvPicPr>
-            <a:picLocks noChangeAspect="1"/>
-          </p:cNvPicPr>
-          <p:nvPr/>
-        </p:nvPicPr>
-        <p:blipFill>
-          <a:blip r:embed="rId6"/>
-          <a:stretch>
-            <a:fillRect/>
-          </a:stretch>
-        </p:blipFill>
-        <p:spPr>
-          <a:xfrm>
-            <a:off x="7926254" y="1978242"/>
-            <a:ext cx="3229426" cy="2152950"/>
-          </a:xfrm>
-          <a:prstGeom prst="rect">
-            <a:avLst/>
-          </a:prstGeom>
-        </p:spPr>
-      </p:pic>
-      <p:pic>
-        <p:nvPicPr>
-          <p:cNvPr id="16" name="Picture 15">
-            <a:extLst>
-              <a:ext uri="{FF2B5EF4-FFF2-40B4-BE49-F238E27FC236}">
-                <a16:creationId xmlns:a16="http://schemas.microsoft.com/office/drawing/2014/main" id="{ADF52B86-0C38-4AE2-A1CF-D65EA3F155A0}"/>
-              </a:ext>
-            </a:extLst>
-          </p:cNvPr>
-          <p:cNvPicPr>
-            <a:picLocks noChangeAspect="1"/>
-          </p:cNvPicPr>
-          <p:nvPr/>
-        </p:nvPicPr>
-        <p:blipFill>
-          <a:blip r:embed="rId7"/>
-          <a:stretch>
-            <a:fillRect/>
-          </a:stretch>
-        </p:blipFill>
-        <p:spPr>
-          <a:xfrm>
-            <a:off x="856804" y="4109013"/>
-            <a:ext cx="3172268" cy="2200582"/>
-          </a:xfrm>
-          <a:prstGeom prst="rect">
-            <a:avLst/>
-          </a:prstGeom>
-        </p:spPr>
-      </p:pic>
+        </p:nvSpPr>
+        <p:spPr/>
+        <p:txBody>
+          <a:bodyPr/>
+          <a:lstStyle/>
+          <a:p>
+            <a:r>
+              <a:rPr lang="en-US" dirty="0"/>
+              <a:t>To be happy….</a:t>
+            </a:r>
+          </a:p>
+          <a:p>
+            <a:pPr lvl="1"/>
+            <a:r>
+              <a:rPr lang="en-US" dirty="0"/>
+              <a:t>Surround yourself with a strong social support </a:t>
+            </a:r>
+          </a:p>
+          <a:p>
+            <a:pPr lvl="1"/>
+            <a:r>
+              <a:rPr lang="en-US" dirty="0"/>
+              <a:t>Access to best medicine/technology </a:t>
+            </a:r>
+          </a:p>
+          <a:p>
+            <a:pPr lvl="1"/>
+            <a:r>
+              <a:rPr lang="en-US" dirty="0"/>
+              <a:t>Access to employment generally helps </a:t>
+            </a:r>
+          </a:p>
+          <a:p>
+            <a:pPr lvl="1"/>
+            <a:r>
+              <a:rPr lang="en-US" dirty="0"/>
+              <a:t>Government that aligns with commitment to happiness  </a:t>
+            </a:r>
+          </a:p>
+        </p:txBody>
+      </p:sp>
     </p:spTree>
     <p:extLst>
       <p:ext uri="{BB962C8B-B14F-4D97-AF65-F5344CB8AC3E}">
-        <p14:creationId xmlns:p14="http://schemas.microsoft.com/office/powerpoint/2010/main" val="647234098"/>
+        <p14:creationId xmlns:p14="http://schemas.microsoft.com/office/powerpoint/2010/main" val="3166097411"/>
       </p:ext>
     </p:extLst>
   </p:cSld>
@@ -7378,86 +7555,67 @@
           <a:chExt cx="0" cy="0"/>
         </a:xfrm>
       </p:grpSpPr>
-      <p:sp>
-        <p:nvSpPr>
-          <p:cNvPr id="2" name="Title 1">
-            <a:extLst>
-              <a:ext uri="{FF2B5EF4-FFF2-40B4-BE49-F238E27FC236}">
-                <a16:creationId xmlns:a16="http://schemas.microsoft.com/office/drawing/2014/main" id="{951FCCE5-F396-4E4F-9258-CD5C309F7143}"/>
-              </a:ext>
-            </a:extLst>
-          </p:cNvPr>
-          <p:cNvSpPr>
-            <a:spLocks noGrp="1"/>
-          </p:cNvSpPr>
-          <p:nvPr>
-            <p:ph type="title"/>
-          </p:nvPr>
-        </p:nvSpPr>
-        <p:spPr/>
-        <p:txBody>
-          <a:bodyPr/>
-          <a:lstStyle/>
-          <a:p>
-            <a:r>
-              <a:rPr lang="en-US" dirty="0"/>
-              <a:t>Implications </a:t>
-            </a:r>
-          </a:p>
-        </p:txBody>
-      </p:sp>
-      <p:sp>
-        <p:nvSpPr>
-          <p:cNvPr id="3" name="Content Placeholder 2">
-            <a:extLst>
-              <a:ext uri="{FF2B5EF4-FFF2-40B4-BE49-F238E27FC236}">
-                <a16:creationId xmlns:a16="http://schemas.microsoft.com/office/drawing/2014/main" id="{90052CD4-9FA3-43F1-8BC8-F2D881422588}"/>
-              </a:ext>
-            </a:extLst>
-          </p:cNvPr>
-          <p:cNvSpPr>
-            <a:spLocks noGrp="1"/>
-          </p:cNvSpPr>
-          <p:nvPr>
-            <p:ph idx="1"/>
-          </p:nvPr>
-        </p:nvSpPr>
-        <p:spPr/>
-        <p:txBody>
-          <a:bodyPr/>
-          <a:lstStyle/>
-          <a:p>
-            <a:r>
-              <a:rPr lang="en-US" dirty="0"/>
-              <a:t>To be happy….</a:t>
-            </a:r>
-          </a:p>
-          <a:p>
-            <a:pPr lvl="1"/>
-            <a:r>
-              <a:rPr lang="en-US" dirty="0"/>
-              <a:t>Surround yourself with a strong social support </a:t>
-            </a:r>
-          </a:p>
-          <a:p>
-            <a:pPr lvl="1"/>
-            <a:r>
-              <a:rPr lang="en-US" dirty="0"/>
-              <a:t>Access to best medicine/technology </a:t>
-            </a:r>
-          </a:p>
-          <a:p>
-            <a:pPr lvl="1"/>
-            <a:r>
-              <a:rPr lang="en-US" dirty="0"/>
-              <a:t>Access to employment generally helps </a:t>
-            </a:r>
-          </a:p>
-          <a:p>
-            <a:pPr lvl="1"/>
-            <a:r>
-              <a:rPr lang="en-US" dirty="0"/>
-              <a:t>Government that aligns with commitment to happiness  </a:t>
+      <p:pic>
+        <p:nvPicPr>
+          <p:cNvPr id="6" name="Picture 5">
+            <a:extLst>
+              <a:ext uri="{FF2B5EF4-FFF2-40B4-BE49-F238E27FC236}">
+                <a16:creationId xmlns:a16="http://schemas.microsoft.com/office/drawing/2014/main" id="{84A8CE80-88A7-4195-B643-1210F4E9F506}"/>
+              </a:ext>
+            </a:extLst>
+          </p:cNvPr>
+          <p:cNvPicPr>
+            <a:picLocks noChangeAspect="1"/>
+          </p:cNvPicPr>
+          <p:nvPr/>
+        </p:nvPicPr>
+        <p:blipFill>
+          <a:blip r:embed="rId3"/>
+          <a:stretch>
+            <a:fillRect/>
+          </a:stretch>
+        </p:blipFill>
+        <p:spPr>
+          <a:xfrm>
+            <a:off x="6583221" y="1491305"/>
+            <a:ext cx="2470379" cy="3688334"/>
+          </a:xfrm>
+          <a:prstGeom prst="rect">
+            <a:avLst/>
+          </a:prstGeom>
+        </p:spPr>
+      </p:pic>
+      <p:sp>
+        <p:nvSpPr>
+          <p:cNvPr id="4" name="TextBox 3">
+            <a:extLst>
+              <a:ext uri="{FF2B5EF4-FFF2-40B4-BE49-F238E27FC236}">
+                <a16:creationId xmlns:a16="http://schemas.microsoft.com/office/drawing/2014/main" id="{564182C9-E433-46B5-9B51-143FE19DA354}"/>
+              </a:ext>
+            </a:extLst>
+          </p:cNvPr>
+          <p:cNvSpPr txBox="1"/>
+          <p:nvPr/>
+        </p:nvSpPr>
+        <p:spPr>
+          <a:xfrm>
+            <a:off x="4587765" y="2627586"/>
+            <a:ext cx="2706414" cy="707886"/>
+          </a:xfrm>
+          <a:prstGeom prst="rect">
+            <a:avLst/>
+          </a:prstGeom>
+          <a:noFill/>
+        </p:spPr>
+        <p:txBody>
+          <a:bodyPr wrap="square" rtlCol="0">
+            <a:spAutoFit/>
+          </a:bodyPr>
+          <a:lstStyle/>
+          <a:p>
+            <a:r>
+              <a:rPr lang="en-US" sz="4000" dirty="0"/>
+              <a:t>Questions?</a:t>
             </a:r>
           </a:p>
         </p:txBody>
@@ -7465,7 +7623,7 @@
     </p:spTree>
     <p:extLst>
       <p:ext uri="{BB962C8B-B14F-4D97-AF65-F5344CB8AC3E}">
-        <p14:creationId xmlns:p14="http://schemas.microsoft.com/office/powerpoint/2010/main" val="3166097411"/>
+        <p14:creationId xmlns:p14="http://schemas.microsoft.com/office/powerpoint/2010/main" val="2134786029"/>
       </p:ext>
     </p:extLst>
   </p:cSld>
@@ -7492,12 +7650,306 @@
           <a:chExt cx="0" cy="0"/>
         </a:xfrm>
       </p:grpSpPr>
+      <p:sp>
+        <p:nvSpPr>
+          <p:cNvPr id="2" name="Title 1">
+            <a:extLst>
+              <a:ext uri="{FF2B5EF4-FFF2-40B4-BE49-F238E27FC236}">
+                <a16:creationId xmlns:a16="http://schemas.microsoft.com/office/drawing/2014/main" id="{951FCCE5-F396-4E4F-9258-CD5C309F7143}"/>
+              </a:ext>
+            </a:extLst>
+          </p:cNvPr>
+          <p:cNvSpPr>
+            <a:spLocks noGrp="1"/>
+          </p:cNvSpPr>
+          <p:nvPr>
+            <p:ph type="title"/>
+          </p:nvPr>
+        </p:nvSpPr>
+        <p:spPr/>
+        <p:txBody>
+          <a:bodyPr/>
+          <a:lstStyle/>
+          <a:p>
+            <a:r>
+              <a:rPr lang="en-US" dirty="0"/>
+              <a:t>Backup</a:t>
+            </a:r>
+          </a:p>
+        </p:txBody>
+      </p:sp>
+      <p:sp>
+        <p:nvSpPr>
+          <p:cNvPr id="5" name="Content Placeholder 4">
+            <a:extLst>
+              <a:ext uri="{FF2B5EF4-FFF2-40B4-BE49-F238E27FC236}">
+                <a16:creationId xmlns:a16="http://schemas.microsoft.com/office/drawing/2014/main" id="{B0DCC7E2-1365-4577-89B7-4182C342F85D}"/>
+              </a:ext>
+            </a:extLst>
+          </p:cNvPr>
+          <p:cNvSpPr>
+            <a:spLocks noGrp="1"/>
+          </p:cNvSpPr>
+          <p:nvPr>
+            <p:ph idx="1"/>
+          </p:nvPr>
+        </p:nvSpPr>
+        <p:spPr/>
+        <p:txBody>
+          <a:bodyPr/>
+          <a:lstStyle/>
+          <a:p>
+            <a:endParaRPr lang="en-US"/>
+          </a:p>
+        </p:txBody>
+      </p:sp>
+    </p:spTree>
+    <p:extLst>
+      <p:ext uri="{BB962C8B-B14F-4D97-AF65-F5344CB8AC3E}">
+        <p14:creationId xmlns:p14="http://schemas.microsoft.com/office/powerpoint/2010/main" val="3787681752"/>
+      </p:ext>
+    </p:extLst>
+  </p:cSld>
+  <p:clrMapOvr>
+    <a:masterClrMapping/>
+  </p:clrMapOvr>
+</p:sld>
+</file>
+
+<file path=ppt/slides/slide18.xml><?xml version="1.0" encoding="utf-8"?>
+<p:sld xmlns:a="http://schemas.openxmlformats.org/drawingml/2006/main" xmlns:r="http://schemas.openxmlformats.org/officeDocument/2006/relationships" xmlns:p="http://schemas.openxmlformats.org/presentationml/2006/main">
+  <p:cSld>
+    <p:spTree>
+      <p:nvGrpSpPr>
+        <p:cNvPr id="1" name=""/>
+        <p:cNvGrpSpPr/>
+        <p:nvPr/>
+      </p:nvGrpSpPr>
+      <p:grpSpPr>
+        <a:xfrm>
+          <a:off x="0" y="0"/>
+          <a:ext cx="0" cy="0"/>
+          <a:chOff x="0" y="0"/>
+          <a:chExt cx="0" cy="0"/>
+        </a:xfrm>
+      </p:grpSpPr>
+      <p:sp>
+        <p:nvSpPr>
+          <p:cNvPr id="2" name="Title 1">
+            <a:extLst>
+              <a:ext uri="{FF2B5EF4-FFF2-40B4-BE49-F238E27FC236}">
+                <a16:creationId xmlns:a16="http://schemas.microsoft.com/office/drawing/2014/main" id="{66A7F96A-CE2F-405E-B325-959894CF443E}"/>
+              </a:ext>
+            </a:extLst>
+          </p:cNvPr>
+          <p:cNvSpPr>
+            <a:spLocks noGrp="1"/>
+          </p:cNvSpPr>
+          <p:nvPr>
+            <p:ph type="title"/>
+          </p:nvPr>
+        </p:nvSpPr>
+        <p:spPr/>
+        <p:txBody>
+          <a:bodyPr/>
+          <a:lstStyle/>
+          <a:p>
+            <a:r>
+              <a:rPr lang="en-US"/>
+              <a:t>Happiness Score</a:t>
+            </a:r>
+            <a:endParaRPr lang="en-US" dirty="0"/>
+          </a:p>
+        </p:txBody>
+      </p:sp>
+      <p:sp>
+        <p:nvSpPr>
+          <p:cNvPr id="10" name="TextBox 9">
+            <a:extLst>
+              <a:ext uri="{FF2B5EF4-FFF2-40B4-BE49-F238E27FC236}">
+                <a16:creationId xmlns:a16="http://schemas.microsoft.com/office/drawing/2014/main" id="{4DCDDC07-EE6D-45CB-9C81-D691DBF98263}"/>
+              </a:ext>
+            </a:extLst>
+          </p:cNvPr>
+          <p:cNvSpPr txBox="1"/>
+          <p:nvPr/>
+        </p:nvSpPr>
+        <p:spPr>
+          <a:xfrm>
+            <a:off x="0" y="4124832"/>
+            <a:ext cx="2247363" cy="276999"/>
+          </a:xfrm>
+          <a:prstGeom prst="rect">
+            <a:avLst/>
+          </a:prstGeom>
+          <a:noFill/>
+        </p:spPr>
+        <p:txBody>
+          <a:bodyPr wrap="square" rtlCol="0">
+            <a:spAutoFit/>
+          </a:bodyPr>
+          <a:lstStyle/>
+          <a:p>
+            <a:r>
+              <a:rPr lang="en-US" sz="1200" b="1"/>
+              <a:t>Breakdown of Happiness Score</a:t>
+            </a:r>
+            <a:endParaRPr lang="en-US" sz="1200" b="1" dirty="0"/>
+          </a:p>
+        </p:txBody>
+      </p:sp>
       <p:pic>
         <p:nvPicPr>
           <p:cNvPr id="6" name="Picture 5">
             <a:extLst>
               <a:ext uri="{FF2B5EF4-FFF2-40B4-BE49-F238E27FC236}">
-                <a16:creationId xmlns:a16="http://schemas.microsoft.com/office/drawing/2014/main" id="{84A8CE80-88A7-4195-B643-1210F4E9F506}"/>
+                <a16:creationId xmlns:a16="http://schemas.microsoft.com/office/drawing/2014/main" id="{AEC192F8-2823-4D92-8CAE-0D57B7F68E57}"/>
+              </a:ext>
+            </a:extLst>
+          </p:cNvPr>
+          <p:cNvPicPr>
+            <a:picLocks noChangeAspect="1"/>
+          </p:cNvPicPr>
+          <p:nvPr/>
+        </p:nvPicPr>
+        <p:blipFill rotWithShape="1">
+          <a:blip r:embed="rId3"/>
+          <a:srcRect l="4417" t="3622" r="2080" b="1985"/>
+          <a:stretch/>
+        </p:blipFill>
+        <p:spPr>
+          <a:xfrm>
+            <a:off x="2584508" y="2371242"/>
+            <a:ext cx="4941442" cy="3977519"/>
+          </a:xfrm>
+          <a:prstGeom prst="rect">
+            <a:avLst/>
+          </a:prstGeom>
+        </p:spPr>
+      </p:pic>
+      <p:pic>
+        <p:nvPicPr>
+          <p:cNvPr id="11" name="Picture 10">
+            <a:extLst>
+              <a:ext uri="{FF2B5EF4-FFF2-40B4-BE49-F238E27FC236}">
+                <a16:creationId xmlns:a16="http://schemas.microsoft.com/office/drawing/2014/main" id="{B5F02E17-6644-4AC2-8963-E07D07943E39}"/>
+              </a:ext>
+            </a:extLst>
+          </p:cNvPr>
+          <p:cNvPicPr>
+            <a:picLocks noChangeAspect="1"/>
+          </p:cNvPicPr>
+          <p:nvPr/>
+        </p:nvPicPr>
+        <p:blipFill rotWithShape="1">
+          <a:blip r:embed="rId4"/>
+          <a:srcRect l="4178" t="3863" r="3176" b="1980"/>
+          <a:stretch/>
+        </p:blipFill>
+        <p:spPr>
+          <a:xfrm>
+            <a:off x="7354967" y="2371241"/>
+            <a:ext cx="4837033" cy="3977519"/>
+          </a:xfrm>
+          <a:prstGeom prst="rect">
+            <a:avLst/>
+          </a:prstGeom>
+        </p:spPr>
+      </p:pic>
+      <p:pic>
+        <p:nvPicPr>
+          <p:cNvPr id="9" name="Picture 8">
+            <a:extLst>
+              <a:ext uri="{FF2B5EF4-FFF2-40B4-BE49-F238E27FC236}">
+                <a16:creationId xmlns:a16="http://schemas.microsoft.com/office/drawing/2014/main" id="{4DD3D7F9-9F7D-4648-97D9-DF84E500EF6A}"/>
+              </a:ext>
+            </a:extLst>
+          </p:cNvPr>
+          <p:cNvPicPr>
+            <a:picLocks noChangeAspect="1"/>
+          </p:cNvPicPr>
+          <p:nvPr/>
+        </p:nvPicPr>
+        <p:blipFill>
+          <a:blip r:embed="rId5"/>
+          <a:stretch>
+            <a:fillRect/>
+          </a:stretch>
+        </p:blipFill>
+        <p:spPr>
+          <a:xfrm>
+            <a:off x="0" y="1937362"/>
+            <a:ext cx="2749534" cy="1987468"/>
+          </a:xfrm>
+          <a:prstGeom prst="rect">
+            <a:avLst/>
+          </a:prstGeom>
+        </p:spPr>
+      </p:pic>
+    </p:spTree>
+    <p:extLst>
+      <p:ext uri="{BB962C8B-B14F-4D97-AF65-F5344CB8AC3E}">
+        <p14:creationId xmlns:p14="http://schemas.microsoft.com/office/powerpoint/2010/main" val="38700731"/>
+      </p:ext>
+    </p:extLst>
+  </p:cSld>
+  <p:clrMapOvr>
+    <a:masterClrMapping/>
+  </p:clrMapOvr>
+</p:sld>
+</file>
+
+<file path=ppt/slides/slide19.xml><?xml version="1.0" encoding="utf-8"?>
+<p:sld xmlns:a="http://schemas.openxmlformats.org/drawingml/2006/main" xmlns:r="http://schemas.openxmlformats.org/officeDocument/2006/relationships" xmlns:p="http://schemas.openxmlformats.org/presentationml/2006/main">
+  <p:cSld>
+    <p:spTree>
+      <p:nvGrpSpPr>
+        <p:cNvPr id="1" name=""/>
+        <p:cNvGrpSpPr/>
+        <p:nvPr/>
+      </p:nvGrpSpPr>
+      <p:grpSpPr>
+        <a:xfrm>
+          <a:off x="0" y="0"/>
+          <a:ext cx="0" cy="0"/>
+          <a:chOff x="0" y="0"/>
+          <a:chExt cx="0" cy="0"/>
+        </a:xfrm>
+      </p:grpSpPr>
+      <p:sp>
+        <p:nvSpPr>
+          <p:cNvPr id="2" name="Title 1">
+            <a:extLst>
+              <a:ext uri="{FF2B5EF4-FFF2-40B4-BE49-F238E27FC236}">
+                <a16:creationId xmlns:a16="http://schemas.microsoft.com/office/drawing/2014/main" id="{66A7F96A-CE2F-405E-B325-959894CF443E}"/>
+              </a:ext>
+            </a:extLst>
+          </p:cNvPr>
+          <p:cNvSpPr>
+            <a:spLocks noGrp="1"/>
+          </p:cNvSpPr>
+          <p:nvPr>
+            <p:ph type="title"/>
+          </p:nvPr>
+        </p:nvSpPr>
+        <p:spPr/>
+        <p:txBody>
+          <a:bodyPr/>
+          <a:lstStyle/>
+          <a:p>
+            <a:r>
+              <a:rPr lang="en-US" dirty="0"/>
+              <a:t>Region Analysis</a:t>
+            </a:r>
+          </a:p>
+        </p:txBody>
+      </p:sp>
+      <p:pic>
+        <p:nvPicPr>
+          <p:cNvPr id="3" name="Picture 2">
+            <a:extLst>
+              <a:ext uri="{FF2B5EF4-FFF2-40B4-BE49-F238E27FC236}">
+                <a16:creationId xmlns:a16="http://schemas.microsoft.com/office/drawing/2014/main" id="{3ADB876D-F772-4BF4-A194-A2E9334B4FB9}"/>
               </a:ext>
             </a:extLst>
           </p:cNvPr>
@@ -7514,53 +7966,18 @@
         </p:blipFill>
         <p:spPr>
           <a:xfrm>
-            <a:off x="6583221" y="1491305"/>
-            <a:ext cx="2470379" cy="3688334"/>
+            <a:off x="5757155" y="147266"/>
+            <a:ext cx="5944115" cy="5761219"/>
           </a:xfrm>
           <a:prstGeom prst="rect">
             <a:avLst/>
           </a:prstGeom>
         </p:spPr>
       </p:pic>
-      <p:sp>
-        <p:nvSpPr>
-          <p:cNvPr id="4" name="TextBox 3">
-            <a:extLst>
-              <a:ext uri="{FF2B5EF4-FFF2-40B4-BE49-F238E27FC236}">
-                <a16:creationId xmlns:a16="http://schemas.microsoft.com/office/drawing/2014/main" id="{564182C9-E433-46B5-9B51-143FE19DA354}"/>
-              </a:ext>
-            </a:extLst>
-          </p:cNvPr>
-          <p:cNvSpPr txBox="1"/>
-          <p:nvPr/>
-        </p:nvSpPr>
-        <p:spPr>
-          <a:xfrm>
-            <a:off x="4587765" y="2627586"/>
-            <a:ext cx="2706414" cy="707886"/>
-          </a:xfrm>
-          <a:prstGeom prst="rect">
-            <a:avLst/>
-          </a:prstGeom>
-          <a:noFill/>
-        </p:spPr>
-        <p:txBody>
-          <a:bodyPr wrap="square" rtlCol="0">
-            <a:spAutoFit/>
-          </a:bodyPr>
-          <a:lstStyle/>
-          <a:p>
-            <a:r>
-              <a:rPr lang="en-US" sz="4000" dirty="0"/>
-              <a:t>Questions?</a:t>
-            </a:r>
-          </a:p>
-        </p:txBody>
-      </p:sp>
     </p:spTree>
     <p:extLst>
       <p:ext uri="{BB962C8B-B14F-4D97-AF65-F5344CB8AC3E}">
-        <p14:creationId xmlns:p14="http://schemas.microsoft.com/office/powerpoint/2010/main" val="2134786029"/>
+        <p14:creationId xmlns:p14="http://schemas.microsoft.com/office/powerpoint/2010/main" val="3382068330"/>
       </p:ext>
     </p:extLst>
   </p:cSld>
@@ -10275,21 +10692,21 @@
 </file>
 
 <file path=customXml/item1.xml><?xml version="1.0" encoding="utf-8"?>
+<p:properties xmlns:p="http://schemas.microsoft.com/office/2006/metadata/properties" xmlns:xsi="http://www.w3.org/2001/XMLSchema-instance" xmlns:pc="http://schemas.microsoft.com/office/infopath/2007/PartnerControls">
+  <documentManagement>
+    <Status xmlns="71af3243-3dd4-4a8d-8c0d-dd76da1f02a5">Not started</Status>
+    <MediaServiceKeyPoints xmlns="71af3243-3dd4-4a8d-8c0d-dd76da1f02a5" xsi:nil="true"/>
+  </documentManagement>
+</p:properties>
+</file>
+
+<file path=customXml/item2.xml><?xml version="1.0" encoding="utf-8"?>
 <?mso-contentType ?>
 <FormTemplates xmlns="http://schemas.microsoft.com/sharepoint/v3/contenttype/forms">
   <Display>DocumentLibraryForm</Display>
   <Edit>DocumentLibraryForm</Edit>
   <New>DocumentLibraryForm</New>
 </FormTemplates>
-</file>
-
-<file path=customXml/item2.xml><?xml version="1.0" encoding="utf-8"?>
-<p:properties xmlns:p="http://schemas.microsoft.com/office/2006/metadata/properties" xmlns:xsi="http://www.w3.org/2001/XMLSchema-instance" xmlns:pc="http://schemas.microsoft.com/office/infopath/2007/PartnerControls">
-  <documentManagement>
-    <Status xmlns="71af3243-3dd4-4a8d-8c0d-dd76da1f02a5">Not started</Status>
-    <MediaServiceKeyPoints xmlns="71af3243-3dd4-4a8d-8c0d-dd76da1f02a5" xsi:nil="true"/>
-  </documentManagement>
-</p:properties>
 </file>
 
 <file path=customXml/item3.xml><?xml version="1.0" encoding="utf-8"?>
@@ -10514,19 +10931,19 @@
 </file>
 
 <file path=customXml/itemProps1.xml><?xml version="1.0" encoding="utf-8"?>
-<ds:datastoreItem xmlns:ds="http://schemas.openxmlformats.org/officeDocument/2006/customXml" ds:itemID="{31F006B4-A9E1-4F39-85C8-FB836F919348}">
+<ds:datastoreItem xmlns:ds="http://schemas.openxmlformats.org/officeDocument/2006/customXml" ds:itemID="{8F3CD65D-61A5-43C9-A837-6EC73C7DA8AB}">
   <ds:schemaRefs>
-    <ds:schemaRef ds:uri="http://schemas.microsoft.com/sharepoint/v3/contenttype/forms"/>
+    <ds:schemaRef ds:uri="http://schemas.microsoft.com/office/2006/metadata/properties"/>
+    <ds:schemaRef ds:uri="http://schemas.microsoft.com/office/infopath/2007/PartnerControls"/>
+    <ds:schemaRef ds:uri="71af3243-3dd4-4a8d-8c0d-dd76da1f02a5"/>
   </ds:schemaRefs>
 </ds:datastoreItem>
 </file>
 
 <file path=customXml/itemProps2.xml><?xml version="1.0" encoding="utf-8"?>
-<ds:datastoreItem xmlns:ds="http://schemas.openxmlformats.org/officeDocument/2006/customXml" ds:itemID="{8F3CD65D-61A5-43C9-A837-6EC73C7DA8AB}">
+<ds:datastoreItem xmlns:ds="http://schemas.openxmlformats.org/officeDocument/2006/customXml" ds:itemID="{31F006B4-A9E1-4F39-85C8-FB836F919348}">
   <ds:schemaRefs>
-    <ds:schemaRef ds:uri="http://schemas.microsoft.com/office/2006/metadata/properties"/>
-    <ds:schemaRef ds:uri="http://schemas.microsoft.com/office/infopath/2007/PartnerControls"/>
-    <ds:schemaRef ds:uri="71af3243-3dd4-4a8d-8c0d-dd76da1f02a5"/>
+    <ds:schemaRef ds:uri="http://schemas.microsoft.com/sharepoint/v3/contenttype/forms"/>
   </ds:schemaRefs>
 </ds:datastoreItem>
 </file>

</xml_diff>

<commit_message>
Weather images updated to ppt
</commit_message>
<xml_diff>
--- a/Anaconda_Results_Presentation.pptx
+++ b/Anaconda_Results_Presentation.pptx
@@ -218,7 +218,7 @@
           <a:p>
             <a:fld id="{43EC3969-ABB6-44FD-90B4-7F0745909C05}" type="datetimeFigureOut">
               <a:rPr lang="en-US" smtClean="0"/>
-              <a:t>2/19/21</a:t>
+              <a:t>2/19/2021</a:t>
             </a:fld>
             <a:endParaRPr lang="en-US"/>
           </a:p>
@@ -2494,7 +2494,7 @@
           <a:p>
             <a:fld id="{9184DA70-C731-4C70-880D-CCD4705E623C}" type="datetime1">
               <a:rPr lang="en-US" smtClean="0"/>
-              <a:t>2/19/21</a:t>
+              <a:t>2/19/2021</a:t>
             </a:fld>
             <a:endParaRPr lang="en-US" dirty="0"/>
           </a:p>
@@ -2682,7 +2682,7 @@
           <a:p>
             <a:fld id="{4BE1D723-8F53-4F53-90B0-1982A396982E}" type="datetime1">
               <a:rPr lang="en-US" smtClean="0"/>
-              <a:t>2/19/21</a:t>
+              <a:t>2/19/2021</a:t>
             </a:fld>
             <a:endParaRPr lang="en-US" dirty="0"/>
           </a:p>
@@ -3055,7 +3055,7 @@
           <a:p>
             <a:fld id="{97669AF7-7BEB-44E4-9852-375E34362B5B}" type="datetime1">
               <a:rPr lang="en-US" smtClean="0"/>
-              <a:t>2/19/21</a:t>
+              <a:t>2/19/2021</a:t>
             </a:fld>
             <a:endParaRPr lang="en-US" dirty="0"/>
           </a:p>
@@ -3310,7 +3310,7 @@
           <a:p>
             <a:fld id="{BAAAC38D-0552-4C82-B593-E6124DFADBE2}" type="datetime1">
               <a:rPr lang="en-US" smtClean="0"/>
-              <a:t>2/19/21</a:t>
+              <a:t>2/19/2021</a:t>
             </a:fld>
             <a:endParaRPr lang="en-US" dirty="0"/>
           </a:p>
@@ -3707,7 +3707,7 @@
           <a:p>
             <a:fld id="{D9DF0F1C-5577-4ACB-BB62-DF8F3C494C7E}" type="datetime1">
               <a:rPr lang="en-US" smtClean="0"/>
-              <a:t>2/19/21</a:t>
+              <a:t>2/19/2021</a:t>
             </a:fld>
             <a:endParaRPr lang="en-US" dirty="0"/>
           </a:p>
@@ -3843,7 +3843,7 @@
           <a:p>
             <a:fld id="{1775B394-D9F9-4F0C-B15D-605F45CB9E9F}" type="datetime1">
               <a:rPr lang="en-US" smtClean="0"/>
-              <a:t>2/19/21</a:t>
+              <a:t>2/19/2021</a:t>
             </a:fld>
             <a:endParaRPr lang="en-US" dirty="0"/>
           </a:p>
@@ -4000,7 +4000,7 @@
           <a:p>
             <a:fld id="{39667345-2558-425A-8533-9BFDBCE15005}" type="datetime1">
               <a:rPr lang="en-US" smtClean="0"/>
-              <a:t>2/19/21</a:t>
+              <a:t>2/19/2021</a:t>
             </a:fld>
             <a:endParaRPr lang="en-US" dirty="0"/>
           </a:p>
@@ -4329,7 +4329,7 @@
           <a:p>
             <a:fld id="{92BEA474-078D-4E9B-9B14-09A87B19DC46}" type="datetime1">
               <a:rPr lang="en-US" smtClean="0"/>
-              <a:t>2/19/21</a:t>
+              <a:t>2/19/2021</a:t>
             </a:fld>
             <a:endParaRPr lang="en-US" dirty="0"/>
           </a:p>
@@ -4679,7 +4679,7 @@
           <a:p>
             <a:fld id="{4907D986-8816-4272-A432-0437A28A9828}" type="datetime1">
               <a:rPr lang="en-US" smtClean="0"/>
-              <a:t>2/19/21</a:t>
+              <a:t>2/19/2021</a:t>
             </a:fld>
             <a:endParaRPr lang="en-US" dirty="0"/>
           </a:p>
@@ -4940,7 +4940,7 @@
           <a:p>
             <a:fld id="{62D6E202-B606-4609-B914-27C9371A1F6D}" type="datetime1">
               <a:rPr lang="en-US" smtClean="0"/>
-              <a:t>2/19/21</a:t>
+              <a:t>2/19/2021</a:t>
             </a:fld>
             <a:endParaRPr lang="en-US" dirty="0"/>
           </a:p>
@@ -7276,10 +7276,10 @@
       </p:pic>
       <p:pic>
         <p:nvPicPr>
-          <p:cNvPr id="10" name="Content Placeholder 9">
-            <a:extLst>
-              <a:ext uri="{FF2B5EF4-FFF2-40B4-BE49-F238E27FC236}">
-                <a16:creationId xmlns:a16="http://schemas.microsoft.com/office/drawing/2014/main" id="{DA996BA9-42C6-42DE-B658-6ECBE2BE3002}"/>
+          <p:cNvPr id="7" name="Content Placeholder 6">
+            <a:extLst>
+              <a:ext uri="{FF2B5EF4-FFF2-40B4-BE49-F238E27FC236}">
+                <a16:creationId xmlns:a16="http://schemas.microsoft.com/office/drawing/2014/main" id="{9A35CD89-CA17-4C80-BA02-EA53725BE291}"/>
               </a:ext>
             </a:extLst>
           </p:cNvPr>
@@ -7298,17 +7298,17 @@
         </p:blipFill>
         <p:spPr>
           <a:xfrm>
-            <a:off x="856804" y="2080788"/>
-            <a:ext cx="3024546" cy="2028225"/>
+            <a:off x="1097280" y="2210177"/>
+            <a:ext cx="5487650" cy="3658433"/>
           </a:xfrm>
         </p:spPr>
       </p:pic>
       <p:pic>
         <p:nvPicPr>
-          <p:cNvPr id="12" name="Picture 11">
-            <a:extLst>
-              <a:ext uri="{FF2B5EF4-FFF2-40B4-BE49-F238E27FC236}">
-                <a16:creationId xmlns:a16="http://schemas.microsoft.com/office/drawing/2014/main" id="{8CF33ABD-BF90-4C46-AF13-7553BA0F3CEA}"/>
+          <p:cNvPr id="9" name="Picture 8">
+            <a:extLst>
+              <a:ext uri="{FF2B5EF4-FFF2-40B4-BE49-F238E27FC236}">
+                <a16:creationId xmlns:a16="http://schemas.microsoft.com/office/drawing/2014/main" id="{44F662AB-6FA7-4E99-B91E-A04EFD78240A}"/>
               </a:ext>
             </a:extLst>
           </p:cNvPr>
@@ -7319,74 +7319,13 @@
         </p:nvPicPr>
         <p:blipFill>
           <a:blip r:embed="rId5"/>
-          <a:stretch>
-            <a:fillRect/>
-          </a:stretch>
+          <a:srcRect/>
+          <a:stretch/>
         </p:blipFill>
         <p:spPr>
           <a:xfrm>
-            <a:off x="4276407" y="1978242"/>
-            <a:ext cx="3229426" cy="2229161"/>
-          </a:xfrm>
-          <a:prstGeom prst="rect">
-            <a:avLst/>
-          </a:prstGeom>
-        </p:spPr>
-      </p:pic>
-      <p:pic>
-        <p:nvPicPr>
-          <p:cNvPr id="14" name="Picture 13">
-            <a:extLst>
-              <a:ext uri="{FF2B5EF4-FFF2-40B4-BE49-F238E27FC236}">
-                <a16:creationId xmlns:a16="http://schemas.microsoft.com/office/drawing/2014/main" id="{41A296EC-7120-447E-98CD-A86A1F43B1A3}"/>
-              </a:ext>
-            </a:extLst>
-          </p:cNvPr>
-          <p:cNvPicPr>
-            <a:picLocks noChangeAspect="1"/>
-          </p:cNvPicPr>
-          <p:nvPr/>
-        </p:nvPicPr>
-        <p:blipFill>
-          <a:blip r:embed="rId6"/>
-          <a:stretch>
-            <a:fillRect/>
-          </a:stretch>
-        </p:blipFill>
-        <p:spPr>
-          <a:xfrm>
-            <a:off x="7926254" y="1978242"/>
-            <a:ext cx="3229426" cy="2152950"/>
-          </a:xfrm>
-          <a:prstGeom prst="rect">
-            <a:avLst/>
-          </a:prstGeom>
-        </p:spPr>
-      </p:pic>
-      <p:pic>
-        <p:nvPicPr>
-          <p:cNvPr id="16" name="Picture 15">
-            <a:extLst>
-              <a:ext uri="{FF2B5EF4-FFF2-40B4-BE49-F238E27FC236}">
-                <a16:creationId xmlns:a16="http://schemas.microsoft.com/office/drawing/2014/main" id="{ADF52B86-0C38-4AE2-A1CF-D65EA3F155A0}"/>
-              </a:ext>
-            </a:extLst>
-          </p:cNvPr>
-          <p:cNvPicPr>
-            <a:picLocks noChangeAspect="1"/>
-          </p:cNvPicPr>
-          <p:nvPr/>
-        </p:nvPicPr>
-        <p:blipFill>
-          <a:blip r:embed="rId7"/>
-          <a:stretch>
-            <a:fillRect/>
-          </a:stretch>
-        </p:blipFill>
-        <p:spPr>
-          <a:xfrm>
-            <a:off x="856804" y="4109013"/>
-            <a:ext cx="3172268" cy="2200582"/>
+            <a:off x="6126480" y="2210176"/>
+            <a:ext cx="5487650" cy="3658433"/>
           </a:xfrm>
           <a:prstGeom prst="rect">
             <a:avLst/>
@@ -10674,6 +10613,15 @@
 </file>
 
 <file path=customXml/item1.xml><?xml version="1.0" encoding="utf-8"?>
+<p:properties xmlns:p="http://schemas.microsoft.com/office/2006/metadata/properties" xmlns:xsi="http://www.w3.org/2001/XMLSchema-instance" xmlns:pc="http://schemas.microsoft.com/office/infopath/2007/PartnerControls">
+  <documentManagement>
+    <Status xmlns="71af3243-3dd4-4a8d-8c0d-dd76da1f02a5">Not started</Status>
+    <MediaServiceKeyPoints xmlns="71af3243-3dd4-4a8d-8c0d-dd76da1f02a5" xsi:nil="true"/>
+  </documentManagement>
+</p:properties>
+</file>
+
+<file path=customXml/item2.xml><?xml version="1.0" encoding="utf-8"?>
 <ct:contentTypeSchema xmlns:ct="http://schemas.microsoft.com/office/2006/metadata/contentType" xmlns:ma="http://schemas.microsoft.com/office/2006/metadata/properties/metaAttributes" ct:_="" ma:_="" ma:contentTypeName="Document" ma:contentTypeID="0x01010079F111ED35F8CC479449609E8A0923A6" ma:contentTypeVersion="12" ma:contentTypeDescription="Create a new document." ma:contentTypeScope="" ma:versionID="a410dd7f93c95333ffa1b60ed6adedd1">
   <xsd:schema xmlns:xsd="http://www.w3.org/2001/XMLSchema" xmlns:xs="http://www.w3.org/2001/XMLSchema" xmlns:p="http://schemas.microsoft.com/office/2006/metadata/properties" xmlns:ns2="71af3243-3dd4-4a8d-8c0d-dd76da1f02a5" xmlns:ns3="16c05727-aa75-4e4a-9b5f-8a80a1165891" targetNamespace="http://schemas.microsoft.com/office/2006/metadata/properties" ma:root="true" ma:fieldsID="a936d9baba76aa3866493feff160faab" ns2:_="" ns3:_="">
     <xsd:import namespace="71af3243-3dd4-4a8d-8c0d-dd76da1f02a5"/>
@@ -10894,15 +10842,6 @@
 </ct:contentTypeSchema>
 </file>
 
-<file path=customXml/item2.xml><?xml version="1.0" encoding="utf-8"?>
-<p:properties xmlns:p="http://schemas.microsoft.com/office/2006/metadata/properties" xmlns:xsi="http://www.w3.org/2001/XMLSchema-instance" xmlns:pc="http://schemas.microsoft.com/office/infopath/2007/PartnerControls">
-  <documentManagement>
-    <Status xmlns="71af3243-3dd4-4a8d-8c0d-dd76da1f02a5">Not started</Status>
-    <MediaServiceKeyPoints xmlns="71af3243-3dd4-4a8d-8c0d-dd76da1f02a5" xsi:nil="true"/>
-  </documentManagement>
-</p:properties>
-</file>
-
 <file path=customXml/item3.xml><?xml version="1.0" encoding="utf-8"?>
 <?mso-contentType ?>
 <FormTemplates xmlns="http://schemas.microsoft.com/sharepoint/v3/contenttype/forms">
@@ -10913,6 +10852,16 @@
 </file>
 
 <file path=customXml/itemProps1.xml><?xml version="1.0" encoding="utf-8"?>
+<ds:datastoreItem xmlns:ds="http://schemas.openxmlformats.org/officeDocument/2006/customXml" ds:itemID="{8F3CD65D-61A5-43C9-A837-6EC73C7DA8AB}">
+  <ds:schemaRefs>
+    <ds:schemaRef ds:uri="http://schemas.microsoft.com/office/2006/metadata/properties"/>
+    <ds:schemaRef ds:uri="http://schemas.microsoft.com/office/infopath/2007/PartnerControls"/>
+    <ds:schemaRef ds:uri="71af3243-3dd4-4a8d-8c0d-dd76da1f02a5"/>
+  </ds:schemaRefs>
+</ds:datastoreItem>
+</file>
+
+<file path=customXml/itemProps2.xml><?xml version="1.0" encoding="utf-8"?>
 <ds:datastoreItem xmlns:ds="http://schemas.openxmlformats.org/officeDocument/2006/customXml" ds:itemID="{16377351-63A1-4C2E-8C9A-66CDD70F16AC}">
   <ds:schemaRefs>
     <ds:schemaRef ds:uri="http://schemas.microsoft.com/office/2006/metadata/contentType"/>
@@ -10931,16 +10880,6 @@
 </ds:datastoreItem>
 </file>
 
-<file path=customXml/itemProps2.xml><?xml version="1.0" encoding="utf-8"?>
-<ds:datastoreItem xmlns:ds="http://schemas.openxmlformats.org/officeDocument/2006/customXml" ds:itemID="{8F3CD65D-61A5-43C9-A837-6EC73C7DA8AB}">
-  <ds:schemaRefs>
-    <ds:schemaRef ds:uri="http://schemas.microsoft.com/office/2006/metadata/properties"/>
-    <ds:schemaRef ds:uri="http://schemas.microsoft.com/office/infopath/2007/PartnerControls"/>
-    <ds:schemaRef ds:uri="71af3243-3dd4-4a8d-8c0d-dd76da1f02a5"/>
-  </ds:schemaRefs>
-</ds:datastoreItem>
-</file>
-
 <file path=customXml/itemProps3.xml><?xml version="1.0" encoding="utf-8"?>
 <ds:datastoreItem xmlns:ds="http://schemas.openxmlformats.org/officeDocument/2006/customXml" ds:itemID="{31F006B4-A9E1-4F39-85C8-FB836F919348}">
   <ds:schemaRefs>

</xml_diff>